<commit_message>
Added dataset examples into Milestone04
</commit_message>
<xml_diff>
--- a/milestones/BUELL_ENGR6970_Milestone04.pptx
+++ b/milestones/BUELL_ENGR6970_Milestone04.pptx
@@ -8,6 +8,10 @@
     <p:sldId id="256" r:id="rId2"/>
     <p:sldId id="257" r:id="rId3"/>
     <p:sldId id="258" r:id="rId4"/>
+    <p:sldId id="260" r:id="rId5"/>
+    <p:sldId id="259" r:id="rId6"/>
+    <p:sldId id="261" r:id="rId7"/>
+    <p:sldId id="262" r:id="rId8"/>
   </p:sldIdLst>
   <p:sldSz cx="12192000" cy="6858000"/>
   <p:notesSz cx="6858000" cy="9144000"/>
@@ -209,7 +213,7 @@
           <a:effectLst/>
           <a:extLst>
             <a:ext uri="{91240B29-F687-4f45-9708-019B960494DF}">
-              <a14:hiddenLine xmlns="" xmlns:a14="http://schemas.microsoft.com/office/drawing/2010/main" w="9525">
+              <a14:hiddenLine xmlns:a14="http://schemas.microsoft.com/office/drawing/2010/main" xmlns="" w="9525">
                 <a:solidFill>
                   <a:srgbClr val="000000"/>
                 </a:solidFill>
@@ -401,7 +405,7 @@
           <a:p>
             <a:fld id="{DD5810A3-62D8-4B1C-84B6-3245CDBC954F}" type="datetimeFigureOut">
               <a:rPr lang="en-US" smtClean="0"/>
-              <a:t>8/6/2023</a:t>
+              <a:t>8/9/2023</a:t>
             </a:fld>
             <a:endParaRPr lang="en-US"/>
           </a:p>
@@ -719,7 +723,7 @@
           <a:p>
             <a:fld id="{DD5810A3-62D8-4B1C-84B6-3245CDBC954F}" type="datetimeFigureOut">
               <a:rPr lang="en-US" smtClean="0"/>
-              <a:t>8/6/2023</a:t>
+              <a:t>8/9/2023</a:t>
             </a:fld>
             <a:endParaRPr lang="en-US"/>
           </a:p>
@@ -1207,7 +1211,7 @@
           <a:p>
             <a:fld id="{DD5810A3-62D8-4B1C-84B6-3245CDBC954F}" type="datetimeFigureOut">
               <a:rPr lang="en-US" smtClean="0"/>
-              <a:t>8/6/2023</a:t>
+              <a:t>8/9/2023</a:t>
             </a:fld>
             <a:endParaRPr lang="en-US"/>
           </a:p>
@@ -1576,7 +1580,7 @@
           <a:p>
             <a:fld id="{DD5810A3-62D8-4B1C-84B6-3245CDBC954F}" type="datetimeFigureOut">
               <a:rPr lang="en-US" smtClean="0"/>
-              <a:t>8/6/2023</a:t>
+              <a:t>8/9/2023</a:t>
             </a:fld>
             <a:endParaRPr lang="en-US"/>
           </a:p>
@@ -1731,7 +1735,7 @@
           <a:ln/>
           <a:extLst>
             <a:ext uri="{91240B29-F687-4f45-9708-019B960494DF}">
-              <a14:hiddenLine xmlns="" xmlns:a14="http://schemas.microsoft.com/office/drawing/2010/main" w="9525">
+              <a14:hiddenLine xmlns:a14="http://schemas.microsoft.com/office/drawing/2010/main" xmlns="" w="9525">
                 <a:solidFill>
                   <a:srgbClr val="000000"/>
                 </a:solidFill>
@@ -1849,7 +1853,7 @@
           <a:p>
             <a:fld id="{DD5810A3-62D8-4B1C-84B6-3245CDBC954F}" type="datetimeFigureOut">
               <a:rPr lang="en-US" smtClean="0"/>
-              <a:t>8/6/2023</a:t>
+              <a:t>8/9/2023</a:t>
             </a:fld>
             <a:endParaRPr lang="en-US"/>
           </a:p>
@@ -2006,7 +2010,7 @@
           <a:ln/>
           <a:extLst>
             <a:ext uri="{91240B29-F687-4f45-9708-019B960494DF}">
-              <a14:hiddenLine xmlns="" xmlns:a14="http://schemas.microsoft.com/office/drawing/2010/main" w="9525">
+              <a14:hiddenLine xmlns:a14="http://schemas.microsoft.com/office/drawing/2010/main" xmlns="" w="9525">
                 <a:solidFill>
                   <a:srgbClr val="000000"/>
                 </a:solidFill>
@@ -2134,7 +2138,7 @@
           <a:p>
             <a:fld id="{DD5810A3-62D8-4B1C-84B6-3245CDBC954F}" type="datetimeFigureOut">
               <a:rPr lang="en-US" smtClean="0"/>
-              <a:t>8/6/2023</a:t>
+              <a:t>8/9/2023</a:t>
             </a:fld>
             <a:endParaRPr lang="en-US"/>
           </a:p>
@@ -2289,7 +2293,7 @@
           <a:ln/>
           <a:extLst>
             <a:ext uri="{91240B29-F687-4f45-9708-019B960494DF}">
-              <a14:hiddenLine xmlns="" xmlns:a14="http://schemas.microsoft.com/office/drawing/2010/main" w="9525">
+              <a14:hiddenLine xmlns:a14="http://schemas.microsoft.com/office/drawing/2010/main" xmlns="" w="9525">
                 <a:solidFill>
                   <a:srgbClr val="000000"/>
                 </a:solidFill>
@@ -2417,7 +2421,7 @@
           <a:p>
             <a:fld id="{DD5810A3-62D8-4B1C-84B6-3245CDBC954F}" type="datetimeFigureOut">
               <a:rPr lang="en-US" smtClean="0"/>
-              <a:t>8/6/2023</a:t>
+              <a:t>8/9/2023</a:t>
             </a:fld>
             <a:endParaRPr lang="en-US"/>
           </a:p>
@@ -2760,7 +2764,7 @@
           <a:p>
             <a:fld id="{DD5810A3-62D8-4B1C-84B6-3245CDBC954F}" type="datetimeFigureOut">
               <a:rPr lang="en-US" smtClean="0"/>
-              <a:t>8/6/2023</a:t>
+              <a:t>8/9/2023</a:t>
             </a:fld>
             <a:endParaRPr lang="en-US"/>
           </a:p>
@@ -2915,7 +2919,7 @@
           <a:ln/>
           <a:extLst>
             <a:ext uri="{91240B29-F687-4f45-9708-019B960494DF}">
-              <a14:hiddenLine xmlns="" xmlns:a14="http://schemas.microsoft.com/office/drawing/2010/main" w="9525">
+              <a14:hiddenLine xmlns:a14="http://schemas.microsoft.com/office/drawing/2010/main" xmlns="" w="9525">
                 <a:solidFill>
                   <a:srgbClr val="000000"/>
                 </a:solidFill>
@@ -3099,7 +3103,7 @@
           <a:p>
             <a:fld id="{DD5810A3-62D8-4B1C-84B6-3245CDBC954F}" type="datetimeFigureOut">
               <a:rPr lang="en-US" smtClean="0"/>
-              <a:t>8/6/2023</a:t>
+              <a:t>8/9/2023</a:t>
             </a:fld>
             <a:endParaRPr lang="en-US"/>
           </a:p>
@@ -3254,7 +3258,7 @@
           <a:ln/>
           <a:extLst>
             <a:ext uri="{91240B29-F687-4f45-9708-019B960494DF}">
-              <a14:hiddenLine xmlns="" xmlns:a14="http://schemas.microsoft.com/office/drawing/2010/main" w="9525">
+              <a14:hiddenLine xmlns:a14="http://schemas.microsoft.com/office/drawing/2010/main" xmlns="" w="9525">
                 <a:solidFill>
                   <a:srgbClr val="000000"/>
                 </a:solidFill>
@@ -3576,7 +3580,7 @@
           <a:p>
             <a:fld id="{DD5810A3-62D8-4B1C-84B6-3245CDBC954F}" type="datetimeFigureOut">
               <a:rPr lang="en-US" smtClean="0"/>
-              <a:t>8/6/2023</a:t>
+              <a:t>8/9/2023</a:t>
             </a:fld>
             <a:endParaRPr lang="en-US"/>
           </a:p>
@@ -3731,7 +3735,7 @@
           <a:ln/>
           <a:extLst>
             <a:ext uri="{91240B29-F687-4f45-9708-019B960494DF}">
-              <a14:hiddenLine xmlns="" xmlns:a14="http://schemas.microsoft.com/office/drawing/2010/main" w="9525">
+              <a14:hiddenLine xmlns:a14="http://schemas.microsoft.com/office/drawing/2010/main" xmlns="" w="9525">
                 <a:solidFill>
                   <a:srgbClr val="000000"/>
                 </a:solidFill>
@@ -3797,7 +3801,7 @@
           <a:p>
             <a:fld id="{DD5810A3-62D8-4B1C-84B6-3245CDBC954F}" type="datetimeFigureOut">
               <a:rPr lang="en-US" smtClean="0"/>
-              <a:t>8/6/2023</a:t>
+              <a:t>8/9/2023</a:t>
             </a:fld>
             <a:endParaRPr lang="en-US"/>
           </a:p>
@@ -3892,7 +3896,7 @@
           <a:p>
             <a:fld id="{DD5810A3-62D8-4B1C-84B6-3245CDBC954F}" type="datetimeFigureOut">
               <a:rPr lang="en-US" smtClean="0"/>
-              <a:t>8/6/2023</a:t>
+              <a:t>8/9/2023</a:t>
             </a:fld>
             <a:endParaRPr lang="en-US"/>
           </a:p>
@@ -4160,7 +4164,7 @@
           <a:ln/>
           <a:extLst>
             <a:ext uri="{91240B29-F687-4f45-9708-019B960494DF}">
-              <a14:hiddenLine xmlns="" xmlns:a14="http://schemas.microsoft.com/office/drawing/2010/main" w="9525">
+              <a14:hiddenLine xmlns:a14="http://schemas.microsoft.com/office/drawing/2010/main" xmlns="" w="9525">
                 <a:solidFill>
                   <a:srgbClr val="000000"/>
                 </a:solidFill>
@@ -4359,7 +4363,7 @@
           <a:p>
             <a:fld id="{DD5810A3-62D8-4B1C-84B6-3245CDBC954F}" type="datetimeFigureOut">
               <a:rPr lang="en-US" smtClean="0"/>
-              <a:t>8/6/2023</a:t>
+              <a:t>8/9/2023</a:t>
             </a:fld>
             <a:endParaRPr lang="en-US"/>
           </a:p>
@@ -4672,7 +4676,7 @@
           <a:p>
             <a:fld id="{DD5810A3-62D8-4B1C-84B6-3245CDBC954F}" type="datetimeFigureOut">
               <a:rPr lang="en-US" smtClean="0"/>
-              <a:t>8/6/2023</a:t>
+              <a:t>8/9/2023</a:t>
             </a:fld>
             <a:endParaRPr lang="en-US"/>
           </a:p>
@@ -4942,7 +4946,7 @@
           <a:p>
             <a:fld id="{DD5810A3-62D8-4B1C-84B6-3245CDBC954F}" type="datetimeFigureOut">
               <a:rPr lang="en-US" smtClean="0"/>
-              <a:t>8/6/2023</a:t>
+              <a:t>8/9/2023</a:t>
             </a:fld>
             <a:endParaRPr lang="en-US"/>
           </a:p>
@@ -5678,7 +5682,13 @@
           <a:p>
             <a:r>
               <a:rPr lang="en-US" sz="1600" dirty="0"/>
-              <a:t>The dataset</a:t>
+              <a:t>The Dataset</a:t>
+            </a:r>
+          </a:p>
+          <a:p>
+            <a:r>
+              <a:rPr lang="en-US" sz="1600" dirty="0"/>
+              <a:t>Preprocessing Procedures</a:t>
             </a:r>
           </a:p>
           <a:p>
@@ -5815,15 +5825,16 @@
           <a:p>
             <a:r>
               <a:rPr lang="en-US" dirty="0"/>
-              <a:t>Text-based and audio-based Large </a:t>
-            </a:r>
-            <a:r>
-              <a:rPr lang="en-US" dirty="0" err="1"/>
-              <a:t>Langugae</a:t>
-            </a:r>
+              <a:t>Large Language Models (LLM’s) have made their way into the public eye over the course of the last 10 years [citation]</a:t>
+            </a:r>
+          </a:p>
+          <a:p>
+            <a:endParaRPr lang="en-US" dirty="0"/>
+          </a:p>
+          <a:p>
             <a:r>
               <a:rPr lang="en-US" dirty="0"/>
-              <a:t> Models (LLM’s) have made their way into the public eye over the course of the last 10 years [citation]</a:t>
+              <a:t>These models rely on text-based or speech-based input to operate</a:t>
             </a:r>
           </a:p>
           <a:p>
@@ -5832,13 +5843,8 @@
           <a:p>
             <a:r>
               <a:rPr lang="en-US" dirty="0"/>
-              <a:t>Large </a:t>
-            </a:r>
-            <a:r>
-              <a:rPr lang="en-US"/>
-              <a:t>language models </a:t>
-            </a:r>
-            <a:endParaRPr lang="en-US" dirty="0"/>
+              <a:t>No LLM uses image-based or video-based input to allow for the use of American Sign Language (ASL) for communication</a:t>
+            </a:r>
           </a:p>
           <a:p>
             <a:endParaRPr lang="en-US" dirty="0"/>
@@ -5862,7 +5868,7 @@
             </a:r>
             <a:r>
               <a:rPr lang="en-US" dirty="0"/>
-              <a:t>remain</a:t>
+              <a:t>remain largely inaccessible to the deaf and hard of hearing (DHH) community</a:t>
             </a:r>
             <a:endParaRPr lang="en-US" i="1" dirty="0"/>
           </a:p>
@@ -5872,6 +5878,1238 @@
     <p:extLst>
       <p:ext uri="{BB962C8B-B14F-4D97-AF65-F5344CB8AC3E}">
         <p14:creationId xmlns:p14="http://schemas.microsoft.com/office/powerpoint/2010/main" val="125462124"/>
+      </p:ext>
+    </p:extLst>
+  </p:cSld>
+  <p:clrMapOvr>
+    <a:masterClrMapping/>
+  </p:clrMapOvr>
+</p:sld>
+</file>
+
+<file path=ppt/slides/slide4.xml><?xml version="1.0" encoding="utf-8"?>
+<p:sld xmlns:a="http://schemas.openxmlformats.org/drawingml/2006/main" xmlns:r="http://schemas.openxmlformats.org/officeDocument/2006/relationships" xmlns:p="http://schemas.openxmlformats.org/presentationml/2006/main">
+  <p:cSld>
+    <p:spTree>
+      <p:nvGrpSpPr>
+        <p:cNvPr id="1" name=""/>
+        <p:cNvGrpSpPr/>
+        <p:nvPr/>
+      </p:nvGrpSpPr>
+      <p:grpSpPr>
+        <a:xfrm>
+          <a:off x="0" y="0"/>
+          <a:ext cx="0" cy="0"/>
+          <a:chOff x="0" y="0"/>
+          <a:chExt cx="0" cy="0"/>
+        </a:xfrm>
+      </p:grpSpPr>
+      <p:sp>
+        <p:nvSpPr>
+          <p:cNvPr id="2" name="Title 1">
+            <a:extLst>
+              <a:ext uri="{FF2B5EF4-FFF2-40B4-BE49-F238E27FC236}">
+                <a16:creationId xmlns:a16="http://schemas.microsoft.com/office/drawing/2014/main" id="{50984ABF-7188-5100-696B-5A83B8E53346}"/>
+              </a:ext>
+            </a:extLst>
+          </p:cNvPr>
+          <p:cNvSpPr>
+            <a:spLocks noGrp="1"/>
+          </p:cNvSpPr>
+          <p:nvPr>
+            <p:ph type="title"/>
+          </p:nvPr>
+        </p:nvSpPr>
+        <p:spPr/>
+        <p:txBody>
+          <a:bodyPr/>
+          <a:lstStyle/>
+          <a:p>
+            <a:r>
+              <a:rPr lang="en-US" dirty="0"/>
+              <a:t>Introduction (cont.)</a:t>
+            </a:r>
+          </a:p>
+        </p:txBody>
+      </p:sp>
+      <p:sp>
+        <p:nvSpPr>
+          <p:cNvPr id="3" name="Content Placeholder 2">
+            <a:extLst>
+              <a:ext uri="{FF2B5EF4-FFF2-40B4-BE49-F238E27FC236}">
+                <a16:creationId xmlns:a16="http://schemas.microsoft.com/office/drawing/2014/main" id="{2725F825-2F56-E94C-0A99-E16A6C592A6D}"/>
+              </a:ext>
+            </a:extLst>
+          </p:cNvPr>
+          <p:cNvSpPr>
+            <a:spLocks noGrp="1"/>
+          </p:cNvSpPr>
+          <p:nvPr>
+            <p:ph idx="1"/>
+          </p:nvPr>
+        </p:nvSpPr>
+        <p:spPr/>
+        <p:txBody>
+          <a:bodyPr/>
+          <a:lstStyle/>
+          <a:p>
+            <a:r>
+              <a:rPr lang="en-US" dirty="0"/>
+              <a:t>To provide a proof-of-concept, we train an image classifier neural network to recognize characters from the ASL alphabet</a:t>
+            </a:r>
+          </a:p>
+          <a:p>
+            <a:endParaRPr lang="en-US" dirty="0"/>
+          </a:p>
+          <a:p>
+            <a:r>
+              <a:rPr lang="en-US" dirty="0"/>
+              <a:t>The complete ASL lexicon consists of a rich vocabulary of complex ideas, thoughts, and phrases</a:t>
+            </a:r>
+          </a:p>
+          <a:p>
+            <a:endParaRPr lang="en-US" dirty="0"/>
+          </a:p>
+          <a:p>
+            <a:r>
+              <a:rPr lang="en-US" dirty="0"/>
+              <a:t>This concept of classifying images, and relating them to letters can be thought of as a proof-of-concept</a:t>
+            </a:r>
+          </a:p>
+          <a:p>
+            <a:endParaRPr lang="en-US" dirty="0"/>
+          </a:p>
+          <a:p>
+            <a:r>
+              <a:rPr lang="en-US" dirty="0"/>
+              <a:t>Can be extended to recognize a wider range of ASL ideas</a:t>
+            </a:r>
+          </a:p>
+        </p:txBody>
+      </p:sp>
+    </p:spTree>
+    <p:extLst>
+      <p:ext uri="{BB962C8B-B14F-4D97-AF65-F5344CB8AC3E}">
+        <p14:creationId xmlns:p14="http://schemas.microsoft.com/office/powerpoint/2010/main" val="965026135"/>
+      </p:ext>
+    </p:extLst>
+  </p:cSld>
+  <p:clrMapOvr>
+    <a:masterClrMapping/>
+  </p:clrMapOvr>
+</p:sld>
+</file>
+
+<file path=ppt/slides/slide5.xml><?xml version="1.0" encoding="utf-8"?>
+<p:sld xmlns:a="http://schemas.openxmlformats.org/drawingml/2006/main" xmlns:r="http://schemas.openxmlformats.org/officeDocument/2006/relationships" xmlns:p="http://schemas.openxmlformats.org/presentationml/2006/main">
+  <p:cSld>
+    <p:spTree>
+      <p:nvGrpSpPr>
+        <p:cNvPr id="1" name=""/>
+        <p:cNvGrpSpPr/>
+        <p:nvPr/>
+      </p:nvGrpSpPr>
+      <p:grpSpPr>
+        <a:xfrm>
+          <a:off x="0" y="0"/>
+          <a:ext cx="0" cy="0"/>
+          <a:chOff x="0" y="0"/>
+          <a:chExt cx="0" cy="0"/>
+        </a:xfrm>
+      </p:grpSpPr>
+      <p:sp>
+        <p:nvSpPr>
+          <p:cNvPr id="2" name="Title 1">
+            <a:extLst>
+              <a:ext uri="{FF2B5EF4-FFF2-40B4-BE49-F238E27FC236}">
+                <a16:creationId xmlns:a16="http://schemas.microsoft.com/office/drawing/2014/main" id="{34168624-6D4E-BD93-177E-D4C22669E7DA}"/>
+              </a:ext>
+            </a:extLst>
+          </p:cNvPr>
+          <p:cNvSpPr>
+            <a:spLocks noGrp="1"/>
+          </p:cNvSpPr>
+          <p:nvPr>
+            <p:ph type="title"/>
+          </p:nvPr>
+        </p:nvSpPr>
+        <p:spPr/>
+        <p:txBody>
+          <a:bodyPr/>
+          <a:lstStyle/>
+          <a:p>
+            <a:r>
+              <a:rPr lang="en-US" dirty="0"/>
+              <a:t>The Dataset</a:t>
+            </a:r>
+          </a:p>
+        </p:txBody>
+      </p:sp>
+      <p:sp>
+        <p:nvSpPr>
+          <p:cNvPr id="3" name="Content Placeholder 2">
+            <a:extLst>
+              <a:ext uri="{FF2B5EF4-FFF2-40B4-BE49-F238E27FC236}">
+                <a16:creationId xmlns:a16="http://schemas.microsoft.com/office/drawing/2014/main" id="{0BC4646D-285C-1B59-3E18-3EBEE184BFFE}"/>
+              </a:ext>
+            </a:extLst>
+          </p:cNvPr>
+          <p:cNvSpPr>
+            <a:spLocks noGrp="1"/>
+          </p:cNvSpPr>
+          <p:nvPr>
+            <p:ph idx="1"/>
+          </p:nvPr>
+        </p:nvSpPr>
+        <p:spPr/>
+        <p:txBody>
+          <a:bodyPr/>
+          <a:lstStyle/>
+          <a:p>
+            <a:r>
+              <a:rPr lang="en-US" dirty="0"/>
+              <a:t>We have acquired a large library of 87,000 images that cover 29 unique classes</a:t>
+            </a:r>
+          </a:p>
+          <a:p>
+            <a:endParaRPr lang="en-US" dirty="0"/>
+          </a:p>
+          <a:p>
+            <a:r>
+              <a:rPr lang="en-US" dirty="0"/>
+              <a:t>The first 26 classes represent the characters of the Latin alphabet, and the last three classes represent a </a:t>
+            </a:r>
+            <a:r>
+              <a:rPr lang="en-US" i="1" dirty="0"/>
+              <a:t>space</a:t>
+            </a:r>
+            <a:r>
+              <a:rPr lang="en-US" dirty="0"/>
+              <a:t>, </a:t>
+            </a:r>
+            <a:r>
+              <a:rPr lang="en-US" i="1" dirty="0"/>
+              <a:t>delete</a:t>
+            </a:r>
+            <a:r>
+              <a:rPr lang="en-US" dirty="0"/>
+              <a:t>, and </a:t>
+            </a:r>
+            <a:r>
+              <a:rPr lang="en-US" i="1" dirty="0"/>
+              <a:t>nothing</a:t>
+            </a:r>
+            <a:r>
+              <a:rPr lang="en-US" dirty="0"/>
+              <a:t>.</a:t>
+            </a:r>
+          </a:p>
+          <a:p>
+            <a:endParaRPr lang="en-US" dirty="0"/>
+          </a:p>
+          <a:p>
+            <a:r>
+              <a:rPr lang="en-US" dirty="0"/>
+              <a:t>There are approximately 3,000 images for each class</a:t>
+            </a:r>
+          </a:p>
+        </p:txBody>
+      </p:sp>
+    </p:spTree>
+    <p:extLst>
+      <p:ext uri="{BB962C8B-B14F-4D97-AF65-F5344CB8AC3E}">
+        <p14:creationId xmlns:p14="http://schemas.microsoft.com/office/powerpoint/2010/main" val="617399823"/>
+      </p:ext>
+    </p:extLst>
+  </p:cSld>
+  <p:clrMapOvr>
+    <a:masterClrMapping/>
+  </p:clrMapOvr>
+</p:sld>
+</file>
+
+<file path=ppt/slides/slide6.xml><?xml version="1.0" encoding="utf-8"?>
+<p:sld xmlns:a="http://schemas.openxmlformats.org/drawingml/2006/main" xmlns:r="http://schemas.openxmlformats.org/officeDocument/2006/relationships" xmlns:p="http://schemas.openxmlformats.org/presentationml/2006/main">
+  <p:cSld>
+    <p:spTree>
+      <p:nvGrpSpPr>
+        <p:cNvPr id="1" name=""/>
+        <p:cNvGrpSpPr/>
+        <p:nvPr/>
+      </p:nvGrpSpPr>
+      <p:grpSpPr>
+        <a:xfrm>
+          <a:off x="0" y="0"/>
+          <a:ext cx="0" cy="0"/>
+          <a:chOff x="0" y="0"/>
+          <a:chExt cx="0" cy="0"/>
+        </a:xfrm>
+      </p:grpSpPr>
+      <p:sp>
+        <p:nvSpPr>
+          <p:cNvPr id="2" name="Title 1">
+            <a:extLst>
+              <a:ext uri="{FF2B5EF4-FFF2-40B4-BE49-F238E27FC236}">
+                <a16:creationId xmlns:a16="http://schemas.microsoft.com/office/drawing/2014/main" id="{FFDA9128-89D1-C3A1-C038-9956C9766740}"/>
+              </a:ext>
+            </a:extLst>
+          </p:cNvPr>
+          <p:cNvSpPr>
+            <a:spLocks noGrp="1"/>
+          </p:cNvSpPr>
+          <p:nvPr>
+            <p:ph type="title"/>
+          </p:nvPr>
+        </p:nvSpPr>
+        <p:spPr/>
+        <p:txBody>
+          <a:bodyPr/>
+          <a:lstStyle/>
+          <a:p>
+            <a:r>
+              <a:rPr lang="en-US" dirty="0"/>
+              <a:t>Select Examples from the Dataset</a:t>
+            </a:r>
+          </a:p>
+        </p:txBody>
+      </p:sp>
+      <p:sp>
+        <p:nvSpPr>
+          <p:cNvPr id="6" name="TextBox 5">
+            <a:extLst>
+              <a:ext uri="{FF2B5EF4-FFF2-40B4-BE49-F238E27FC236}">
+                <a16:creationId xmlns:a16="http://schemas.microsoft.com/office/drawing/2014/main" id="{2D0E11E5-47D3-67FC-C167-F9BE5BF078C7}"/>
+              </a:ext>
+            </a:extLst>
+          </p:cNvPr>
+          <p:cNvSpPr txBox="1"/>
+          <p:nvPr/>
+        </p:nvSpPr>
+        <p:spPr>
+          <a:xfrm>
+            <a:off x="5181600" y="6256503"/>
+            <a:ext cx="1828799" cy="307777"/>
+          </a:xfrm>
+          <a:prstGeom prst="rect">
+            <a:avLst/>
+          </a:prstGeom>
+        </p:spPr>
+        <p:style>
+          <a:lnRef idx="2">
+            <a:schemeClr val="accent1"/>
+          </a:lnRef>
+          <a:fillRef idx="1">
+            <a:schemeClr val="lt1"/>
+          </a:fillRef>
+          <a:effectRef idx="0">
+            <a:schemeClr val="accent1"/>
+          </a:effectRef>
+          <a:fontRef idx="minor">
+            <a:schemeClr val="dk1"/>
+          </a:fontRef>
+        </p:style>
+        <p:txBody>
+          <a:bodyPr wrap="square" rtlCol="0">
+            <a:spAutoFit/>
+          </a:bodyPr>
+          <a:lstStyle/>
+          <a:p>
+            <a:pPr algn="ctr"/>
+            <a:r>
+              <a:rPr lang="en-US" sz="1400" dirty="0"/>
+              <a:t>Class 26 - Space</a:t>
+            </a:r>
+          </a:p>
+        </p:txBody>
+      </p:sp>
+      <p:sp>
+        <p:nvSpPr>
+          <p:cNvPr id="11" name="TextBox 10">
+            <a:extLst>
+              <a:ext uri="{FF2B5EF4-FFF2-40B4-BE49-F238E27FC236}">
+                <a16:creationId xmlns:a16="http://schemas.microsoft.com/office/drawing/2014/main" id="{A4D4714D-F4F5-B44E-A798-95004707CA12}"/>
+              </a:ext>
+            </a:extLst>
+          </p:cNvPr>
+          <p:cNvSpPr txBox="1"/>
+          <p:nvPr/>
+        </p:nvSpPr>
+        <p:spPr>
+          <a:xfrm>
+            <a:off x="5181601" y="3974430"/>
+            <a:ext cx="1828799" cy="307777"/>
+          </a:xfrm>
+          <a:prstGeom prst="rect">
+            <a:avLst/>
+          </a:prstGeom>
+        </p:spPr>
+        <p:style>
+          <a:lnRef idx="2">
+            <a:schemeClr val="accent1"/>
+          </a:lnRef>
+          <a:fillRef idx="1">
+            <a:schemeClr val="lt1"/>
+          </a:fillRef>
+          <a:effectRef idx="0">
+            <a:schemeClr val="accent1"/>
+          </a:effectRef>
+          <a:fontRef idx="minor">
+            <a:schemeClr val="dk1"/>
+          </a:fontRef>
+        </p:style>
+        <p:txBody>
+          <a:bodyPr wrap="square" rtlCol="0">
+            <a:spAutoFit/>
+          </a:bodyPr>
+          <a:lstStyle/>
+          <a:p>
+            <a:pPr algn="ctr"/>
+            <a:r>
+              <a:rPr lang="en-US" sz="1400" dirty="0"/>
+              <a:t>Class 9 - J</a:t>
+            </a:r>
+          </a:p>
+        </p:txBody>
+      </p:sp>
+      <p:sp>
+        <p:nvSpPr>
+          <p:cNvPr id="15" name="TextBox 14">
+            <a:extLst>
+              <a:ext uri="{FF2B5EF4-FFF2-40B4-BE49-F238E27FC236}">
+                <a16:creationId xmlns:a16="http://schemas.microsoft.com/office/drawing/2014/main" id="{5D495943-F9E3-2644-AD15-C0CF7852383F}"/>
+              </a:ext>
+            </a:extLst>
+          </p:cNvPr>
+          <p:cNvSpPr txBox="1"/>
+          <p:nvPr/>
+        </p:nvSpPr>
+        <p:spPr>
+          <a:xfrm>
+            <a:off x="2828424" y="3974430"/>
+            <a:ext cx="1828799" cy="307777"/>
+          </a:xfrm>
+          <a:prstGeom prst="rect">
+            <a:avLst/>
+          </a:prstGeom>
+        </p:spPr>
+        <p:style>
+          <a:lnRef idx="2">
+            <a:schemeClr val="accent1"/>
+          </a:lnRef>
+          <a:fillRef idx="1">
+            <a:schemeClr val="lt1"/>
+          </a:fillRef>
+          <a:effectRef idx="0">
+            <a:schemeClr val="accent1"/>
+          </a:effectRef>
+          <a:fontRef idx="minor">
+            <a:schemeClr val="dk1"/>
+          </a:fontRef>
+        </p:style>
+        <p:txBody>
+          <a:bodyPr wrap="square" rtlCol="0">
+            <a:spAutoFit/>
+          </a:bodyPr>
+          <a:lstStyle/>
+          <a:p>
+            <a:pPr algn="ctr"/>
+            <a:r>
+              <a:rPr lang="en-US" sz="1400" dirty="0"/>
+              <a:t>Class 1 - B </a:t>
+            </a:r>
+          </a:p>
+        </p:txBody>
+      </p:sp>
+      <p:pic>
+        <p:nvPicPr>
+          <p:cNvPr id="16" name="Picture 15">
+            <a:extLst>
+              <a:ext uri="{FF2B5EF4-FFF2-40B4-BE49-F238E27FC236}">
+                <a16:creationId xmlns:a16="http://schemas.microsoft.com/office/drawing/2014/main" id="{67C3276B-06FF-FD4A-7A24-04BDB6A5EB76}"/>
+              </a:ext>
+            </a:extLst>
+          </p:cNvPr>
+          <p:cNvPicPr>
+            <a:picLocks noChangeAspect="1"/>
+          </p:cNvPicPr>
+          <p:nvPr/>
+        </p:nvPicPr>
+        <p:blipFill>
+          <a:blip r:embed="rId2">
+            <a:extLst>
+              <a:ext uri="{28A0092B-C50C-407E-A947-70E740481C1C}">
+                <a14:useLocalDpi xmlns:a14="http://schemas.microsoft.com/office/drawing/2010/main" val="0"/>
+              </a:ext>
+            </a:extLst>
+          </a:blip>
+          <a:stretch>
+            <a:fillRect/>
+          </a:stretch>
+        </p:blipFill>
+        <p:spPr>
+          <a:xfrm>
+            <a:off x="475247" y="2137806"/>
+            <a:ext cx="1828800" cy="1828800"/>
+          </a:xfrm>
+          <a:prstGeom prst="rect">
+            <a:avLst/>
+          </a:prstGeom>
+        </p:spPr>
+      </p:pic>
+      <p:sp>
+        <p:nvSpPr>
+          <p:cNvPr id="17" name="TextBox 16">
+            <a:extLst>
+              <a:ext uri="{FF2B5EF4-FFF2-40B4-BE49-F238E27FC236}">
+                <a16:creationId xmlns:a16="http://schemas.microsoft.com/office/drawing/2014/main" id="{A26DE9CD-B119-A461-7B12-4CFB20FA6215}"/>
+              </a:ext>
+            </a:extLst>
+          </p:cNvPr>
+          <p:cNvSpPr txBox="1"/>
+          <p:nvPr/>
+        </p:nvSpPr>
+        <p:spPr>
+          <a:xfrm>
+            <a:off x="475248" y="3966606"/>
+            <a:ext cx="1828799" cy="307777"/>
+          </a:xfrm>
+          <a:prstGeom prst="rect">
+            <a:avLst/>
+          </a:prstGeom>
+        </p:spPr>
+        <p:style>
+          <a:lnRef idx="2">
+            <a:schemeClr val="accent1"/>
+          </a:lnRef>
+          <a:fillRef idx="1">
+            <a:schemeClr val="lt1"/>
+          </a:fillRef>
+          <a:effectRef idx="0">
+            <a:schemeClr val="accent1"/>
+          </a:effectRef>
+          <a:fontRef idx="minor">
+            <a:schemeClr val="dk1"/>
+          </a:fontRef>
+        </p:style>
+        <p:txBody>
+          <a:bodyPr wrap="square" rtlCol="0">
+            <a:spAutoFit/>
+          </a:bodyPr>
+          <a:lstStyle/>
+          <a:p>
+            <a:pPr algn="ctr"/>
+            <a:r>
+              <a:rPr lang="en-US" sz="1400" dirty="0"/>
+              <a:t>Class 0 - A</a:t>
+            </a:r>
+          </a:p>
+        </p:txBody>
+      </p:sp>
+      <p:sp>
+        <p:nvSpPr>
+          <p:cNvPr id="19" name="TextBox 18">
+            <a:extLst>
+              <a:ext uri="{FF2B5EF4-FFF2-40B4-BE49-F238E27FC236}">
+                <a16:creationId xmlns:a16="http://schemas.microsoft.com/office/drawing/2014/main" id="{6F531611-1C70-AFDD-6975-9AEED6F4336B}"/>
+              </a:ext>
+            </a:extLst>
+          </p:cNvPr>
+          <p:cNvSpPr txBox="1"/>
+          <p:nvPr/>
+        </p:nvSpPr>
+        <p:spPr>
+          <a:xfrm>
+            <a:off x="2828424" y="6256503"/>
+            <a:ext cx="1828799" cy="307777"/>
+          </a:xfrm>
+          <a:prstGeom prst="rect">
+            <a:avLst/>
+          </a:prstGeom>
+        </p:spPr>
+        <p:style>
+          <a:lnRef idx="2">
+            <a:schemeClr val="accent1"/>
+          </a:lnRef>
+          <a:fillRef idx="1">
+            <a:schemeClr val="lt1"/>
+          </a:fillRef>
+          <a:effectRef idx="0">
+            <a:schemeClr val="accent1"/>
+          </a:effectRef>
+          <a:fontRef idx="minor">
+            <a:schemeClr val="dk1"/>
+          </a:fontRef>
+        </p:style>
+        <p:txBody>
+          <a:bodyPr wrap="square" rtlCol="0">
+            <a:spAutoFit/>
+          </a:bodyPr>
+          <a:lstStyle/>
+          <a:p>
+            <a:pPr algn="ctr"/>
+            <a:r>
+              <a:rPr lang="en-US" sz="1400" dirty="0"/>
+              <a:t>Class 25 - Z</a:t>
+            </a:r>
+          </a:p>
+        </p:txBody>
+      </p:sp>
+      <p:sp>
+        <p:nvSpPr>
+          <p:cNvPr id="21" name="TextBox 20">
+            <a:extLst>
+              <a:ext uri="{FF2B5EF4-FFF2-40B4-BE49-F238E27FC236}">
+                <a16:creationId xmlns:a16="http://schemas.microsoft.com/office/drawing/2014/main" id="{DB6684A9-1F03-53FE-95F2-7ADD5009EE5B}"/>
+              </a:ext>
+            </a:extLst>
+          </p:cNvPr>
+          <p:cNvSpPr txBox="1"/>
+          <p:nvPr/>
+        </p:nvSpPr>
+        <p:spPr>
+          <a:xfrm>
+            <a:off x="475248" y="6248679"/>
+            <a:ext cx="1828799" cy="307777"/>
+          </a:xfrm>
+          <a:prstGeom prst="rect">
+            <a:avLst/>
+          </a:prstGeom>
+        </p:spPr>
+        <p:style>
+          <a:lnRef idx="2">
+            <a:schemeClr val="accent1"/>
+          </a:lnRef>
+          <a:fillRef idx="1">
+            <a:schemeClr val="lt1"/>
+          </a:fillRef>
+          <a:effectRef idx="0">
+            <a:schemeClr val="accent1"/>
+          </a:effectRef>
+          <a:fontRef idx="minor">
+            <a:schemeClr val="dk1"/>
+          </a:fontRef>
+        </p:style>
+        <p:txBody>
+          <a:bodyPr wrap="square" rtlCol="0">
+            <a:spAutoFit/>
+          </a:bodyPr>
+          <a:lstStyle/>
+          <a:p>
+            <a:pPr algn="ctr"/>
+            <a:r>
+              <a:rPr lang="en-US" sz="1400" dirty="0"/>
+              <a:t>Class 20 - U</a:t>
+            </a:r>
+          </a:p>
+        </p:txBody>
+      </p:sp>
+      <p:sp>
+        <p:nvSpPr>
+          <p:cNvPr id="23" name="TextBox 22">
+            <a:extLst>
+              <a:ext uri="{FF2B5EF4-FFF2-40B4-BE49-F238E27FC236}">
+                <a16:creationId xmlns:a16="http://schemas.microsoft.com/office/drawing/2014/main" id="{5CED6ADC-C4C6-7B1C-A11F-8E4F0C82A3BB}"/>
+              </a:ext>
+            </a:extLst>
+          </p:cNvPr>
+          <p:cNvSpPr txBox="1"/>
+          <p:nvPr/>
+        </p:nvSpPr>
+        <p:spPr>
+          <a:xfrm>
+            <a:off x="9887953" y="3966606"/>
+            <a:ext cx="1828799" cy="307777"/>
+          </a:xfrm>
+          <a:prstGeom prst="rect">
+            <a:avLst/>
+          </a:prstGeom>
+        </p:spPr>
+        <p:style>
+          <a:lnRef idx="2">
+            <a:schemeClr val="accent1"/>
+          </a:lnRef>
+          <a:fillRef idx="1">
+            <a:schemeClr val="lt1"/>
+          </a:fillRef>
+          <a:effectRef idx="0">
+            <a:schemeClr val="accent1"/>
+          </a:effectRef>
+          <a:fontRef idx="minor">
+            <a:schemeClr val="dk1"/>
+          </a:fontRef>
+        </p:style>
+        <p:txBody>
+          <a:bodyPr wrap="square" rtlCol="0">
+            <a:spAutoFit/>
+          </a:bodyPr>
+          <a:lstStyle/>
+          <a:p>
+            <a:pPr algn="ctr"/>
+            <a:r>
+              <a:rPr lang="en-US" sz="1400" dirty="0"/>
+              <a:t>Class 16 - Q</a:t>
+            </a:r>
+          </a:p>
+        </p:txBody>
+      </p:sp>
+      <p:sp>
+        <p:nvSpPr>
+          <p:cNvPr id="25" name="TextBox 24">
+            <a:extLst>
+              <a:ext uri="{FF2B5EF4-FFF2-40B4-BE49-F238E27FC236}">
+                <a16:creationId xmlns:a16="http://schemas.microsoft.com/office/drawing/2014/main" id="{242A1CF3-32FF-12A2-4F6E-39B8F9884E65}"/>
+              </a:ext>
+            </a:extLst>
+          </p:cNvPr>
+          <p:cNvSpPr txBox="1"/>
+          <p:nvPr/>
+        </p:nvSpPr>
+        <p:spPr>
+          <a:xfrm>
+            <a:off x="7534777" y="3958782"/>
+            <a:ext cx="1828799" cy="307777"/>
+          </a:xfrm>
+          <a:prstGeom prst="rect">
+            <a:avLst/>
+          </a:prstGeom>
+        </p:spPr>
+        <p:style>
+          <a:lnRef idx="2">
+            <a:schemeClr val="accent1"/>
+          </a:lnRef>
+          <a:fillRef idx="1">
+            <a:schemeClr val="lt1"/>
+          </a:fillRef>
+          <a:effectRef idx="0">
+            <a:schemeClr val="accent1"/>
+          </a:effectRef>
+          <a:fontRef idx="minor">
+            <a:schemeClr val="dk1"/>
+          </a:fontRef>
+        </p:style>
+        <p:txBody>
+          <a:bodyPr wrap="square" rtlCol="0">
+            <a:spAutoFit/>
+          </a:bodyPr>
+          <a:lstStyle/>
+          <a:p>
+            <a:pPr algn="ctr"/>
+            <a:r>
+              <a:rPr lang="en-US" sz="1400" dirty="0"/>
+              <a:t>Class 11 - L</a:t>
+            </a:r>
+          </a:p>
+        </p:txBody>
+      </p:sp>
+      <p:sp>
+        <p:nvSpPr>
+          <p:cNvPr id="27" name="TextBox 26">
+            <a:extLst>
+              <a:ext uri="{FF2B5EF4-FFF2-40B4-BE49-F238E27FC236}">
+                <a16:creationId xmlns:a16="http://schemas.microsoft.com/office/drawing/2014/main" id="{D65B66B1-6E5C-FD49-597F-8F11901D1A0C}"/>
+              </a:ext>
+            </a:extLst>
+          </p:cNvPr>
+          <p:cNvSpPr txBox="1"/>
+          <p:nvPr/>
+        </p:nvSpPr>
+        <p:spPr>
+          <a:xfrm>
+            <a:off x="9887953" y="6256503"/>
+            <a:ext cx="1828799" cy="307777"/>
+          </a:xfrm>
+          <a:prstGeom prst="rect">
+            <a:avLst/>
+          </a:prstGeom>
+        </p:spPr>
+        <p:style>
+          <a:lnRef idx="2">
+            <a:schemeClr val="accent1"/>
+          </a:lnRef>
+          <a:fillRef idx="1">
+            <a:schemeClr val="lt1"/>
+          </a:fillRef>
+          <a:effectRef idx="0">
+            <a:schemeClr val="accent1"/>
+          </a:effectRef>
+          <a:fontRef idx="minor">
+            <a:schemeClr val="dk1"/>
+          </a:fontRef>
+        </p:style>
+        <p:txBody>
+          <a:bodyPr wrap="square" rtlCol="0">
+            <a:spAutoFit/>
+          </a:bodyPr>
+          <a:lstStyle/>
+          <a:p>
+            <a:pPr algn="ctr"/>
+            <a:r>
+              <a:rPr lang="en-US" sz="1400" dirty="0"/>
+              <a:t>Class 28 - Nothing</a:t>
+            </a:r>
+          </a:p>
+        </p:txBody>
+      </p:sp>
+      <p:sp>
+        <p:nvSpPr>
+          <p:cNvPr id="29" name="TextBox 28">
+            <a:extLst>
+              <a:ext uri="{FF2B5EF4-FFF2-40B4-BE49-F238E27FC236}">
+                <a16:creationId xmlns:a16="http://schemas.microsoft.com/office/drawing/2014/main" id="{8051F739-82B7-AF60-DB6C-9EE4FD005F73}"/>
+              </a:ext>
+            </a:extLst>
+          </p:cNvPr>
+          <p:cNvSpPr txBox="1"/>
+          <p:nvPr/>
+        </p:nvSpPr>
+        <p:spPr>
+          <a:xfrm>
+            <a:off x="7534777" y="6248679"/>
+            <a:ext cx="1828799" cy="338554"/>
+          </a:xfrm>
+          <a:prstGeom prst="rect">
+            <a:avLst/>
+          </a:prstGeom>
+        </p:spPr>
+        <p:style>
+          <a:lnRef idx="2">
+            <a:schemeClr val="accent1"/>
+          </a:lnRef>
+          <a:fillRef idx="1">
+            <a:schemeClr val="lt1"/>
+          </a:fillRef>
+          <a:effectRef idx="0">
+            <a:schemeClr val="accent1"/>
+          </a:effectRef>
+          <a:fontRef idx="minor">
+            <a:schemeClr val="dk1"/>
+          </a:fontRef>
+        </p:style>
+        <p:txBody>
+          <a:bodyPr wrap="square" rtlCol="0">
+            <a:spAutoFit/>
+          </a:bodyPr>
+          <a:lstStyle/>
+          <a:p>
+            <a:pPr algn="ctr"/>
+            <a:r>
+              <a:rPr lang="en-US" sz="1600" dirty="0"/>
+              <a:t>Class 27 - Delete</a:t>
+            </a:r>
+          </a:p>
+        </p:txBody>
+      </p:sp>
+      <p:pic>
+        <p:nvPicPr>
+          <p:cNvPr id="31" name="Picture 30">
+            <a:extLst>
+              <a:ext uri="{FF2B5EF4-FFF2-40B4-BE49-F238E27FC236}">
+                <a16:creationId xmlns:a16="http://schemas.microsoft.com/office/drawing/2014/main" id="{132A374C-3D18-C0A5-2DD4-02058C11CBD1}"/>
+              </a:ext>
+            </a:extLst>
+          </p:cNvPr>
+          <p:cNvPicPr>
+            <a:picLocks noChangeAspect="1"/>
+          </p:cNvPicPr>
+          <p:nvPr/>
+        </p:nvPicPr>
+        <p:blipFill>
+          <a:blip r:embed="rId3">
+            <a:extLst>
+              <a:ext uri="{28A0092B-C50C-407E-A947-70E740481C1C}">
+                <a14:useLocalDpi xmlns:a14="http://schemas.microsoft.com/office/drawing/2010/main" val="0"/>
+              </a:ext>
+            </a:extLst>
+          </a:blip>
+          <a:stretch>
+            <a:fillRect/>
+          </a:stretch>
+        </p:blipFill>
+        <p:spPr>
+          <a:xfrm>
+            <a:off x="5181599" y="4427703"/>
+            <a:ext cx="1828800" cy="1828800"/>
+          </a:xfrm>
+          <a:prstGeom prst="rect">
+            <a:avLst/>
+          </a:prstGeom>
+        </p:spPr>
+      </p:pic>
+      <p:pic>
+        <p:nvPicPr>
+          <p:cNvPr id="33" name="Picture 32">
+            <a:extLst>
+              <a:ext uri="{FF2B5EF4-FFF2-40B4-BE49-F238E27FC236}">
+                <a16:creationId xmlns:a16="http://schemas.microsoft.com/office/drawing/2014/main" id="{12476E05-142B-9C6F-CEBD-453C0D013090}"/>
+              </a:ext>
+            </a:extLst>
+          </p:cNvPr>
+          <p:cNvPicPr>
+            <a:picLocks noChangeAspect="1"/>
+          </p:cNvPicPr>
+          <p:nvPr/>
+        </p:nvPicPr>
+        <p:blipFill>
+          <a:blip r:embed="rId4">
+            <a:extLst>
+              <a:ext uri="{28A0092B-C50C-407E-A947-70E740481C1C}">
+                <a14:useLocalDpi xmlns:a14="http://schemas.microsoft.com/office/drawing/2010/main" val="0"/>
+              </a:ext>
+            </a:extLst>
+          </a:blip>
+          <a:stretch>
+            <a:fillRect/>
+          </a:stretch>
+        </p:blipFill>
+        <p:spPr>
+          <a:xfrm>
+            <a:off x="7534776" y="4427703"/>
+            <a:ext cx="1828800" cy="1828800"/>
+          </a:xfrm>
+          <a:prstGeom prst="rect">
+            <a:avLst/>
+          </a:prstGeom>
+        </p:spPr>
+      </p:pic>
+      <p:pic>
+        <p:nvPicPr>
+          <p:cNvPr id="35" name="Picture 34">
+            <a:extLst>
+              <a:ext uri="{FF2B5EF4-FFF2-40B4-BE49-F238E27FC236}">
+                <a16:creationId xmlns:a16="http://schemas.microsoft.com/office/drawing/2014/main" id="{E065663D-552E-4F43-7E73-DD7C07BAA0A5}"/>
+              </a:ext>
+            </a:extLst>
+          </p:cNvPr>
+          <p:cNvPicPr>
+            <a:picLocks noChangeAspect="1"/>
+          </p:cNvPicPr>
+          <p:nvPr/>
+        </p:nvPicPr>
+        <p:blipFill>
+          <a:blip r:embed="rId5">
+            <a:extLst>
+              <a:ext uri="{28A0092B-C50C-407E-A947-70E740481C1C}">
+                <a14:useLocalDpi xmlns:a14="http://schemas.microsoft.com/office/drawing/2010/main" val="0"/>
+              </a:ext>
+            </a:extLst>
+          </a:blip>
+          <a:stretch>
+            <a:fillRect/>
+          </a:stretch>
+        </p:blipFill>
+        <p:spPr>
+          <a:xfrm>
+            <a:off x="9887952" y="4427703"/>
+            <a:ext cx="1828800" cy="1828800"/>
+          </a:xfrm>
+          <a:prstGeom prst="rect">
+            <a:avLst/>
+          </a:prstGeom>
+        </p:spPr>
+      </p:pic>
+      <p:pic>
+        <p:nvPicPr>
+          <p:cNvPr id="37" name="Picture 36">
+            <a:extLst>
+              <a:ext uri="{FF2B5EF4-FFF2-40B4-BE49-F238E27FC236}">
+                <a16:creationId xmlns:a16="http://schemas.microsoft.com/office/drawing/2014/main" id="{FA865D49-FF5C-330B-5FDC-DC2E489ACC3B}"/>
+              </a:ext>
+            </a:extLst>
+          </p:cNvPr>
+          <p:cNvPicPr>
+            <a:picLocks noChangeAspect="1"/>
+          </p:cNvPicPr>
+          <p:nvPr/>
+        </p:nvPicPr>
+        <p:blipFill>
+          <a:blip r:embed="rId6">
+            <a:extLst>
+              <a:ext uri="{28A0092B-C50C-407E-A947-70E740481C1C}">
+                <a14:useLocalDpi xmlns:a14="http://schemas.microsoft.com/office/drawing/2010/main" val="0"/>
+              </a:ext>
+            </a:extLst>
+          </a:blip>
+          <a:stretch>
+            <a:fillRect/>
+          </a:stretch>
+        </p:blipFill>
+        <p:spPr>
+          <a:xfrm>
+            <a:off x="2828423" y="2145630"/>
+            <a:ext cx="1828800" cy="1828800"/>
+          </a:xfrm>
+          <a:prstGeom prst="rect">
+            <a:avLst/>
+          </a:prstGeom>
+        </p:spPr>
+      </p:pic>
+      <p:pic>
+        <p:nvPicPr>
+          <p:cNvPr id="39" name="Picture 38">
+            <a:extLst>
+              <a:ext uri="{FF2B5EF4-FFF2-40B4-BE49-F238E27FC236}">
+                <a16:creationId xmlns:a16="http://schemas.microsoft.com/office/drawing/2014/main" id="{0DD926E1-0DB8-4B66-4D66-D7B97F36EB7C}"/>
+              </a:ext>
+            </a:extLst>
+          </p:cNvPr>
+          <p:cNvPicPr>
+            <a:picLocks noChangeAspect="1"/>
+          </p:cNvPicPr>
+          <p:nvPr/>
+        </p:nvPicPr>
+        <p:blipFill>
+          <a:blip r:embed="rId7">
+            <a:extLst>
+              <a:ext uri="{28A0092B-C50C-407E-A947-70E740481C1C}">
+                <a14:useLocalDpi xmlns:a14="http://schemas.microsoft.com/office/drawing/2010/main" val="0"/>
+              </a:ext>
+            </a:extLst>
+          </a:blip>
+          <a:stretch>
+            <a:fillRect/>
+          </a:stretch>
+        </p:blipFill>
+        <p:spPr>
+          <a:xfrm>
+            <a:off x="5181599" y="2137806"/>
+            <a:ext cx="1828800" cy="1828800"/>
+          </a:xfrm>
+          <a:prstGeom prst="rect">
+            <a:avLst/>
+          </a:prstGeom>
+        </p:spPr>
+      </p:pic>
+      <p:pic>
+        <p:nvPicPr>
+          <p:cNvPr id="41" name="Picture 40">
+            <a:extLst>
+              <a:ext uri="{FF2B5EF4-FFF2-40B4-BE49-F238E27FC236}">
+                <a16:creationId xmlns:a16="http://schemas.microsoft.com/office/drawing/2014/main" id="{806EB2C8-4949-ED23-4340-16636FF9596C}"/>
+              </a:ext>
+            </a:extLst>
+          </p:cNvPr>
+          <p:cNvPicPr>
+            <a:picLocks noChangeAspect="1"/>
+          </p:cNvPicPr>
+          <p:nvPr/>
+        </p:nvPicPr>
+        <p:blipFill>
+          <a:blip r:embed="rId8">
+            <a:extLst>
+              <a:ext uri="{28A0092B-C50C-407E-A947-70E740481C1C}">
+                <a14:useLocalDpi xmlns:a14="http://schemas.microsoft.com/office/drawing/2010/main" val="0"/>
+              </a:ext>
+            </a:extLst>
+          </a:blip>
+          <a:stretch>
+            <a:fillRect/>
+          </a:stretch>
+        </p:blipFill>
+        <p:spPr>
+          <a:xfrm>
+            <a:off x="7534776" y="2129982"/>
+            <a:ext cx="1828800" cy="1828800"/>
+          </a:xfrm>
+          <a:prstGeom prst="rect">
+            <a:avLst/>
+          </a:prstGeom>
+        </p:spPr>
+      </p:pic>
+      <p:pic>
+        <p:nvPicPr>
+          <p:cNvPr id="43" name="Picture 42">
+            <a:extLst>
+              <a:ext uri="{FF2B5EF4-FFF2-40B4-BE49-F238E27FC236}">
+                <a16:creationId xmlns:a16="http://schemas.microsoft.com/office/drawing/2014/main" id="{2C55028C-0A81-8F1F-60A1-90F8D386ABE2}"/>
+              </a:ext>
+            </a:extLst>
+          </p:cNvPr>
+          <p:cNvPicPr>
+            <a:picLocks noChangeAspect="1"/>
+          </p:cNvPicPr>
+          <p:nvPr/>
+        </p:nvPicPr>
+        <p:blipFill>
+          <a:blip r:embed="rId9">
+            <a:extLst>
+              <a:ext uri="{28A0092B-C50C-407E-A947-70E740481C1C}">
+                <a14:useLocalDpi xmlns:a14="http://schemas.microsoft.com/office/drawing/2010/main" val="0"/>
+              </a:ext>
+            </a:extLst>
+          </a:blip>
+          <a:stretch>
+            <a:fillRect/>
+          </a:stretch>
+        </p:blipFill>
+        <p:spPr>
+          <a:xfrm>
+            <a:off x="2828423" y="4419879"/>
+            <a:ext cx="1828800" cy="1828800"/>
+          </a:xfrm>
+          <a:prstGeom prst="rect">
+            <a:avLst/>
+          </a:prstGeom>
+        </p:spPr>
+      </p:pic>
+      <p:pic>
+        <p:nvPicPr>
+          <p:cNvPr id="45" name="Picture 44">
+            <a:extLst>
+              <a:ext uri="{FF2B5EF4-FFF2-40B4-BE49-F238E27FC236}">
+                <a16:creationId xmlns:a16="http://schemas.microsoft.com/office/drawing/2014/main" id="{73D2D955-60AE-AC0A-38D6-4F53D551BCA9}"/>
+              </a:ext>
+            </a:extLst>
+          </p:cNvPr>
+          <p:cNvPicPr>
+            <a:picLocks noChangeAspect="1"/>
+          </p:cNvPicPr>
+          <p:nvPr/>
+        </p:nvPicPr>
+        <p:blipFill>
+          <a:blip r:embed="rId10">
+            <a:extLst>
+              <a:ext uri="{28A0092B-C50C-407E-A947-70E740481C1C}">
+                <a14:useLocalDpi xmlns:a14="http://schemas.microsoft.com/office/drawing/2010/main" val="0"/>
+              </a:ext>
+            </a:extLst>
+          </a:blip>
+          <a:stretch>
+            <a:fillRect/>
+          </a:stretch>
+        </p:blipFill>
+        <p:spPr>
+          <a:xfrm>
+            <a:off x="475247" y="4419879"/>
+            <a:ext cx="1828800" cy="1828800"/>
+          </a:xfrm>
+          <a:prstGeom prst="rect">
+            <a:avLst/>
+          </a:prstGeom>
+        </p:spPr>
+      </p:pic>
+      <p:pic>
+        <p:nvPicPr>
+          <p:cNvPr id="47" name="Picture 46">
+            <a:extLst>
+              <a:ext uri="{FF2B5EF4-FFF2-40B4-BE49-F238E27FC236}">
+                <a16:creationId xmlns:a16="http://schemas.microsoft.com/office/drawing/2014/main" id="{F282A874-1F5E-648E-DDBE-4B66D940C560}"/>
+              </a:ext>
+            </a:extLst>
+          </p:cNvPr>
+          <p:cNvPicPr>
+            <a:picLocks noChangeAspect="1"/>
+          </p:cNvPicPr>
+          <p:nvPr/>
+        </p:nvPicPr>
+        <p:blipFill>
+          <a:blip r:embed="rId11">
+            <a:extLst>
+              <a:ext uri="{28A0092B-C50C-407E-A947-70E740481C1C}">
+                <a14:useLocalDpi xmlns:a14="http://schemas.microsoft.com/office/drawing/2010/main" val="0"/>
+              </a:ext>
+            </a:extLst>
+          </a:blip>
+          <a:stretch>
+            <a:fillRect/>
+          </a:stretch>
+        </p:blipFill>
+        <p:spPr>
+          <a:xfrm>
+            <a:off x="9887952" y="2145630"/>
+            <a:ext cx="1828800" cy="1828800"/>
+          </a:xfrm>
+          <a:prstGeom prst="rect">
+            <a:avLst/>
+          </a:prstGeom>
+        </p:spPr>
+      </p:pic>
+    </p:spTree>
+    <p:extLst>
+      <p:ext uri="{BB962C8B-B14F-4D97-AF65-F5344CB8AC3E}">
+        <p14:creationId xmlns:p14="http://schemas.microsoft.com/office/powerpoint/2010/main" val="3014366601"/>
+      </p:ext>
+    </p:extLst>
+  </p:cSld>
+  <p:clrMapOvr>
+    <a:masterClrMapping/>
+  </p:clrMapOvr>
+</p:sld>
+</file>
+
+<file path=ppt/slides/slide7.xml><?xml version="1.0" encoding="utf-8"?>
+<p:sld xmlns:a="http://schemas.openxmlformats.org/drawingml/2006/main" xmlns:r="http://schemas.openxmlformats.org/officeDocument/2006/relationships" xmlns:p="http://schemas.openxmlformats.org/presentationml/2006/main">
+  <p:cSld>
+    <p:spTree>
+      <p:nvGrpSpPr>
+        <p:cNvPr id="1" name=""/>
+        <p:cNvGrpSpPr/>
+        <p:nvPr/>
+      </p:nvGrpSpPr>
+      <p:grpSpPr>
+        <a:xfrm>
+          <a:off x="0" y="0"/>
+          <a:ext cx="0" cy="0"/>
+          <a:chOff x="0" y="0"/>
+          <a:chExt cx="0" cy="0"/>
+        </a:xfrm>
+      </p:grpSpPr>
+      <p:sp>
+        <p:nvSpPr>
+          <p:cNvPr id="2" name="Title 1">
+            <a:extLst>
+              <a:ext uri="{FF2B5EF4-FFF2-40B4-BE49-F238E27FC236}">
+                <a16:creationId xmlns:a16="http://schemas.microsoft.com/office/drawing/2014/main" id="{7CC55D19-78EF-2A2C-D779-6B88B9C93B0B}"/>
+              </a:ext>
+            </a:extLst>
+          </p:cNvPr>
+          <p:cNvSpPr>
+            <a:spLocks noGrp="1"/>
+          </p:cNvSpPr>
+          <p:nvPr>
+            <p:ph type="title"/>
+          </p:nvPr>
+        </p:nvSpPr>
+        <p:spPr/>
+        <p:txBody>
+          <a:bodyPr/>
+          <a:lstStyle/>
+          <a:p>
+            <a:r>
+              <a:rPr lang="en-US" dirty="0"/>
+              <a:t>Preprocessing Procedures</a:t>
+            </a:r>
+          </a:p>
+        </p:txBody>
+      </p:sp>
+      <p:sp>
+        <p:nvSpPr>
+          <p:cNvPr id="3" name="Content Placeholder 2">
+            <a:extLst>
+              <a:ext uri="{FF2B5EF4-FFF2-40B4-BE49-F238E27FC236}">
+                <a16:creationId xmlns:a16="http://schemas.microsoft.com/office/drawing/2014/main" id="{4C1D2451-131B-2E4F-F0D9-C7096824E5D1}"/>
+              </a:ext>
+            </a:extLst>
+          </p:cNvPr>
+          <p:cNvSpPr>
+            <a:spLocks noGrp="1"/>
+          </p:cNvSpPr>
+          <p:nvPr>
+            <p:ph idx="1"/>
+          </p:nvPr>
+        </p:nvSpPr>
+        <p:spPr/>
+        <p:txBody>
+          <a:bodyPr/>
+          <a:lstStyle/>
+          <a:p>
+            <a:endParaRPr lang="en-US"/>
+          </a:p>
+        </p:txBody>
+      </p:sp>
+    </p:spTree>
+    <p:extLst>
+      <p:ext uri="{BB962C8B-B14F-4D97-AF65-F5344CB8AC3E}">
+        <p14:creationId xmlns:p14="http://schemas.microsoft.com/office/powerpoint/2010/main" val="1775598690"/>
       </p:ext>
     </p:extLst>
   </p:cSld>

</xml_diff>

<commit_message>
Added some slides on cropping and rescaling
</commit_message>
<xml_diff>
--- a/milestones/BUELL_ENGR6970_Milestone04.pptx
+++ b/milestones/BUELL_ENGR6970_Milestone04.pptx
@@ -12,6 +12,9 @@
     <p:sldId id="259" r:id="rId6"/>
     <p:sldId id="261" r:id="rId7"/>
     <p:sldId id="262" r:id="rId8"/>
+    <p:sldId id="263" r:id="rId9"/>
+    <p:sldId id="264" r:id="rId10"/>
+    <p:sldId id="265" r:id="rId11"/>
   </p:sldIdLst>
   <p:sldSz cx="12192000" cy="6858000"/>
   <p:notesSz cx="6858000" cy="9144000"/>
@@ -213,7 +216,7 @@
           <a:effectLst/>
           <a:extLst>
             <a:ext uri="{91240B29-F687-4f45-9708-019B960494DF}">
-              <a14:hiddenLine xmlns:a14="http://schemas.microsoft.com/office/drawing/2010/main" xmlns="" w="9525">
+              <a14:hiddenLine xmlns="" xmlns:a14="http://schemas.microsoft.com/office/drawing/2010/main" w="9525">
                 <a:solidFill>
                   <a:srgbClr val="000000"/>
                 </a:solidFill>
@@ -1735,7 +1738,7 @@
           <a:ln/>
           <a:extLst>
             <a:ext uri="{91240B29-F687-4f45-9708-019B960494DF}">
-              <a14:hiddenLine xmlns:a14="http://schemas.microsoft.com/office/drawing/2010/main" xmlns="" w="9525">
+              <a14:hiddenLine xmlns="" xmlns:a14="http://schemas.microsoft.com/office/drawing/2010/main" w="9525">
                 <a:solidFill>
                   <a:srgbClr val="000000"/>
                 </a:solidFill>
@@ -2010,7 +2013,7 @@
           <a:ln/>
           <a:extLst>
             <a:ext uri="{91240B29-F687-4f45-9708-019B960494DF}">
-              <a14:hiddenLine xmlns:a14="http://schemas.microsoft.com/office/drawing/2010/main" xmlns="" w="9525">
+              <a14:hiddenLine xmlns="" xmlns:a14="http://schemas.microsoft.com/office/drawing/2010/main" w="9525">
                 <a:solidFill>
                   <a:srgbClr val="000000"/>
                 </a:solidFill>
@@ -2293,7 +2296,7 @@
           <a:ln/>
           <a:extLst>
             <a:ext uri="{91240B29-F687-4f45-9708-019B960494DF}">
-              <a14:hiddenLine xmlns:a14="http://schemas.microsoft.com/office/drawing/2010/main" xmlns="" w="9525">
+              <a14:hiddenLine xmlns="" xmlns:a14="http://schemas.microsoft.com/office/drawing/2010/main" w="9525">
                 <a:solidFill>
                   <a:srgbClr val="000000"/>
                 </a:solidFill>
@@ -2919,7 +2922,7 @@
           <a:ln/>
           <a:extLst>
             <a:ext uri="{91240B29-F687-4f45-9708-019B960494DF}">
-              <a14:hiddenLine xmlns:a14="http://schemas.microsoft.com/office/drawing/2010/main" xmlns="" w="9525">
+              <a14:hiddenLine xmlns="" xmlns:a14="http://schemas.microsoft.com/office/drawing/2010/main" w="9525">
                 <a:solidFill>
                   <a:srgbClr val="000000"/>
                 </a:solidFill>
@@ -3258,7 +3261,7 @@
           <a:ln/>
           <a:extLst>
             <a:ext uri="{91240B29-F687-4f45-9708-019B960494DF}">
-              <a14:hiddenLine xmlns:a14="http://schemas.microsoft.com/office/drawing/2010/main" xmlns="" w="9525">
+              <a14:hiddenLine xmlns="" xmlns:a14="http://schemas.microsoft.com/office/drawing/2010/main" w="9525">
                 <a:solidFill>
                   <a:srgbClr val="000000"/>
                 </a:solidFill>
@@ -3735,7 +3738,7 @@
           <a:ln/>
           <a:extLst>
             <a:ext uri="{91240B29-F687-4f45-9708-019B960494DF}">
-              <a14:hiddenLine xmlns:a14="http://schemas.microsoft.com/office/drawing/2010/main" xmlns="" w="9525">
+              <a14:hiddenLine xmlns="" xmlns:a14="http://schemas.microsoft.com/office/drawing/2010/main" w="9525">
                 <a:solidFill>
                   <a:srgbClr val="000000"/>
                 </a:solidFill>
@@ -4164,7 +4167,7 @@
           <a:ln/>
           <a:extLst>
             <a:ext uri="{91240B29-F687-4f45-9708-019B960494DF}">
-              <a14:hiddenLine xmlns:a14="http://schemas.microsoft.com/office/drawing/2010/main" xmlns="" w="9525">
+              <a14:hiddenLine xmlns="" xmlns:a14="http://schemas.microsoft.com/office/drawing/2010/main" w="9525">
                 <a:solidFill>
                   <a:srgbClr val="000000"/>
                 </a:solidFill>
@@ -5471,6 +5474,86 @@
 </p:sld>
 </file>
 
+<file path=ppt/slides/slide10.xml><?xml version="1.0" encoding="utf-8"?>
+<p:sld xmlns:a="http://schemas.openxmlformats.org/drawingml/2006/main" xmlns:r="http://schemas.openxmlformats.org/officeDocument/2006/relationships" xmlns:p="http://schemas.openxmlformats.org/presentationml/2006/main">
+  <p:cSld>
+    <p:spTree>
+      <p:nvGrpSpPr>
+        <p:cNvPr id="1" name=""/>
+        <p:cNvGrpSpPr/>
+        <p:nvPr/>
+      </p:nvGrpSpPr>
+      <p:grpSpPr>
+        <a:xfrm>
+          <a:off x="0" y="0"/>
+          <a:ext cx="0" cy="0"/>
+          <a:chOff x="0" y="0"/>
+          <a:chExt cx="0" cy="0"/>
+        </a:xfrm>
+      </p:grpSpPr>
+      <p:sp>
+        <p:nvSpPr>
+          <p:cNvPr id="2" name="Title 1">
+            <a:extLst>
+              <a:ext uri="{FF2B5EF4-FFF2-40B4-BE49-F238E27FC236}">
+                <a16:creationId xmlns:a16="http://schemas.microsoft.com/office/drawing/2014/main" id="{9C9D0EFC-BFFC-5BD9-4988-6298276BA100}"/>
+              </a:ext>
+            </a:extLst>
+          </p:cNvPr>
+          <p:cNvSpPr>
+            <a:spLocks noGrp="1"/>
+          </p:cNvSpPr>
+          <p:nvPr>
+            <p:ph type="title"/>
+          </p:nvPr>
+        </p:nvSpPr>
+        <p:spPr/>
+        <p:txBody>
+          <a:bodyPr/>
+          <a:lstStyle/>
+          <a:p>
+            <a:endParaRPr lang="en-US"/>
+          </a:p>
+        </p:txBody>
+      </p:sp>
+      <p:sp>
+        <p:nvSpPr>
+          <p:cNvPr id="3" name="Content Placeholder 2">
+            <a:extLst>
+              <a:ext uri="{FF2B5EF4-FFF2-40B4-BE49-F238E27FC236}">
+                <a16:creationId xmlns:a16="http://schemas.microsoft.com/office/drawing/2014/main" id="{436BDD20-EF83-D1CE-1A11-3EAFB9D14C2C}"/>
+              </a:ext>
+            </a:extLst>
+          </p:cNvPr>
+          <p:cNvSpPr>
+            <a:spLocks noGrp="1"/>
+          </p:cNvSpPr>
+          <p:nvPr>
+            <p:ph idx="1"/>
+          </p:nvPr>
+        </p:nvSpPr>
+        <p:spPr/>
+        <p:txBody>
+          <a:bodyPr/>
+          <a:lstStyle/>
+          <a:p>
+            <a:endParaRPr lang="en-US" dirty="0"/>
+          </a:p>
+        </p:txBody>
+      </p:sp>
+    </p:spTree>
+    <p:extLst>
+      <p:ext uri="{BB962C8B-B14F-4D97-AF65-F5344CB8AC3E}">
+        <p14:creationId xmlns:p14="http://schemas.microsoft.com/office/powerpoint/2010/main" val="2893577354"/>
+      </p:ext>
+    </p:extLst>
+  </p:cSld>
+  <p:clrMapOvr>
+    <a:masterClrMapping/>
+  </p:clrMapOvr>
+</p:sld>
+</file>
+
 <file path=ppt/slides/slide2.xml><?xml version="1.0" encoding="utf-8"?>
 <p:sld xmlns:a="http://schemas.openxmlformats.org/drawingml/2006/main" xmlns:r="http://schemas.openxmlformats.org/officeDocument/2006/relationships" xmlns:p="http://schemas.openxmlformats.org/presentationml/2006/main">
   <p:cSld>
@@ -5955,7 +6038,7 @@
           <a:p>
             <a:r>
               <a:rPr lang="en-US" dirty="0"/>
-              <a:t>To provide a proof-of-concept, we train an image classifier neural network to recognize characters from the ASL alphabet</a:t>
+              <a:t>We train an image classifier neural network to recognize characters from the ASL alphabet</a:t>
             </a:r>
           </a:p>
           <a:p>
@@ -6069,6 +6152,15 @@
             <a:r>
               <a:rPr lang="en-US" dirty="0"/>
               <a:t>We have acquired a large library of 87,000 images that cover 29 unique classes</a:t>
+            </a:r>
+          </a:p>
+          <a:p>
+            <a:endParaRPr lang="en-US" dirty="0"/>
+          </a:p>
+          <a:p>
+            <a:r>
+              <a:rPr lang="en-US" dirty="0"/>
+              <a:t>Each image is 256 pixels x 256 pixels x 3 channels</a:t>
             </a:r>
           </a:p>
           <a:p>
@@ -7076,7 +7168,7 @@
           <a:p>
             <a:r>
               <a:rPr lang="en-US" dirty="0"/>
-              <a:t>Preprocessing Procedures</a:t>
+              <a:t>Preprocessing – Remove Padding</a:t>
             </a:r>
           </a:p>
         </p:txBody>
@@ -7094,15 +7186,90 @@
             <a:spLocks noGrp="1"/>
           </p:cNvSpPr>
           <p:nvPr>
-            <p:ph idx="1"/>
-          </p:nvPr>
-        </p:nvSpPr>
-        <p:spPr/>
-        <p:txBody>
-          <a:bodyPr/>
-          <a:lstStyle/>
-          <a:p>
-            <a:endParaRPr lang="en-US"/>
+            <p:ph sz="half" idx="1"/>
+          </p:nvPr>
+        </p:nvSpPr>
+        <p:spPr>
+          <a:xfrm>
+            <a:off x="818712" y="2222287"/>
+            <a:ext cx="7850041" cy="3638763"/>
+          </a:xfrm>
+        </p:spPr>
+        <p:txBody>
+          <a:bodyPr>
+            <a:normAutofit/>
+          </a:bodyPr>
+          <a:lstStyle/>
+          <a:p>
+            <a:r>
+              <a:rPr lang="en-US" dirty="0"/>
+              <a:t>Every image is padded by a blue border. </a:t>
+            </a:r>
+          </a:p>
+          <a:p>
+            <a:r>
+              <a:rPr lang="en-US" dirty="0"/>
+              <a:t>This provides unneeded information that does not vary with each class</a:t>
+            </a:r>
+          </a:p>
+          <a:p>
+            <a:r>
+              <a:rPr lang="en-US" dirty="0"/>
+              <a:t>We choose to crop out 8 pixels from every edge of the image</a:t>
+            </a:r>
+          </a:p>
+          <a:p>
+            <a:r>
+              <a:rPr lang="en-US" dirty="0"/>
+              <a:t>This removes information that is not useful for discriminating classes, and preserves key information in the center of the image</a:t>
+            </a:r>
+          </a:p>
+          <a:p>
+            <a:r>
+              <a:rPr lang="en-US" dirty="0"/>
+              <a:t>Added benefit of reducing the size of the classifiers input/feature-space</a:t>
+            </a:r>
+          </a:p>
+          <a:p>
+            <a:r>
+              <a:rPr lang="en-US" dirty="0"/>
+              <a:t>Image size: 200 x 200 x 3 to 184 x 184 x 3</a:t>
+            </a:r>
+          </a:p>
+        </p:txBody>
+      </p:sp>
+      <p:sp>
+        <p:nvSpPr>
+          <p:cNvPr id="4" name="Content Placeholder 3">
+            <a:extLst>
+              <a:ext uri="{FF2B5EF4-FFF2-40B4-BE49-F238E27FC236}">
+                <a16:creationId xmlns:a16="http://schemas.microsoft.com/office/drawing/2014/main" id="{D2350425-554E-42DE-1278-7929BE5E4FCF}"/>
+              </a:ext>
+            </a:extLst>
+          </p:cNvPr>
+          <p:cNvSpPr>
+            <a:spLocks noGrp="1"/>
+          </p:cNvSpPr>
+          <p:nvPr>
+            <p:ph sz="half" idx="2"/>
+          </p:nvPr>
+        </p:nvSpPr>
+        <p:spPr>
+          <a:xfrm>
+            <a:off x="9105355" y="2223958"/>
+            <a:ext cx="2743200" cy="3657600"/>
+          </a:xfrm>
+        </p:spPr>
+        <p:txBody>
+          <a:bodyPr>
+            <a:normAutofit/>
+          </a:bodyPr>
+          <a:lstStyle/>
+          <a:p>
+            <a:r>
+              <a:rPr lang="en-US" dirty="0"/>
+              <a:t>TODO: before &amp; after cropping</a:t>
+            </a:r>
           </a:p>
         </p:txBody>
       </p:sp>
@@ -7110,6 +7277,256 @@
     <p:extLst>
       <p:ext uri="{BB962C8B-B14F-4D97-AF65-F5344CB8AC3E}">
         <p14:creationId xmlns:p14="http://schemas.microsoft.com/office/powerpoint/2010/main" val="1775598690"/>
+      </p:ext>
+    </p:extLst>
+  </p:cSld>
+  <p:clrMapOvr>
+    <a:masterClrMapping/>
+  </p:clrMapOvr>
+</p:sld>
+</file>
+
+<file path=ppt/slides/slide8.xml><?xml version="1.0" encoding="utf-8"?>
+<p:sld xmlns:a="http://schemas.openxmlformats.org/drawingml/2006/main" xmlns:r="http://schemas.openxmlformats.org/officeDocument/2006/relationships" xmlns:p="http://schemas.openxmlformats.org/presentationml/2006/main">
+  <p:cSld>
+    <p:spTree>
+      <p:nvGrpSpPr>
+        <p:cNvPr id="1" name=""/>
+        <p:cNvGrpSpPr/>
+        <p:nvPr/>
+      </p:nvGrpSpPr>
+      <p:grpSpPr>
+        <a:xfrm>
+          <a:off x="0" y="0"/>
+          <a:ext cx="0" cy="0"/>
+          <a:chOff x="0" y="0"/>
+          <a:chExt cx="0" cy="0"/>
+        </a:xfrm>
+      </p:grpSpPr>
+      <p:sp>
+        <p:nvSpPr>
+          <p:cNvPr id="2" name="Title 1">
+            <a:extLst>
+              <a:ext uri="{FF2B5EF4-FFF2-40B4-BE49-F238E27FC236}">
+                <a16:creationId xmlns:a16="http://schemas.microsoft.com/office/drawing/2014/main" id="{7CC55D19-78EF-2A2C-D779-6B88B9C93B0B}"/>
+              </a:ext>
+            </a:extLst>
+          </p:cNvPr>
+          <p:cNvSpPr>
+            <a:spLocks noGrp="1"/>
+          </p:cNvSpPr>
+          <p:nvPr>
+            <p:ph type="title"/>
+          </p:nvPr>
+        </p:nvSpPr>
+        <p:spPr/>
+        <p:txBody>
+          <a:bodyPr/>
+          <a:lstStyle/>
+          <a:p>
+            <a:r>
+              <a:rPr lang="en-US" dirty="0"/>
+              <a:t>Preprocessing – Rescaling</a:t>
+            </a:r>
+          </a:p>
+        </p:txBody>
+      </p:sp>
+      <p:sp>
+        <p:nvSpPr>
+          <p:cNvPr id="3" name="Content Placeholder 2">
+            <a:extLst>
+              <a:ext uri="{FF2B5EF4-FFF2-40B4-BE49-F238E27FC236}">
+                <a16:creationId xmlns:a16="http://schemas.microsoft.com/office/drawing/2014/main" id="{4C1D2451-131B-2E4F-F0D9-C7096824E5D1}"/>
+              </a:ext>
+            </a:extLst>
+          </p:cNvPr>
+          <p:cNvSpPr>
+            <a:spLocks noGrp="1"/>
+          </p:cNvSpPr>
+          <p:nvPr>
+            <p:ph sz="half" idx="1"/>
+          </p:nvPr>
+        </p:nvSpPr>
+        <p:spPr>
+          <a:xfrm>
+            <a:off x="818712" y="2222287"/>
+            <a:ext cx="7850041" cy="3638763"/>
+          </a:xfrm>
+        </p:spPr>
+        <p:txBody>
+          <a:bodyPr>
+            <a:normAutofit/>
+          </a:bodyPr>
+          <a:lstStyle/>
+          <a:p>
+            <a:endParaRPr lang="en-US" dirty="0"/>
+          </a:p>
+          <a:p>
+            <a:r>
+              <a:rPr lang="en-US" dirty="0"/>
+              <a:t>We can further reduce the size of the input space by rescaling each image to a smaller size</a:t>
+            </a:r>
+          </a:p>
+          <a:p>
+            <a:r>
+              <a:rPr lang="en-US" dirty="0"/>
+              <a:t>Rescaling will allow each sample to retain the key properties that can be used for discerning between classes</a:t>
+            </a:r>
+          </a:p>
+          <a:p>
+            <a:r>
+              <a:rPr lang="en-US" dirty="0"/>
+              <a:t>By creating a smaller input space, we can also shrink the number of parameters required by the model to classify images</a:t>
+            </a:r>
+          </a:p>
+          <a:p>
+            <a:r>
+              <a:rPr lang="en-US" dirty="0"/>
+              <a:t>A smaller model </a:t>
+            </a:r>
+            <a:r>
+              <a:rPr lang="en-US" i="1" dirty="0"/>
+              <a:t>width</a:t>
+            </a:r>
+            <a:r>
+              <a:rPr lang="en-US" dirty="0"/>
+              <a:t> can help mitigate any overfitting problems</a:t>
+            </a:r>
+          </a:p>
+          <a:p>
+            <a:r>
+              <a:rPr lang="en-US" dirty="0"/>
+              <a:t>Image size: 164 x 164 x 3 to 128 x 128 x 3</a:t>
+            </a:r>
+          </a:p>
+          <a:p>
+            <a:endParaRPr lang="en-US" dirty="0"/>
+          </a:p>
+        </p:txBody>
+      </p:sp>
+      <p:sp>
+        <p:nvSpPr>
+          <p:cNvPr id="4" name="Content Placeholder 3">
+            <a:extLst>
+              <a:ext uri="{FF2B5EF4-FFF2-40B4-BE49-F238E27FC236}">
+                <a16:creationId xmlns:a16="http://schemas.microsoft.com/office/drawing/2014/main" id="{D2350425-554E-42DE-1278-7929BE5E4FCF}"/>
+              </a:ext>
+            </a:extLst>
+          </p:cNvPr>
+          <p:cNvSpPr>
+            <a:spLocks noGrp="1"/>
+          </p:cNvSpPr>
+          <p:nvPr>
+            <p:ph sz="half" idx="2"/>
+          </p:nvPr>
+        </p:nvSpPr>
+        <p:spPr>
+          <a:xfrm>
+            <a:off x="9105355" y="2223958"/>
+            <a:ext cx="2743200" cy="3657600"/>
+          </a:xfrm>
+        </p:spPr>
+        <p:txBody>
+          <a:bodyPr>
+            <a:normAutofit/>
+          </a:bodyPr>
+          <a:lstStyle/>
+          <a:p>
+            <a:r>
+              <a:rPr lang="en-US" dirty="0"/>
+              <a:t>TODO: before &amp; after rescaling</a:t>
+            </a:r>
+          </a:p>
+        </p:txBody>
+      </p:sp>
+    </p:spTree>
+    <p:extLst>
+      <p:ext uri="{BB962C8B-B14F-4D97-AF65-F5344CB8AC3E}">
+        <p14:creationId xmlns:p14="http://schemas.microsoft.com/office/powerpoint/2010/main" val="2458561362"/>
+      </p:ext>
+    </p:extLst>
+  </p:cSld>
+  <p:clrMapOvr>
+    <a:masterClrMapping/>
+  </p:clrMapOvr>
+</p:sld>
+</file>
+
+<file path=ppt/slides/slide9.xml><?xml version="1.0" encoding="utf-8"?>
+<p:sld xmlns:a="http://schemas.openxmlformats.org/drawingml/2006/main" xmlns:r="http://schemas.openxmlformats.org/officeDocument/2006/relationships" xmlns:p="http://schemas.openxmlformats.org/presentationml/2006/main">
+  <p:cSld>
+    <p:spTree>
+      <p:nvGrpSpPr>
+        <p:cNvPr id="1" name=""/>
+        <p:cNvGrpSpPr/>
+        <p:nvPr/>
+      </p:nvGrpSpPr>
+      <p:grpSpPr>
+        <a:xfrm>
+          <a:off x="0" y="0"/>
+          <a:ext cx="0" cy="0"/>
+          <a:chOff x="0" y="0"/>
+          <a:chExt cx="0" cy="0"/>
+        </a:xfrm>
+      </p:grpSpPr>
+      <p:sp>
+        <p:nvSpPr>
+          <p:cNvPr id="2" name="Title 1">
+            <a:extLst>
+              <a:ext uri="{FF2B5EF4-FFF2-40B4-BE49-F238E27FC236}">
+                <a16:creationId xmlns:a16="http://schemas.microsoft.com/office/drawing/2014/main" id="{BF209E95-9A62-B3EF-AB6C-7EDB0DD50B84}"/>
+              </a:ext>
+            </a:extLst>
+          </p:cNvPr>
+          <p:cNvSpPr>
+            <a:spLocks noGrp="1"/>
+          </p:cNvSpPr>
+          <p:nvPr>
+            <p:ph type="title"/>
+          </p:nvPr>
+        </p:nvSpPr>
+        <p:spPr/>
+        <p:txBody>
+          <a:bodyPr/>
+          <a:lstStyle/>
+          <a:p>
+            <a:r>
+              <a:rPr lang="en-US" dirty="0" err="1"/>
+              <a:t>Appendex</a:t>
+            </a:r>
+            <a:endParaRPr lang="en-US" dirty="0"/>
+          </a:p>
+        </p:txBody>
+      </p:sp>
+      <p:sp>
+        <p:nvSpPr>
+          <p:cNvPr id="3" name="Text Placeholder 2">
+            <a:extLst>
+              <a:ext uri="{FF2B5EF4-FFF2-40B4-BE49-F238E27FC236}">
+                <a16:creationId xmlns:a16="http://schemas.microsoft.com/office/drawing/2014/main" id="{C9A403C5-D031-86CE-17D7-6A4E78B300EA}"/>
+              </a:ext>
+            </a:extLst>
+          </p:cNvPr>
+          <p:cNvSpPr>
+            <a:spLocks noGrp="1"/>
+          </p:cNvSpPr>
+          <p:nvPr>
+            <p:ph type="body" idx="1"/>
+          </p:nvPr>
+        </p:nvSpPr>
+        <p:spPr/>
+        <p:txBody>
+          <a:bodyPr/>
+          <a:lstStyle/>
+          <a:p>
+            <a:endParaRPr lang="en-US"/>
+          </a:p>
+        </p:txBody>
+      </p:sp>
+    </p:spTree>
+    <p:extLst>
+      <p:ext uri="{BB962C8B-B14F-4D97-AF65-F5344CB8AC3E}">
+        <p14:creationId xmlns:p14="http://schemas.microsoft.com/office/powerpoint/2010/main" val="2814912908"/>
       </p:ext>
     </p:extLst>
   </p:cSld>

</xml_diff>

<commit_message>
begun section on classification model
</commit_message>
<xml_diff>
--- a/milestones/BUELL_ENGR6970_Milestone04.pptx
+++ b/milestones/BUELL_ENGR6970_Milestone04.pptx
@@ -12,9 +12,18 @@
     <p:sldId id="259" r:id="rId6"/>
     <p:sldId id="261" r:id="rId7"/>
     <p:sldId id="262" r:id="rId8"/>
-    <p:sldId id="263" r:id="rId9"/>
-    <p:sldId id="264" r:id="rId10"/>
-    <p:sldId id="265" r:id="rId11"/>
+    <p:sldId id="266" r:id="rId9"/>
+    <p:sldId id="263" r:id="rId10"/>
+    <p:sldId id="267" r:id="rId11"/>
+    <p:sldId id="268" r:id="rId12"/>
+    <p:sldId id="270" r:id="rId13"/>
+    <p:sldId id="271" r:id="rId14"/>
+    <p:sldId id="272" r:id="rId15"/>
+    <p:sldId id="273" r:id="rId16"/>
+    <p:sldId id="274" r:id="rId17"/>
+    <p:sldId id="264" r:id="rId18"/>
+    <p:sldId id="265" r:id="rId19"/>
+    <p:sldId id="269" r:id="rId20"/>
   </p:sldIdLst>
   <p:sldSz cx="12192000" cy="6858000"/>
   <p:notesSz cx="6858000" cy="9144000"/>
@@ -216,7 +225,7 @@
           <a:effectLst/>
           <a:extLst>
             <a:ext uri="{91240B29-F687-4f45-9708-019B960494DF}">
-              <a14:hiddenLine xmlns="" xmlns:a14="http://schemas.microsoft.com/office/drawing/2010/main" w="9525">
+              <a14:hiddenLine xmlns:a14="http://schemas.microsoft.com/office/drawing/2010/main" xmlns="" w="9525">
                 <a:solidFill>
                   <a:srgbClr val="000000"/>
                 </a:solidFill>
@@ -1738,7 +1747,7 @@
           <a:ln/>
           <a:extLst>
             <a:ext uri="{91240B29-F687-4f45-9708-019B960494DF}">
-              <a14:hiddenLine xmlns="" xmlns:a14="http://schemas.microsoft.com/office/drawing/2010/main" w="9525">
+              <a14:hiddenLine xmlns:a14="http://schemas.microsoft.com/office/drawing/2010/main" xmlns="" w="9525">
                 <a:solidFill>
                   <a:srgbClr val="000000"/>
                 </a:solidFill>
@@ -2013,7 +2022,7 @@
           <a:ln/>
           <a:extLst>
             <a:ext uri="{91240B29-F687-4f45-9708-019B960494DF}">
-              <a14:hiddenLine xmlns="" xmlns:a14="http://schemas.microsoft.com/office/drawing/2010/main" w="9525">
+              <a14:hiddenLine xmlns:a14="http://schemas.microsoft.com/office/drawing/2010/main" xmlns="" w="9525">
                 <a:solidFill>
                   <a:srgbClr val="000000"/>
                 </a:solidFill>
@@ -2296,7 +2305,7 @@
           <a:ln/>
           <a:extLst>
             <a:ext uri="{91240B29-F687-4f45-9708-019B960494DF}">
-              <a14:hiddenLine xmlns="" xmlns:a14="http://schemas.microsoft.com/office/drawing/2010/main" w="9525">
+              <a14:hiddenLine xmlns:a14="http://schemas.microsoft.com/office/drawing/2010/main" xmlns="" w="9525">
                 <a:solidFill>
                   <a:srgbClr val="000000"/>
                 </a:solidFill>
@@ -2922,7 +2931,7 @@
           <a:ln/>
           <a:extLst>
             <a:ext uri="{91240B29-F687-4f45-9708-019B960494DF}">
-              <a14:hiddenLine xmlns="" xmlns:a14="http://schemas.microsoft.com/office/drawing/2010/main" w="9525">
+              <a14:hiddenLine xmlns:a14="http://schemas.microsoft.com/office/drawing/2010/main" xmlns="" w="9525">
                 <a:solidFill>
                   <a:srgbClr val="000000"/>
                 </a:solidFill>
@@ -3261,7 +3270,7 @@
           <a:ln/>
           <a:extLst>
             <a:ext uri="{91240B29-F687-4f45-9708-019B960494DF}">
-              <a14:hiddenLine xmlns="" xmlns:a14="http://schemas.microsoft.com/office/drawing/2010/main" w="9525">
+              <a14:hiddenLine xmlns:a14="http://schemas.microsoft.com/office/drawing/2010/main" xmlns="" w="9525">
                 <a:solidFill>
                   <a:srgbClr val="000000"/>
                 </a:solidFill>
@@ -3738,7 +3747,7 @@
           <a:ln/>
           <a:extLst>
             <a:ext uri="{91240B29-F687-4f45-9708-019B960494DF}">
-              <a14:hiddenLine xmlns="" xmlns:a14="http://schemas.microsoft.com/office/drawing/2010/main" w="9525">
+              <a14:hiddenLine xmlns:a14="http://schemas.microsoft.com/office/drawing/2010/main" xmlns="" w="9525">
                 <a:solidFill>
                   <a:srgbClr val="000000"/>
                 </a:solidFill>
@@ -4167,7 +4176,7 @@
           <a:ln/>
           <a:extLst>
             <a:ext uri="{91240B29-F687-4f45-9708-019B960494DF}">
-              <a14:hiddenLine xmlns="" xmlns:a14="http://schemas.microsoft.com/office/drawing/2010/main" w="9525">
+              <a14:hiddenLine xmlns:a14="http://schemas.microsoft.com/office/drawing/2010/main" xmlns="" w="9525">
                 <a:solidFill>
                   <a:srgbClr val="000000"/>
                 </a:solidFill>
@@ -5496,6 +5505,824 @@
           <p:cNvPr id="2" name="Title 1">
             <a:extLst>
               <a:ext uri="{FF2B5EF4-FFF2-40B4-BE49-F238E27FC236}">
+                <a16:creationId xmlns:a16="http://schemas.microsoft.com/office/drawing/2014/main" id="{7CC55D19-78EF-2A2C-D779-6B88B9C93B0B}"/>
+              </a:ext>
+            </a:extLst>
+          </p:cNvPr>
+          <p:cNvSpPr>
+            <a:spLocks noGrp="1"/>
+          </p:cNvSpPr>
+          <p:nvPr>
+            <p:ph type="title"/>
+          </p:nvPr>
+        </p:nvSpPr>
+        <p:spPr/>
+        <p:txBody>
+          <a:bodyPr/>
+          <a:lstStyle/>
+          <a:p>
+            <a:r>
+              <a:rPr lang="en-US" dirty="0"/>
+              <a:t>Preprocessing – Rescaling (cont.)</a:t>
+            </a:r>
+          </a:p>
+        </p:txBody>
+      </p:sp>
+      <p:sp>
+        <p:nvSpPr>
+          <p:cNvPr id="3" name="Content Placeholder 2">
+            <a:extLst>
+              <a:ext uri="{FF2B5EF4-FFF2-40B4-BE49-F238E27FC236}">
+                <a16:creationId xmlns:a16="http://schemas.microsoft.com/office/drawing/2014/main" id="{4C1D2451-131B-2E4F-F0D9-C7096824E5D1}"/>
+              </a:ext>
+            </a:extLst>
+          </p:cNvPr>
+          <p:cNvSpPr>
+            <a:spLocks noGrp="1"/>
+          </p:cNvSpPr>
+          <p:nvPr>
+            <p:ph idx="1"/>
+          </p:nvPr>
+        </p:nvSpPr>
+        <p:spPr/>
+        <p:txBody>
+          <a:bodyPr>
+            <a:normAutofit/>
+          </a:bodyPr>
+          <a:lstStyle/>
+          <a:p>
+            <a:r>
+              <a:rPr lang="en-US" dirty="0"/>
+              <a:t>TO DO: Before &amp; After image of rescaling for a few samples</a:t>
+            </a:r>
+          </a:p>
+        </p:txBody>
+      </p:sp>
+    </p:spTree>
+    <p:extLst>
+      <p:ext uri="{BB962C8B-B14F-4D97-AF65-F5344CB8AC3E}">
+        <p14:creationId xmlns:p14="http://schemas.microsoft.com/office/powerpoint/2010/main" val="1588482154"/>
+      </p:ext>
+    </p:extLst>
+  </p:cSld>
+  <p:clrMapOvr>
+    <a:masterClrMapping/>
+  </p:clrMapOvr>
+</p:sld>
+</file>
+
+<file path=ppt/slides/slide11.xml><?xml version="1.0" encoding="utf-8"?>
+<p:sld xmlns:a="http://schemas.openxmlformats.org/drawingml/2006/main" xmlns:r="http://schemas.openxmlformats.org/officeDocument/2006/relationships" xmlns:p="http://schemas.openxmlformats.org/presentationml/2006/main">
+  <p:cSld>
+    <p:spTree>
+      <p:nvGrpSpPr>
+        <p:cNvPr id="1" name=""/>
+        <p:cNvGrpSpPr/>
+        <p:nvPr/>
+      </p:nvGrpSpPr>
+      <p:grpSpPr>
+        <a:xfrm>
+          <a:off x="0" y="0"/>
+          <a:ext cx="0" cy="0"/>
+          <a:chOff x="0" y="0"/>
+          <a:chExt cx="0" cy="0"/>
+        </a:xfrm>
+      </p:grpSpPr>
+      <p:sp>
+        <p:nvSpPr>
+          <p:cNvPr id="2" name="Title 1">
+            <a:extLst>
+              <a:ext uri="{FF2B5EF4-FFF2-40B4-BE49-F238E27FC236}">
+                <a16:creationId xmlns:a16="http://schemas.microsoft.com/office/drawing/2014/main" id="{7CC55D19-78EF-2A2C-D779-6B88B9C93B0B}"/>
+              </a:ext>
+            </a:extLst>
+          </p:cNvPr>
+          <p:cNvSpPr>
+            <a:spLocks noGrp="1"/>
+          </p:cNvSpPr>
+          <p:nvPr>
+            <p:ph type="title"/>
+          </p:nvPr>
+        </p:nvSpPr>
+        <p:spPr/>
+        <p:txBody>
+          <a:bodyPr/>
+          <a:lstStyle/>
+          <a:p>
+            <a:r>
+              <a:rPr lang="en-US" dirty="0"/>
+              <a:t>Preprocessing – Normalizing</a:t>
+            </a:r>
+          </a:p>
+        </p:txBody>
+      </p:sp>
+      <p:sp>
+        <p:nvSpPr>
+          <p:cNvPr id="3" name="Content Placeholder 2">
+            <a:extLst>
+              <a:ext uri="{FF2B5EF4-FFF2-40B4-BE49-F238E27FC236}">
+                <a16:creationId xmlns:a16="http://schemas.microsoft.com/office/drawing/2014/main" id="{4C1D2451-131B-2E4F-F0D9-C7096824E5D1}"/>
+              </a:ext>
+            </a:extLst>
+          </p:cNvPr>
+          <p:cNvSpPr>
+            <a:spLocks noGrp="1"/>
+          </p:cNvSpPr>
+          <p:nvPr>
+            <p:ph idx="1"/>
+          </p:nvPr>
+        </p:nvSpPr>
+        <p:spPr/>
+        <p:txBody>
+          <a:bodyPr>
+            <a:normAutofit/>
+          </a:bodyPr>
+          <a:lstStyle/>
+          <a:p>
+            <a:r>
+              <a:rPr lang="en-US" dirty="0"/>
+              <a:t>Normalization is the process of scaling all samples within a batch of data such that each feature by itself has a zero-mean and unit-variance</a:t>
+            </a:r>
+          </a:p>
+          <a:p>
+            <a:r>
+              <a:rPr lang="en-US" dirty="0"/>
+              <a:t>First, we divide all pixel values by 255.0, such that every entry sits between 0.0 and 1.0</a:t>
+            </a:r>
+          </a:p>
+          <a:p>
+            <a:r>
+              <a:rPr lang="en-US" dirty="0"/>
+              <a:t>We then apply a built-in TensorFlow function that will normalize a batch of input images according to the rule above</a:t>
+            </a:r>
+          </a:p>
+          <a:p>
+            <a:r>
+              <a:rPr lang="en-US" dirty="0"/>
+              <a:t>In general, this prevents any one feature/pixel from contributing more than any other in the optimization process</a:t>
+            </a:r>
+          </a:p>
+        </p:txBody>
+      </p:sp>
+    </p:spTree>
+    <p:extLst>
+      <p:ext uri="{BB962C8B-B14F-4D97-AF65-F5344CB8AC3E}">
+        <p14:creationId xmlns:p14="http://schemas.microsoft.com/office/powerpoint/2010/main" val="1708856987"/>
+      </p:ext>
+    </p:extLst>
+  </p:cSld>
+  <p:clrMapOvr>
+    <a:masterClrMapping/>
+  </p:clrMapOvr>
+</p:sld>
+</file>
+
+<file path=ppt/slides/slide12.xml><?xml version="1.0" encoding="utf-8"?>
+<p:sld xmlns:a="http://schemas.openxmlformats.org/drawingml/2006/main" xmlns:r="http://schemas.openxmlformats.org/officeDocument/2006/relationships" xmlns:p="http://schemas.openxmlformats.org/presentationml/2006/main">
+  <p:cSld>
+    <p:spTree>
+      <p:nvGrpSpPr>
+        <p:cNvPr id="1" name=""/>
+        <p:cNvGrpSpPr/>
+        <p:nvPr/>
+      </p:nvGrpSpPr>
+      <p:grpSpPr>
+        <a:xfrm>
+          <a:off x="0" y="0"/>
+          <a:ext cx="0" cy="0"/>
+          <a:chOff x="0" y="0"/>
+          <a:chExt cx="0" cy="0"/>
+        </a:xfrm>
+      </p:grpSpPr>
+      <p:sp>
+        <p:nvSpPr>
+          <p:cNvPr id="2" name="Title 1">
+            <a:extLst>
+              <a:ext uri="{FF2B5EF4-FFF2-40B4-BE49-F238E27FC236}">
+                <a16:creationId xmlns:a16="http://schemas.microsoft.com/office/drawing/2014/main" id="{7CC55D19-78EF-2A2C-D779-6B88B9C93B0B}"/>
+              </a:ext>
+            </a:extLst>
+          </p:cNvPr>
+          <p:cNvSpPr>
+            <a:spLocks noGrp="1"/>
+          </p:cNvSpPr>
+          <p:nvPr>
+            <p:ph type="title"/>
+          </p:nvPr>
+        </p:nvSpPr>
+        <p:spPr/>
+        <p:txBody>
+          <a:bodyPr/>
+          <a:lstStyle/>
+          <a:p>
+            <a:r>
+              <a:rPr lang="en-US" dirty="0"/>
+              <a:t>Preprocessing – Normalizing (cont.)</a:t>
+            </a:r>
+          </a:p>
+        </p:txBody>
+      </p:sp>
+      <p:sp>
+        <p:nvSpPr>
+          <p:cNvPr id="3" name="Content Placeholder 2">
+            <a:extLst>
+              <a:ext uri="{FF2B5EF4-FFF2-40B4-BE49-F238E27FC236}">
+                <a16:creationId xmlns:a16="http://schemas.microsoft.com/office/drawing/2014/main" id="{4C1D2451-131B-2E4F-F0D9-C7096824E5D1}"/>
+              </a:ext>
+            </a:extLst>
+          </p:cNvPr>
+          <p:cNvSpPr>
+            <a:spLocks noGrp="1"/>
+          </p:cNvSpPr>
+          <p:nvPr>
+            <p:ph idx="1"/>
+          </p:nvPr>
+        </p:nvSpPr>
+        <p:spPr/>
+        <p:txBody>
+          <a:bodyPr>
+            <a:normAutofit/>
+          </a:bodyPr>
+          <a:lstStyle/>
+          <a:p>
+            <a:r>
+              <a:rPr lang="en-US" dirty="0"/>
+              <a:t>TO DO: Before &amp; After image of rescaling for a few samples</a:t>
+            </a:r>
+          </a:p>
+        </p:txBody>
+      </p:sp>
+    </p:spTree>
+    <p:extLst>
+      <p:ext uri="{BB962C8B-B14F-4D97-AF65-F5344CB8AC3E}">
+        <p14:creationId xmlns:p14="http://schemas.microsoft.com/office/powerpoint/2010/main" val="595162643"/>
+      </p:ext>
+    </p:extLst>
+  </p:cSld>
+  <p:clrMapOvr>
+    <a:masterClrMapping/>
+  </p:clrMapOvr>
+</p:sld>
+</file>
+
+<file path=ppt/slides/slide13.xml><?xml version="1.0" encoding="utf-8"?>
+<p:sld xmlns:a="http://schemas.openxmlformats.org/drawingml/2006/main" xmlns:r="http://schemas.openxmlformats.org/officeDocument/2006/relationships" xmlns:p="http://schemas.openxmlformats.org/presentationml/2006/main">
+  <p:cSld>
+    <p:spTree>
+      <p:nvGrpSpPr>
+        <p:cNvPr id="1" name=""/>
+        <p:cNvGrpSpPr/>
+        <p:nvPr/>
+      </p:nvGrpSpPr>
+      <p:grpSpPr>
+        <a:xfrm>
+          <a:off x="0" y="0"/>
+          <a:ext cx="0" cy="0"/>
+          <a:chOff x="0" y="0"/>
+          <a:chExt cx="0" cy="0"/>
+        </a:xfrm>
+      </p:grpSpPr>
+      <p:sp>
+        <p:nvSpPr>
+          <p:cNvPr id="2" name="Title 1">
+            <a:extLst>
+              <a:ext uri="{FF2B5EF4-FFF2-40B4-BE49-F238E27FC236}">
+                <a16:creationId xmlns:a16="http://schemas.microsoft.com/office/drawing/2014/main" id="{5A3E0528-8966-0A4D-4F41-D8D34F5ACC39}"/>
+              </a:ext>
+            </a:extLst>
+          </p:cNvPr>
+          <p:cNvSpPr>
+            <a:spLocks noGrp="1"/>
+          </p:cNvSpPr>
+          <p:nvPr>
+            <p:ph type="title"/>
+          </p:nvPr>
+        </p:nvSpPr>
+        <p:spPr/>
+        <p:txBody>
+          <a:bodyPr/>
+          <a:lstStyle/>
+          <a:p>
+            <a:r>
+              <a:rPr lang="en-US" dirty="0"/>
+              <a:t>The Classification Model</a:t>
+            </a:r>
+          </a:p>
+        </p:txBody>
+      </p:sp>
+      <p:sp>
+        <p:nvSpPr>
+          <p:cNvPr id="3" name="Content Placeholder 2">
+            <a:extLst>
+              <a:ext uri="{FF2B5EF4-FFF2-40B4-BE49-F238E27FC236}">
+                <a16:creationId xmlns:a16="http://schemas.microsoft.com/office/drawing/2014/main" id="{5CEA5740-BB8E-E785-BCAF-C36EBC3C3812}"/>
+              </a:ext>
+            </a:extLst>
+          </p:cNvPr>
+          <p:cNvSpPr>
+            <a:spLocks noGrp="1"/>
+          </p:cNvSpPr>
+          <p:nvPr>
+            <p:ph idx="1"/>
+          </p:nvPr>
+        </p:nvSpPr>
+        <p:spPr/>
+        <p:txBody>
+          <a:bodyPr/>
+          <a:lstStyle/>
+          <a:p>
+            <a:r>
+              <a:rPr lang="en-US" dirty="0"/>
+              <a:t>This is an </a:t>
+            </a:r>
+            <a:r>
+              <a:rPr lang="en-US" i="1" dirty="0"/>
+              <a:t>image classification </a:t>
+            </a:r>
+            <a:r>
+              <a:rPr lang="en-US" dirty="0"/>
+              <a:t>task where we seek to categorize an entire input image based on its contents</a:t>
+            </a:r>
+          </a:p>
+          <a:p>
+            <a:endParaRPr lang="en-US" dirty="0"/>
+          </a:p>
+          <a:p>
+            <a:r>
+              <a:rPr lang="en-US" dirty="0"/>
+              <a:t>We are not trying to locate or isolate a hand creating the ASL character, only assign a label to the image as a whole</a:t>
+            </a:r>
+          </a:p>
+          <a:p>
+            <a:endParaRPr lang="en-US" dirty="0"/>
+          </a:p>
+          <a:p>
+            <a:r>
+              <a:rPr lang="en-US" dirty="0"/>
+              <a:t>The entire data set is already labeled which makes this a </a:t>
+            </a:r>
+            <a:r>
+              <a:rPr lang="en-US" i="1" dirty="0"/>
+              <a:t>supervised</a:t>
+            </a:r>
+            <a:r>
+              <a:rPr lang="en-US" dirty="0"/>
+              <a:t> classification task</a:t>
+            </a:r>
+          </a:p>
+        </p:txBody>
+      </p:sp>
+    </p:spTree>
+    <p:extLst>
+      <p:ext uri="{BB962C8B-B14F-4D97-AF65-F5344CB8AC3E}">
+        <p14:creationId xmlns:p14="http://schemas.microsoft.com/office/powerpoint/2010/main" val="886339841"/>
+      </p:ext>
+    </p:extLst>
+  </p:cSld>
+  <p:clrMapOvr>
+    <a:masterClrMapping/>
+  </p:clrMapOvr>
+</p:sld>
+</file>
+
+<file path=ppt/slides/slide14.xml><?xml version="1.0" encoding="utf-8"?>
+<p:sld xmlns:a="http://schemas.openxmlformats.org/drawingml/2006/main" xmlns:r="http://schemas.openxmlformats.org/officeDocument/2006/relationships" xmlns:p="http://schemas.openxmlformats.org/presentationml/2006/main">
+  <p:cSld>
+    <p:spTree>
+      <p:nvGrpSpPr>
+        <p:cNvPr id="1" name=""/>
+        <p:cNvGrpSpPr/>
+        <p:nvPr/>
+      </p:nvGrpSpPr>
+      <p:grpSpPr>
+        <a:xfrm>
+          <a:off x="0" y="0"/>
+          <a:ext cx="0" cy="0"/>
+          <a:chOff x="0" y="0"/>
+          <a:chExt cx="0" cy="0"/>
+        </a:xfrm>
+      </p:grpSpPr>
+      <p:sp>
+        <p:nvSpPr>
+          <p:cNvPr id="2" name="Title 1">
+            <a:extLst>
+              <a:ext uri="{FF2B5EF4-FFF2-40B4-BE49-F238E27FC236}">
+                <a16:creationId xmlns:a16="http://schemas.microsoft.com/office/drawing/2014/main" id="{579E6C1A-8290-2018-E004-DAF5B63C5D90}"/>
+              </a:ext>
+            </a:extLst>
+          </p:cNvPr>
+          <p:cNvSpPr>
+            <a:spLocks noGrp="1"/>
+          </p:cNvSpPr>
+          <p:nvPr>
+            <p:ph type="title"/>
+          </p:nvPr>
+        </p:nvSpPr>
+        <p:spPr/>
+        <p:txBody>
+          <a:bodyPr/>
+          <a:lstStyle/>
+          <a:p>
+            <a:r>
+              <a:rPr lang="en-US" dirty="0"/>
+              <a:t>The Classification Model (cont.)</a:t>
+            </a:r>
+          </a:p>
+        </p:txBody>
+      </p:sp>
+      <p:sp>
+        <p:nvSpPr>
+          <p:cNvPr id="3" name="Content Placeholder 2">
+            <a:extLst>
+              <a:ext uri="{FF2B5EF4-FFF2-40B4-BE49-F238E27FC236}">
+                <a16:creationId xmlns:a16="http://schemas.microsoft.com/office/drawing/2014/main" id="{870D54F5-825C-21B1-32A2-9BA616B2D75D}"/>
+              </a:ext>
+            </a:extLst>
+          </p:cNvPr>
+          <p:cNvSpPr>
+            <a:spLocks noGrp="1"/>
+          </p:cNvSpPr>
+          <p:nvPr>
+            <p:ph idx="1"/>
+          </p:nvPr>
+        </p:nvSpPr>
+        <p:spPr/>
+        <p:txBody>
+          <a:bodyPr>
+            <a:normAutofit lnSpcReduction="10000"/>
+          </a:bodyPr>
+          <a:lstStyle/>
+          <a:p>
+            <a:r>
+              <a:rPr lang="en-US" dirty="0"/>
+              <a:t>The most common architecture of neural network for supervised image classification is a </a:t>
+            </a:r>
+            <a:r>
+              <a:rPr lang="en-US" i="1" dirty="0"/>
+              <a:t>convolutional neural network</a:t>
+            </a:r>
+            <a:endParaRPr lang="en-US" dirty="0"/>
+          </a:p>
+          <a:p>
+            <a:endParaRPr lang="en-US" dirty="0"/>
+          </a:p>
+          <a:p>
+            <a:r>
+              <a:rPr lang="en-US" dirty="0"/>
+              <a:t>Convolutional neural networks use a combination of 2D-convolution and 2D-maximum-pooling operations to build a </a:t>
+            </a:r>
+            <a:r>
+              <a:rPr lang="en-US" i="1" dirty="0"/>
+              <a:t>feature map</a:t>
+            </a:r>
+            <a:r>
+              <a:rPr lang="en-US" dirty="0"/>
+              <a:t> which we can then run a classifier one</a:t>
+            </a:r>
+          </a:p>
+          <a:p>
+            <a:endParaRPr lang="en-US" dirty="0"/>
+          </a:p>
+          <a:p>
+            <a:r>
+              <a:rPr lang="en-US" dirty="0"/>
+              <a:t>Convolution operations use 2D kernels to parse across the rows and columns of an input image to locate key discerning features</a:t>
+            </a:r>
+          </a:p>
+          <a:p>
+            <a:endParaRPr lang="en-US" dirty="0"/>
+          </a:p>
+          <a:p>
+            <a:r>
+              <a:rPr lang="en-US" dirty="0"/>
+              <a:t>Maximum-Pooling operations use 2D kernels to parse across the rows and columns of an input image to extract the pixel with the largest value in a 2D group of pixels</a:t>
+            </a:r>
+          </a:p>
+        </p:txBody>
+      </p:sp>
+    </p:spTree>
+    <p:extLst>
+      <p:ext uri="{BB962C8B-B14F-4D97-AF65-F5344CB8AC3E}">
+        <p14:creationId xmlns:p14="http://schemas.microsoft.com/office/powerpoint/2010/main" val="1607378300"/>
+      </p:ext>
+    </p:extLst>
+  </p:cSld>
+  <p:clrMapOvr>
+    <a:masterClrMapping/>
+  </p:clrMapOvr>
+</p:sld>
+</file>
+
+<file path=ppt/slides/slide15.xml><?xml version="1.0" encoding="utf-8"?>
+<p:sld xmlns:a="http://schemas.openxmlformats.org/drawingml/2006/main" xmlns:r="http://schemas.openxmlformats.org/officeDocument/2006/relationships" xmlns:p="http://schemas.openxmlformats.org/presentationml/2006/main">
+  <p:cSld>
+    <p:spTree>
+      <p:nvGrpSpPr>
+        <p:cNvPr id="1" name=""/>
+        <p:cNvGrpSpPr/>
+        <p:nvPr/>
+      </p:nvGrpSpPr>
+      <p:grpSpPr>
+        <a:xfrm>
+          <a:off x="0" y="0"/>
+          <a:ext cx="0" cy="0"/>
+          <a:chOff x="0" y="0"/>
+          <a:chExt cx="0" cy="0"/>
+        </a:xfrm>
+      </p:grpSpPr>
+      <p:sp>
+        <p:nvSpPr>
+          <p:cNvPr id="2" name="Title 1">
+            <a:extLst>
+              <a:ext uri="{FF2B5EF4-FFF2-40B4-BE49-F238E27FC236}">
+                <a16:creationId xmlns:a16="http://schemas.microsoft.com/office/drawing/2014/main" id="{BE228A27-CE95-AC28-4EDD-3CED5949BC60}"/>
+              </a:ext>
+            </a:extLst>
+          </p:cNvPr>
+          <p:cNvSpPr>
+            <a:spLocks noGrp="1"/>
+          </p:cNvSpPr>
+          <p:nvPr>
+            <p:ph type="title"/>
+          </p:nvPr>
+        </p:nvSpPr>
+        <p:spPr/>
+        <p:txBody>
+          <a:bodyPr/>
+          <a:lstStyle/>
+          <a:p>
+            <a:r>
+              <a:rPr lang="en-US" dirty="0"/>
+              <a:t>The Classification Model</a:t>
+            </a:r>
+          </a:p>
+        </p:txBody>
+      </p:sp>
+      <p:sp>
+        <p:nvSpPr>
+          <p:cNvPr id="3" name="Content Placeholder 2">
+            <a:extLst>
+              <a:ext uri="{FF2B5EF4-FFF2-40B4-BE49-F238E27FC236}">
+                <a16:creationId xmlns:a16="http://schemas.microsoft.com/office/drawing/2014/main" id="{DC5289D5-78DA-E221-0909-94EBBCC27C2D}"/>
+              </a:ext>
+            </a:extLst>
+          </p:cNvPr>
+          <p:cNvSpPr>
+            <a:spLocks noGrp="1"/>
+          </p:cNvSpPr>
+          <p:nvPr>
+            <p:ph idx="1"/>
+          </p:nvPr>
+        </p:nvSpPr>
+        <p:spPr/>
+        <p:txBody>
+          <a:bodyPr/>
+          <a:lstStyle/>
+          <a:p>
+            <a:r>
+              <a:rPr lang="en-US" dirty="0"/>
+              <a:t>The output of a convolutional neural network is a </a:t>
+            </a:r>
+            <a:r>
+              <a:rPr lang="en-US" i="1" dirty="0"/>
+              <a:t>feature map</a:t>
+            </a:r>
+            <a:r>
+              <a:rPr lang="en-US" dirty="0"/>
+              <a:t>, or a lower-dimensional, but highly descriptive representation of the original input</a:t>
+            </a:r>
+          </a:p>
+          <a:p>
+            <a:r>
+              <a:rPr lang="en-US" dirty="0"/>
+              <a:t>The feature map is passed through a </a:t>
+            </a:r>
+            <a:r>
+              <a:rPr lang="en-US" i="1" dirty="0"/>
+              <a:t>multilayer perceptron </a:t>
+            </a:r>
+            <a:r>
+              <a:rPr lang="en-US" dirty="0"/>
+              <a:t>which applies repeated affine transformations</a:t>
+            </a:r>
+          </a:p>
+          <a:p>
+            <a:r>
+              <a:rPr lang="en-US" dirty="0"/>
+              <a:t>After all transformations, the final outputs are rescaled </a:t>
+            </a:r>
+          </a:p>
+          <a:p>
+            <a:endParaRPr lang="en-US" dirty="0"/>
+          </a:p>
+        </p:txBody>
+      </p:sp>
+    </p:spTree>
+    <p:extLst>
+      <p:ext uri="{BB962C8B-B14F-4D97-AF65-F5344CB8AC3E}">
+        <p14:creationId xmlns:p14="http://schemas.microsoft.com/office/powerpoint/2010/main" val="978064321"/>
+      </p:ext>
+    </p:extLst>
+  </p:cSld>
+  <p:clrMapOvr>
+    <a:masterClrMapping/>
+  </p:clrMapOvr>
+</p:sld>
+</file>
+
+<file path=ppt/slides/slide16.xml><?xml version="1.0" encoding="utf-8"?>
+<p:sld xmlns:a="http://schemas.openxmlformats.org/drawingml/2006/main" xmlns:r="http://schemas.openxmlformats.org/officeDocument/2006/relationships" xmlns:p="http://schemas.openxmlformats.org/presentationml/2006/main">
+  <p:cSld>
+    <p:spTree>
+      <p:nvGrpSpPr>
+        <p:cNvPr id="1" name=""/>
+        <p:cNvGrpSpPr/>
+        <p:nvPr/>
+      </p:nvGrpSpPr>
+      <p:grpSpPr>
+        <a:xfrm>
+          <a:off x="0" y="0"/>
+          <a:ext cx="0" cy="0"/>
+          <a:chOff x="0" y="0"/>
+          <a:chExt cx="0" cy="0"/>
+        </a:xfrm>
+      </p:grpSpPr>
+      <p:sp>
+        <p:nvSpPr>
+          <p:cNvPr id="2" name="Title 1">
+            <a:extLst>
+              <a:ext uri="{FF2B5EF4-FFF2-40B4-BE49-F238E27FC236}">
+                <a16:creationId xmlns:a16="http://schemas.microsoft.com/office/drawing/2014/main" id="{7F1B47B1-51BA-066E-2082-A443E039EFC8}"/>
+              </a:ext>
+            </a:extLst>
+          </p:cNvPr>
+          <p:cNvSpPr>
+            <a:spLocks noGrp="1"/>
+          </p:cNvSpPr>
+          <p:nvPr>
+            <p:ph type="title"/>
+          </p:nvPr>
+        </p:nvSpPr>
+        <p:spPr/>
+        <p:txBody>
+          <a:bodyPr/>
+          <a:lstStyle/>
+          <a:p>
+            <a:r>
+              <a:rPr lang="en-US" dirty="0"/>
+              <a:t>Chosen </a:t>
+            </a:r>
+            <a:r>
+              <a:rPr lang="en-US"/>
+              <a:t>CNN Architecture</a:t>
+            </a:r>
+          </a:p>
+        </p:txBody>
+      </p:sp>
+      <p:sp>
+        <p:nvSpPr>
+          <p:cNvPr id="3" name="Content Placeholder 2">
+            <a:extLst>
+              <a:ext uri="{FF2B5EF4-FFF2-40B4-BE49-F238E27FC236}">
+                <a16:creationId xmlns:a16="http://schemas.microsoft.com/office/drawing/2014/main" id="{785886C6-8935-94B1-0ECD-6A2564D8F0F4}"/>
+              </a:ext>
+            </a:extLst>
+          </p:cNvPr>
+          <p:cNvSpPr>
+            <a:spLocks noGrp="1"/>
+          </p:cNvSpPr>
+          <p:nvPr>
+            <p:ph idx="1"/>
+          </p:nvPr>
+        </p:nvSpPr>
+        <p:spPr/>
+        <p:txBody>
+          <a:bodyPr/>
+          <a:lstStyle/>
+          <a:p>
+            <a:endParaRPr lang="en-US"/>
+          </a:p>
+        </p:txBody>
+      </p:sp>
+    </p:spTree>
+    <p:extLst>
+      <p:ext uri="{BB962C8B-B14F-4D97-AF65-F5344CB8AC3E}">
+        <p14:creationId xmlns:p14="http://schemas.microsoft.com/office/powerpoint/2010/main" val="2778027350"/>
+      </p:ext>
+    </p:extLst>
+  </p:cSld>
+  <p:clrMapOvr>
+    <a:masterClrMapping/>
+  </p:clrMapOvr>
+</p:sld>
+</file>
+
+<file path=ppt/slides/slide17.xml><?xml version="1.0" encoding="utf-8"?>
+<p:sld xmlns:a="http://schemas.openxmlformats.org/drawingml/2006/main" xmlns:r="http://schemas.openxmlformats.org/officeDocument/2006/relationships" xmlns:p="http://schemas.openxmlformats.org/presentationml/2006/main">
+  <p:cSld>
+    <p:spTree>
+      <p:nvGrpSpPr>
+        <p:cNvPr id="1" name=""/>
+        <p:cNvGrpSpPr/>
+        <p:nvPr/>
+      </p:nvGrpSpPr>
+      <p:grpSpPr>
+        <a:xfrm>
+          <a:off x="0" y="0"/>
+          <a:ext cx="0" cy="0"/>
+          <a:chOff x="0" y="0"/>
+          <a:chExt cx="0" cy="0"/>
+        </a:xfrm>
+      </p:grpSpPr>
+      <p:sp>
+        <p:nvSpPr>
+          <p:cNvPr id="2" name="Title 1">
+            <a:extLst>
+              <a:ext uri="{FF2B5EF4-FFF2-40B4-BE49-F238E27FC236}">
+                <a16:creationId xmlns:a16="http://schemas.microsoft.com/office/drawing/2014/main" id="{BF209E95-9A62-B3EF-AB6C-7EDB0DD50B84}"/>
+              </a:ext>
+            </a:extLst>
+          </p:cNvPr>
+          <p:cNvSpPr>
+            <a:spLocks noGrp="1"/>
+          </p:cNvSpPr>
+          <p:nvPr>
+            <p:ph type="title"/>
+          </p:nvPr>
+        </p:nvSpPr>
+        <p:spPr/>
+        <p:txBody>
+          <a:bodyPr/>
+          <a:lstStyle/>
+          <a:p>
+            <a:r>
+              <a:rPr lang="en-US" dirty="0" err="1"/>
+              <a:t>Appendex</a:t>
+            </a:r>
+            <a:endParaRPr lang="en-US" dirty="0"/>
+          </a:p>
+        </p:txBody>
+      </p:sp>
+      <p:sp>
+        <p:nvSpPr>
+          <p:cNvPr id="3" name="Text Placeholder 2">
+            <a:extLst>
+              <a:ext uri="{FF2B5EF4-FFF2-40B4-BE49-F238E27FC236}">
+                <a16:creationId xmlns:a16="http://schemas.microsoft.com/office/drawing/2014/main" id="{C9A403C5-D031-86CE-17D7-6A4E78B300EA}"/>
+              </a:ext>
+            </a:extLst>
+          </p:cNvPr>
+          <p:cNvSpPr>
+            <a:spLocks noGrp="1"/>
+          </p:cNvSpPr>
+          <p:nvPr>
+            <p:ph type="body" idx="1"/>
+          </p:nvPr>
+        </p:nvSpPr>
+        <p:spPr/>
+        <p:txBody>
+          <a:bodyPr/>
+          <a:lstStyle/>
+          <a:p>
+            <a:endParaRPr lang="en-US"/>
+          </a:p>
+        </p:txBody>
+      </p:sp>
+    </p:spTree>
+    <p:extLst>
+      <p:ext uri="{BB962C8B-B14F-4D97-AF65-F5344CB8AC3E}">
+        <p14:creationId xmlns:p14="http://schemas.microsoft.com/office/powerpoint/2010/main" val="2814912908"/>
+      </p:ext>
+    </p:extLst>
+  </p:cSld>
+  <p:clrMapOvr>
+    <a:masterClrMapping/>
+  </p:clrMapOvr>
+</p:sld>
+</file>
+
+<file path=ppt/slides/slide18.xml><?xml version="1.0" encoding="utf-8"?>
+<p:sld xmlns:a="http://schemas.openxmlformats.org/drawingml/2006/main" xmlns:r="http://schemas.openxmlformats.org/officeDocument/2006/relationships" xmlns:p="http://schemas.openxmlformats.org/presentationml/2006/main">
+  <p:cSld>
+    <p:spTree>
+      <p:nvGrpSpPr>
+        <p:cNvPr id="1" name=""/>
+        <p:cNvGrpSpPr/>
+        <p:nvPr/>
+      </p:nvGrpSpPr>
+      <p:grpSpPr>
+        <a:xfrm>
+          <a:off x="0" y="0"/>
+          <a:ext cx="0" cy="0"/>
+          <a:chOff x="0" y="0"/>
+          <a:chExt cx="0" cy="0"/>
+        </a:xfrm>
+      </p:grpSpPr>
+      <p:sp>
+        <p:nvSpPr>
+          <p:cNvPr id="2" name="Title 1">
+            <a:extLst>
+              <a:ext uri="{FF2B5EF4-FFF2-40B4-BE49-F238E27FC236}">
                 <a16:creationId xmlns:a16="http://schemas.microsoft.com/office/drawing/2014/main" id="{9C9D0EFC-BFFC-5BD9-4988-6298276BA100}"/>
               </a:ext>
             </a:extLst>
@@ -5512,7 +6339,10 @@
           <a:bodyPr/>
           <a:lstStyle/>
           <a:p>
-            <a:endParaRPr lang="en-US"/>
+            <a:r>
+              <a:rPr lang="en-US" dirty="0"/>
+              <a:t>Appendix: Tensor Flow</a:t>
+            </a:r>
           </a:p>
         </p:txBody>
       </p:sp>
@@ -5545,6 +6375,89 @@
     <p:extLst>
       <p:ext uri="{BB962C8B-B14F-4D97-AF65-F5344CB8AC3E}">
         <p14:creationId xmlns:p14="http://schemas.microsoft.com/office/powerpoint/2010/main" val="2893577354"/>
+      </p:ext>
+    </p:extLst>
+  </p:cSld>
+  <p:clrMapOvr>
+    <a:masterClrMapping/>
+  </p:clrMapOvr>
+</p:sld>
+</file>
+
+<file path=ppt/slides/slide19.xml><?xml version="1.0" encoding="utf-8"?>
+<p:sld xmlns:a="http://schemas.openxmlformats.org/drawingml/2006/main" xmlns:r="http://schemas.openxmlformats.org/officeDocument/2006/relationships" xmlns:p="http://schemas.openxmlformats.org/presentationml/2006/main">
+  <p:cSld>
+    <p:spTree>
+      <p:nvGrpSpPr>
+        <p:cNvPr id="1" name=""/>
+        <p:cNvGrpSpPr/>
+        <p:nvPr/>
+      </p:nvGrpSpPr>
+      <p:grpSpPr>
+        <a:xfrm>
+          <a:off x="0" y="0"/>
+          <a:ext cx="0" cy="0"/>
+          <a:chOff x="0" y="0"/>
+          <a:chExt cx="0" cy="0"/>
+        </a:xfrm>
+      </p:grpSpPr>
+      <p:sp>
+        <p:nvSpPr>
+          <p:cNvPr id="2" name="Title 1">
+            <a:extLst>
+              <a:ext uri="{FF2B5EF4-FFF2-40B4-BE49-F238E27FC236}">
+                <a16:creationId xmlns:a16="http://schemas.microsoft.com/office/drawing/2014/main" id="{7DD4C338-1CC3-5C25-4D0E-73A7F5AA938D}"/>
+              </a:ext>
+            </a:extLst>
+          </p:cNvPr>
+          <p:cNvSpPr>
+            <a:spLocks noGrp="1"/>
+          </p:cNvSpPr>
+          <p:nvPr>
+            <p:ph type="title"/>
+          </p:nvPr>
+        </p:nvSpPr>
+        <p:spPr/>
+        <p:txBody>
+          <a:bodyPr/>
+          <a:lstStyle/>
+          <a:p>
+            <a:r>
+              <a:rPr lang="en-US" dirty="0"/>
+              <a:t>Appendix: Kaggle Dataset</a:t>
+            </a:r>
+          </a:p>
+        </p:txBody>
+      </p:sp>
+      <p:sp>
+        <p:nvSpPr>
+          <p:cNvPr id="3" name="Content Placeholder 2">
+            <a:extLst>
+              <a:ext uri="{FF2B5EF4-FFF2-40B4-BE49-F238E27FC236}">
+                <a16:creationId xmlns:a16="http://schemas.microsoft.com/office/drawing/2014/main" id="{C7A91A56-6109-963D-04F9-FA82CB77B9FF}"/>
+              </a:ext>
+            </a:extLst>
+          </p:cNvPr>
+          <p:cNvSpPr>
+            <a:spLocks noGrp="1"/>
+          </p:cNvSpPr>
+          <p:nvPr>
+            <p:ph idx="1"/>
+          </p:nvPr>
+        </p:nvSpPr>
+        <p:spPr/>
+        <p:txBody>
+          <a:bodyPr/>
+          <a:lstStyle/>
+          <a:p>
+            <a:endParaRPr lang="en-US"/>
+          </a:p>
+        </p:txBody>
+      </p:sp>
+    </p:spTree>
+    <p:extLst>
+      <p:ext uri="{BB962C8B-B14F-4D97-AF65-F5344CB8AC3E}">
+        <p14:creationId xmlns:p14="http://schemas.microsoft.com/office/powerpoint/2010/main" val="1780586942"/>
       </p:ext>
     </p:extLst>
   </p:cSld>
@@ -6047,7 +6960,7 @@
           <a:p>
             <a:r>
               <a:rPr lang="en-US" dirty="0"/>
-              <a:t>The complete ASL lexicon consists of a rich vocabulary of complex ideas, thoughts, and phrases</a:t>
+              <a:t>The complete ASL lexicon consists of a rich vocabulary of complex ideas, thoughts, and phrases, not captured by this dataset</a:t>
             </a:r>
           </a:p>
           <a:p>
@@ -6056,7 +6969,7 @@
           <a:p>
             <a:r>
               <a:rPr lang="en-US" dirty="0"/>
-              <a:t>This concept of classifying images, and relating them to letters can be thought of as a proof-of-concept</a:t>
+              <a:t>This concept of classifying images and relating them to letters can be thought of as a proof-of-concept for a much larger work</a:t>
             </a:r>
           </a:p>
           <a:p>
@@ -6065,7 +6978,7 @@
           <a:p>
             <a:r>
               <a:rPr lang="en-US" dirty="0"/>
-              <a:t>Can be extended to recognize a wider range of ASL ideas</a:t>
+              <a:t>Can be extended to recognize a wide range of ASL words, phrases, and inflections in the future</a:t>
             </a:r>
           </a:p>
         </p:txBody>
@@ -6151,7 +7064,7 @@
           <a:p>
             <a:r>
               <a:rPr lang="en-US" dirty="0"/>
-              <a:t>We have acquired a large library of 87,000 images that cover 29 unique classes</a:t>
+              <a:t>We have acquired a large library of 87,000 images that cover 29 unique classes [citation needed]</a:t>
             </a:r>
           </a:p>
           <a:p>
@@ -6160,7 +7073,7 @@
           <a:p>
             <a:r>
               <a:rPr lang="en-US" dirty="0"/>
-              <a:t>Each image is 256 pixels x 256 pixels x 3 channels</a:t>
+              <a:t>Each image is 256 pixels x 256 pixels x 3 channels. Each pixel is represented by a byte, but is cast to a single-precision float on the interval [0.0 , 255.0]</a:t>
             </a:r>
           </a:p>
           <a:p>
@@ -7186,15 +8099,10 @@
             <a:spLocks noGrp="1"/>
           </p:cNvSpPr>
           <p:nvPr>
-            <p:ph sz="half" idx="1"/>
-          </p:nvPr>
-        </p:nvSpPr>
-        <p:spPr>
-          <a:xfrm>
-            <a:off x="818712" y="2222287"/>
-            <a:ext cx="7850041" cy="3638763"/>
-          </a:xfrm>
-        </p:spPr>
+            <p:ph idx="1"/>
+          </p:nvPr>
+        </p:nvSpPr>
+        <p:spPr/>
         <p:txBody>
           <a:bodyPr>
             <a:normAutofit/>
@@ -7234,41 +8142,6 @@
             <a:r>
               <a:rPr lang="en-US" dirty="0"/>
               <a:t>Image size: 200 x 200 x 3 to 184 x 184 x 3</a:t>
-            </a:r>
-          </a:p>
-        </p:txBody>
-      </p:sp>
-      <p:sp>
-        <p:nvSpPr>
-          <p:cNvPr id="4" name="Content Placeholder 3">
-            <a:extLst>
-              <a:ext uri="{FF2B5EF4-FFF2-40B4-BE49-F238E27FC236}">
-                <a16:creationId xmlns:a16="http://schemas.microsoft.com/office/drawing/2014/main" id="{D2350425-554E-42DE-1278-7929BE5E4FCF}"/>
-              </a:ext>
-            </a:extLst>
-          </p:cNvPr>
-          <p:cNvSpPr>
-            <a:spLocks noGrp="1"/>
-          </p:cNvSpPr>
-          <p:nvPr>
-            <p:ph sz="half" idx="2"/>
-          </p:nvPr>
-        </p:nvSpPr>
-        <p:spPr>
-          <a:xfrm>
-            <a:off x="9105355" y="2223958"/>
-            <a:ext cx="2743200" cy="3657600"/>
-          </a:xfrm>
-        </p:spPr>
-        <p:txBody>
-          <a:bodyPr>
-            <a:normAutofit/>
-          </a:bodyPr>
-          <a:lstStyle/>
-          <a:p>
-            <a:r>
-              <a:rPr lang="en-US" dirty="0"/>
-              <a:t>TODO: before &amp; after cropping</a:t>
             </a:r>
           </a:p>
         </p:txBody>
@@ -7326,7 +8199,7 @@
           <a:p>
             <a:r>
               <a:rPr lang="en-US" dirty="0"/>
-              <a:t>Preprocessing – Rescaling</a:t>
+              <a:t>Preprocessing – Remove Padding (cont.)</a:t>
             </a:r>
           </a:p>
         </p:txBody>
@@ -7344,97 +8217,19 @@
             <a:spLocks noGrp="1"/>
           </p:cNvSpPr>
           <p:nvPr>
-            <p:ph sz="half" idx="1"/>
-          </p:nvPr>
-        </p:nvSpPr>
-        <p:spPr>
-          <a:xfrm>
-            <a:off x="818712" y="2222287"/>
-            <a:ext cx="7850041" cy="3638763"/>
-          </a:xfrm>
-        </p:spPr>
+            <p:ph idx="1"/>
+          </p:nvPr>
+        </p:nvSpPr>
+        <p:spPr/>
         <p:txBody>
           <a:bodyPr>
             <a:normAutofit/>
           </a:bodyPr>
           <a:lstStyle/>
           <a:p>
-            <a:endParaRPr lang="en-US" dirty="0"/>
-          </a:p>
-          <a:p>
             <a:r>
               <a:rPr lang="en-US" dirty="0"/>
-              <a:t>We can further reduce the size of the input space by rescaling each image to a smaller size</a:t>
-            </a:r>
-          </a:p>
-          <a:p>
-            <a:r>
-              <a:rPr lang="en-US" dirty="0"/>
-              <a:t>Rescaling will allow each sample to retain the key properties that can be used for discerning between classes</a:t>
-            </a:r>
-          </a:p>
-          <a:p>
-            <a:r>
-              <a:rPr lang="en-US" dirty="0"/>
-              <a:t>By creating a smaller input space, we can also shrink the number of parameters required by the model to classify images</a:t>
-            </a:r>
-          </a:p>
-          <a:p>
-            <a:r>
-              <a:rPr lang="en-US" dirty="0"/>
-              <a:t>A smaller model </a:t>
-            </a:r>
-            <a:r>
-              <a:rPr lang="en-US" i="1" dirty="0"/>
-              <a:t>width</a:t>
-            </a:r>
-            <a:r>
-              <a:rPr lang="en-US" dirty="0"/>
-              <a:t> can help mitigate any overfitting problems</a:t>
-            </a:r>
-          </a:p>
-          <a:p>
-            <a:r>
-              <a:rPr lang="en-US" dirty="0"/>
-              <a:t>Image size: 164 x 164 x 3 to 128 x 128 x 3</a:t>
-            </a:r>
-          </a:p>
-          <a:p>
-            <a:endParaRPr lang="en-US" dirty="0"/>
-          </a:p>
-        </p:txBody>
-      </p:sp>
-      <p:sp>
-        <p:nvSpPr>
-          <p:cNvPr id="4" name="Content Placeholder 3">
-            <a:extLst>
-              <a:ext uri="{FF2B5EF4-FFF2-40B4-BE49-F238E27FC236}">
-                <a16:creationId xmlns:a16="http://schemas.microsoft.com/office/drawing/2014/main" id="{D2350425-554E-42DE-1278-7929BE5E4FCF}"/>
-              </a:ext>
-            </a:extLst>
-          </p:cNvPr>
-          <p:cNvSpPr>
-            <a:spLocks noGrp="1"/>
-          </p:cNvSpPr>
-          <p:nvPr>
-            <p:ph sz="half" idx="2"/>
-          </p:nvPr>
-        </p:nvSpPr>
-        <p:spPr>
-          <a:xfrm>
-            <a:off x="9105355" y="2223958"/>
-            <a:ext cx="2743200" cy="3657600"/>
-          </a:xfrm>
-        </p:spPr>
-        <p:txBody>
-          <a:bodyPr>
-            <a:normAutofit/>
-          </a:bodyPr>
-          <a:lstStyle/>
-          <a:p>
-            <a:r>
-              <a:rPr lang="en-US" dirty="0"/>
-              <a:t>TODO: before &amp; after rescaling</a:t>
+              <a:t>TO DO: Before &amp; After image of removing padding for a few samples</a:t>
             </a:r>
           </a:p>
         </p:txBody>
@@ -7442,7 +8237,7 @@
     </p:spTree>
     <p:extLst>
       <p:ext uri="{BB962C8B-B14F-4D97-AF65-F5344CB8AC3E}">
-        <p14:creationId xmlns:p14="http://schemas.microsoft.com/office/powerpoint/2010/main" val="2458561362"/>
+        <p14:creationId xmlns:p14="http://schemas.microsoft.com/office/powerpoint/2010/main" val="632820501"/>
       </p:ext>
     </p:extLst>
   </p:cSld>
@@ -7474,7 +8269,7 @@
           <p:cNvPr id="2" name="Title 1">
             <a:extLst>
               <a:ext uri="{FF2B5EF4-FFF2-40B4-BE49-F238E27FC236}">
-                <a16:creationId xmlns:a16="http://schemas.microsoft.com/office/drawing/2014/main" id="{BF209E95-9A62-B3EF-AB6C-7EDB0DD50B84}"/>
+                <a16:creationId xmlns:a16="http://schemas.microsoft.com/office/drawing/2014/main" id="{7CC55D19-78EF-2A2C-D779-6B88B9C93B0B}"/>
               </a:ext>
             </a:extLst>
           </p:cNvPr>
@@ -7491,19 +8286,18 @@
           <a:lstStyle/>
           <a:p>
             <a:r>
-              <a:rPr lang="en-US" dirty="0" err="1"/>
-              <a:t>Appendex</a:t>
-            </a:r>
-            <a:endParaRPr lang="en-US" dirty="0"/>
-          </a:p>
-        </p:txBody>
-      </p:sp>
-      <p:sp>
-        <p:nvSpPr>
-          <p:cNvPr id="3" name="Text Placeholder 2">
+              <a:rPr lang="en-US" dirty="0"/>
+              <a:t>Preprocessing – Rescaling</a:t>
+            </a:r>
+          </a:p>
+        </p:txBody>
+      </p:sp>
+      <p:sp>
+        <p:nvSpPr>
+          <p:cNvPr id="3" name="Content Placeholder 2">
             <a:extLst>
               <a:ext uri="{FF2B5EF4-FFF2-40B4-BE49-F238E27FC236}">
-                <a16:creationId xmlns:a16="http://schemas.microsoft.com/office/drawing/2014/main" id="{C9A403C5-D031-86CE-17D7-6A4E78B300EA}"/>
+                <a16:creationId xmlns:a16="http://schemas.microsoft.com/office/drawing/2014/main" id="{4C1D2451-131B-2E4F-F0D9-C7096824E5D1}"/>
               </a:ext>
             </a:extLst>
           </p:cNvPr>
@@ -7511,22 +8305,65 @@
             <a:spLocks noGrp="1"/>
           </p:cNvSpPr>
           <p:nvPr>
-            <p:ph type="body" idx="1"/>
+            <p:ph idx="1"/>
           </p:nvPr>
         </p:nvSpPr>
         <p:spPr/>
         <p:txBody>
-          <a:bodyPr/>
-          <a:lstStyle/>
-          <a:p>
-            <a:endParaRPr lang="en-US"/>
+          <a:bodyPr>
+            <a:normAutofit/>
+          </a:bodyPr>
+          <a:lstStyle/>
+          <a:p>
+            <a:endParaRPr lang="en-US" dirty="0"/>
+          </a:p>
+          <a:p>
+            <a:r>
+              <a:rPr lang="en-US" dirty="0"/>
+              <a:t>We can further reduce the size of the input space by rescaling each image to a smaller size</a:t>
+            </a:r>
+          </a:p>
+          <a:p>
+            <a:r>
+              <a:rPr lang="en-US" dirty="0"/>
+              <a:t>Rescaling will allow each sample to retain the key properties that can be used for discerning between classes</a:t>
+            </a:r>
+          </a:p>
+          <a:p>
+            <a:r>
+              <a:rPr lang="en-US" dirty="0"/>
+              <a:t>By creating a smaller input space, we can also shrink the number of parameters required by the model to classify images</a:t>
+            </a:r>
+          </a:p>
+          <a:p>
+            <a:r>
+              <a:rPr lang="en-US" dirty="0"/>
+              <a:t>A smaller model </a:t>
+            </a:r>
+            <a:r>
+              <a:rPr lang="en-US" i="1" dirty="0"/>
+              <a:t>width</a:t>
+            </a:r>
+            <a:r>
+              <a:rPr lang="en-US" dirty="0"/>
+              <a:t> can help mitigate any overfitting problems</a:t>
+            </a:r>
+          </a:p>
+          <a:p>
+            <a:r>
+              <a:rPr lang="en-US" dirty="0"/>
+              <a:t>Image size: 164 x 164 x 3 to 128 x 128 x 3</a:t>
+            </a:r>
+          </a:p>
+          <a:p>
+            <a:endParaRPr lang="en-US" dirty="0"/>
           </a:p>
         </p:txBody>
       </p:sp>
     </p:spTree>
     <p:extLst>
       <p:ext uri="{BB962C8B-B14F-4D97-AF65-F5344CB8AC3E}">
-        <p14:creationId xmlns:p14="http://schemas.microsoft.com/office/powerpoint/2010/main" val="2814912908"/>
+        <p14:creationId xmlns:p14="http://schemas.microsoft.com/office/powerpoint/2010/main" val="2458561362"/>
       </p:ext>
     </p:extLst>
   </p:cSld>

</xml_diff>

<commit_message>
Added notes about the model & x-validation
</commit_message>
<xml_diff>
--- a/milestones/BUELL_ENGR6970_Milestone04.pptx
+++ b/milestones/BUELL_ENGR6970_Milestone04.pptx
@@ -20,10 +20,16 @@
     <p:sldId id="271" r:id="rId14"/>
     <p:sldId id="272" r:id="rId15"/>
     <p:sldId id="273" r:id="rId16"/>
-    <p:sldId id="274" r:id="rId17"/>
-    <p:sldId id="264" r:id="rId18"/>
-    <p:sldId id="265" r:id="rId19"/>
-    <p:sldId id="269" r:id="rId20"/>
+    <p:sldId id="275" r:id="rId17"/>
+    <p:sldId id="274" r:id="rId18"/>
+    <p:sldId id="276" r:id="rId19"/>
+    <p:sldId id="278" r:id="rId20"/>
+    <p:sldId id="279" r:id="rId21"/>
+    <p:sldId id="277" r:id="rId22"/>
+    <p:sldId id="280" r:id="rId23"/>
+    <p:sldId id="264" r:id="rId24"/>
+    <p:sldId id="265" r:id="rId25"/>
+    <p:sldId id="269" r:id="rId26"/>
   </p:sldIdLst>
   <p:sldSz cx="12192000" cy="6858000"/>
   <p:notesSz cx="6858000" cy="9144000"/>
@@ -225,7 +231,7 @@
           <a:effectLst/>
           <a:extLst>
             <a:ext uri="{91240B29-F687-4f45-9708-019B960494DF}">
-              <a14:hiddenLine xmlns:a14="http://schemas.microsoft.com/office/drawing/2010/main" xmlns="" w="9525">
+              <a14:hiddenLine xmlns="" xmlns:a14="http://schemas.microsoft.com/office/drawing/2010/main" w="9525">
                 <a:solidFill>
                   <a:srgbClr val="000000"/>
                 </a:solidFill>
@@ -1747,7 +1753,7 @@
           <a:ln/>
           <a:extLst>
             <a:ext uri="{91240B29-F687-4f45-9708-019B960494DF}">
-              <a14:hiddenLine xmlns:a14="http://schemas.microsoft.com/office/drawing/2010/main" xmlns="" w="9525">
+              <a14:hiddenLine xmlns="" xmlns:a14="http://schemas.microsoft.com/office/drawing/2010/main" w="9525">
                 <a:solidFill>
                   <a:srgbClr val="000000"/>
                 </a:solidFill>
@@ -2022,7 +2028,7 @@
           <a:ln/>
           <a:extLst>
             <a:ext uri="{91240B29-F687-4f45-9708-019B960494DF}">
-              <a14:hiddenLine xmlns:a14="http://schemas.microsoft.com/office/drawing/2010/main" xmlns="" w="9525">
+              <a14:hiddenLine xmlns="" xmlns:a14="http://schemas.microsoft.com/office/drawing/2010/main" w="9525">
                 <a:solidFill>
                   <a:srgbClr val="000000"/>
                 </a:solidFill>
@@ -2305,7 +2311,7 @@
           <a:ln/>
           <a:extLst>
             <a:ext uri="{91240B29-F687-4f45-9708-019B960494DF}">
-              <a14:hiddenLine xmlns:a14="http://schemas.microsoft.com/office/drawing/2010/main" xmlns="" w="9525">
+              <a14:hiddenLine xmlns="" xmlns:a14="http://schemas.microsoft.com/office/drawing/2010/main" w="9525">
                 <a:solidFill>
                   <a:srgbClr val="000000"/>
                 </a:solidFill>
@@ -2931,7 +2937,7 @@
           <a:ln/>
           <a:extLst>
             <a:ext uri="{91240B29-F687-4f45-9708-019B960494DF}">
-              <a14:hiddenLine xmlns:a14="http://schemas.microsoft.com/office/drawing/2010/main" xmlns="" w="9525">
+              <a14:hiddenLine xmlns="" xmlns:a14="http://schemas.microsoft.com/office/drawing/2010/main" w="9525">
                 <a:solidFill>
                   <a:srgbClr val="000000"/>
                 </a:solidFill>
@@ -3270,7 +3276,7 @@
           <a:ln/>
           <a:extLst>
             <a:ext uri="{91240B29-F687-4f45-9708-019B960494DF}">
-              <a14:hiddenLine xmlns:a14="http://schemas.microsoft.com/office/drawing/2010/main" xmlns="" w="9525">
+              <a14:hiddenLine xmlns="" xmlns:a14="http://schemas.microsoft.com/office/drawing/2010/main" w="9525">
                 <a:solidFill>
                   <a:srgbClr val="000000"/>
                 </a:solidFill>
@@ -3747,7 +3753,7 @@
           <a:ln/>
           <a:extLst>
             <a:ext uri="{91240B29-F687-4f45-9708-019B960494DF}">
-              <a14:hiddenLine xmlns:a14="http://schemas.microsoft.com/office/drawing/2010/main" xmlns="" w="9525">
+              <a14:hiddenLine xmlns="" xmlns:a14="http://schemas.microsoft.com/office/drawing/2010/main" w="9525">
                 <a:solidFill>
                   <a:srgbClr val="000000"/>
                 </a:solidFill>
@@ -4176,7 +4182,7 @@
           <a:ln/>
           <a:extLst>
             <a:ext uri="{91240B29-F687-4f45-9708-019B960494DF}">
-              <a14:hiddenLine xmlns:a14="http://schemas.microsoft.com/office/drawing/2010/main" xmlns="" w="9525">
+              <a14:hiddenLine xmlns="" xmlns:a14="http://schemas.microsoft.com/office/drawing/2010/main" w="9525">
                 <a:solidFill>
                   <a:srgbClr val="000000"/>
                 </a:solidFill>
@@ -6053,7 +6059,7 @@
           <a:p>
             <a:r>
               <a:rPr lang="en-US" dirty="0"/>
-              <a:t>The Classification Model</a:t>
+              <a:t>The Classification Model (cont.)</a:t>
             </a:r>
           </a:p>
         </p:txBody>
@@ -6076,7 +6082,9 @@
         </p:nvSpPr>
         <p:spPr/>
         <p:txBody>
-          <a:bodyPr/>
+          <a:bodyPr>
+            <a:normAutofit/>
+          </a:bodyPr>
           <a:lstStyle/>
           <a:p>
             <a:r>
@@ -6093,9 +6101,25 @@
             </a:r>
           </a:p>
           <a:p>
-            <a:r>
-              <a:rPr lang="en-US" dirty="0"/>
-              <a:t>The feature map is passed through a </a:t>
+            <a:endParaRPr lang="en-US" dirty="0"/>
+          </a:p>
+          <a:p>
+            <a:r>
+              <a:rPr lang="en-US" dirty="0"/>
+              <a:t>The feature map is vector of numbers that we call a </a:t>
+            </a:r>
+            <a:r>
+              <a:rPr lang="en-US" i="1" dirty="0"/>
+              <a:t>layer of neurons</a:t>
+            </a:r>
+          </a:p>
+          <a:p>
+            <a:endParaRPr lang="en-US" i="1" dirty="0"/>
+          </a:p>
+          <a:p>
+            <a:r>
+              <a:rPr lang="en-US" dirty="0"/>
+              <a:t>The layer of neurons is passed through a </a:t>
             </a:r>
             <a:r>
               <a:rPr lang="en-US" i="1" dirty="0"/>
@@ -6107,9 +6131,12 @@
             </a:r>
           </a:p>
           <a:p>
-            <a:r>
-              <a:rPr lang="en-US" dirty="0"/>
-              <a:t>After all transformations, the final outputs are rescaled </a:t>
+            <a:endParaRPr lang="en-US" dirty="0"/>
+          </a:p>
+          <a:p>
+            <a:r>
+              <a:rPr lang="en-US" dirty="0"/>
+              <a:t>The final layer has one neuron per unique class in the dataset – 29 in our case</a:t>
             </a:r>
           </a:p>
           <a:p>
@@ -6152,7 +6179,7 @@
           <p:cNvPr id="2" name="Title 1">
             <a:extLst>
               <a:ext uri="{FF2B5EF4-FFF2-40B4-BE49-F238E27FC236}">
-                <a16:creationId xmlns:a16="http://schemas.microsoft.com/office/drawing/2014/main" id="{7F1B47B1-51BA-066E-2082-A443E039EFC8}"/>
+                <a16:creationId xmlns:a16="http://schemas.microsoft.com/office/drawing/2014/main" id="{9F69199B-4027-7C19-B8F7-1E212DFA2EEC}"/>
               </a:ext>
             </a:extLst>
           </p:cNvPr>
@@ -6170,11 +6197,7 @@
           <a:p>
             <a:r>
               <a:rPr lang="en-US" dirty="0"/>
-              <a:t>Chosen </a:t>
-            </a:r>
-            <a:r>
-              <a:rPr lang="en-US"/>
-              <a:t>CNN Architecture</a:t>
+              <a:t>Example Output</a:t>
             </a:r>
           </a:p>
         </p:txBody>
@@ -6184,7 +6207,7 @@
           <p:cNvPr id="3" name="Content Placeholder 2">
             <a:extLst>
               <a:ext uri="{FF2B5EF4-FFF2-40B4-BE49-F238E27FC236}">
-                <a16:creationId xmlns:a16="http://schemas.microsoft.com/office/drawing/2014/main" id="{785886C6-8935-94B1-0ECD-6A2564D8F0F4}"/>
+                <a16:creationId xmlns:a16="http://schemas.microsoft.com/office/drawing/2014/main" id="{E7A43D4F-6504-309F-B9E2-387979056E31}"/>
               </a:ext>
             </a:extLst>
           </p:cNvPr>
@@ -6200,6 +6223,588 @@
           <a:bodyPr/>
           <a:lstStyle/>
           <a:p>
+            <a:r>
+              <a:rPr lang="en-US" dirty="0"/>
+              <a:t>It is scaled such that it can be treated as a probability distribution for what class a sample is likely to belong to</a:t>
+            </a:r>
+          </a:p>
+          <a:p>
+            <a:r>
+              <a:rPr lang="en-US" dirty="0"/>
+              <a:t>The neuron with the highest number or </a:t>
+            </a:r>
+            <a:r>
+              <a:rPr lang="en-US" i="1" dirty="0"/>
+              <a:t>brightest</a:t>
+            </a:r>
+            <a:r>
+              <a:rPr lang="en-US" dirty="0"/>
+              <a:t> </a:t>
+            </a:r>
+            <a:r>
+              <a:rPr lang="en-US" i="1" dirty="0"/>
+              <a:t>activation</a:t>
+            </a:r>
+            <a:r>
+              <a:rPr lang="en-US" dirty="0"/>
+              <a:t> is the class that the sample is predicted to belong to</a:t>
+            </a:r>
+          </a:p>
+          <a:p>
+            <a:r>
+              <a:rPr lang="en-US" dirty="0"/>
+              <a:t>A simple example with 10 classes:</a:t>
+            </a:r>
+          </a:p>
+          <a:p>
+            <a:endParaRPr lang="en-US" dirty="0"/>
+          </a:p>
+          <a:p>
+            <a:endParaRPr lang="en-US" dirty="0"/>
+          </a:p>
+          <a:p>
+            <a:endParaRPr lang="en-US" dirty="0"/>
+          </a:p>
+          <a:p>
+            <a:r>
+              <a:rPr lang="en-US" dirty="0"/>
+              <a:t>The sample is predicted to belong to class #4 (zero-indexed)</a:t>
+            </a:r>
+          </a:p>
+        </p:txBody>
+      </p:sp>
+      <p:sp>
+        <p:nvSpPr>
+          <p:cNvPr id="4" name="TextBox 3">
+            <a:extLst>
+              <a:ext uri="{FF2B5EF4-FFF2-40B4-BE49-F238E27FC236}">
+                <a16:creationId xmlns:a16="http://schemas.microsoft.com/office/drawing/2014/main" id="{A998D0FF-BF76-1CCD-872C-E2E2CD9DA719}"/>
+              </a:ext>
+            </a:extLst>
+          </p:cNvPr>
+          <p:cNvSpPr txBox="1"/>
+          <p:nvPr/>
+        </p:nvSpPr>
+        <p:spPr>
+          <a:xfrm>
+            <a:off x="1524000" y="4502818"/>
+            <a:ext cx="914400" cy="369332"/>
+          </a:xfrm>
+          <a:prstGeom prst="rect">
+            <a:avLst/>
+          </a:prstGeom>
+        </p:spPr>
+        <p:style>
+          <a:lnRef idx="2">
+            <a:schemeClr val="accent2"/>
+          </a:lnRef>
+          <a:fillRef idx="1">
+            <a:schemeClr val="lt1"/>
+          </a:fillRef>
+          <a:effectRef idx="0">
+            <a:schemeClr val="accent2"/>
+          </a:effectRef>
+          <a:fontRef idx="minor">
+            <a:schemeClr val="dk1"/>
+          </a:fontRef>
+        </p:style>
+        <p:txBody>
+          <a:bodyPr wrap="square" rtlCol="0">
+            <a:spAutoFit/>
+          </a:bodyPr>
+          <a:lstStyle/>
+          <a:p>
+            <a:pPr algn="ctr"/>
+            <a:r>
+              <a:rPr lang="en-US" dirty="0"/>
+              <a:t>0.05</a:t>
+            </a:r>
+          </a:p>
+        </p:txBody>
+      </p:sp>
+      <p:sp>
+        <p:nvSpPr>
+          <p:cNvPr id="5" name="TextBox 4">
+            <a:extLst>
+              <a:ext uri="{FF2B5EF4-FFF2-40B4-BE49-F238E27FC236}">
+                <a16:creationId xmlns:a16="http://schemas.microsoft.com/office/drawing/2014/main" id="{B4D01001-2014-FCD1-532E-12BF8C2F1259}"/>
+              </a:ext>
+            </a:extLst>
+          </p:cNvPr>
+          <p:cNvSpPr txBox="1"/>
+          <p:nvPr/>
+        </p:nvSpPr>
+        <p:spPr>
+          <a:xfrm>
+            <a:off x="2438400" y="4502818"/>
+            <a:ext cx="914400" cy="369332"/>
+          </a:xfrm>
+          <a:prstGeom prst="rect">
+            <a:avLst/>
+          </a:prstGeom>
+        </p:spPr>
+        <p:style>
+          <a:lnRef idx="2">
+            <a:schemeClr val="accent2"/>
+          </a:lnRef>
+          <a:fillRef idx="1">
+            <a:schemeClr val="lt1"/>
+          </a:fillRef>
+          <a:effectRef idx="0">
+            <a:schemeClr val="accent2"/>
+          </a:effectRef>
+          <a:fontRef idx="minor">
+            <a:schemeClr val="dk1"/>
+          </a:fontRef>
+        </p:style>
+        <p:txBody>
+          <a:bodyPr wrap="square" rtlCol="0">
+            <a:spAutoFit/>
+          </a:bodyPr>
+          <a:lstStyle/>
+          <a:p>
+            <a:pPr algn="ctr"/>
+            <a:r>
+              <a:rPr lang="en-US" dirty="0"/>
+              <a:t>0.1</a:t>
+            </a:r>
+          </a:p>
+        </p:txBody>
+      </p:sp>
+      <p:sp>
+        <p:nvSpPr>
+          <p:cNvPr id="6" name="TextBox 5">
+            <a:extLst>
+              <a:ext uri="{FF2B5EF4-FFF2-40B4-BE49-F238E27FC236}">
+                <a16:creationId xmlns:a16="http://schemas.microsoft.com/office/drawing/2014/main" id="{C3881728-8B4E-5281-531C-6665F4193BB8}"/>
+              </a:ext>
+            </a:extLst>
+          </p:cNvPr>
+          <p:cNvSpPr txBox="1"/>
+          <p:nvPr/>
+        </p:nvSpPr>
+        <p:spPr>
+          <a:xfrm>
+            <a:off x="3352800" y="4502818"/>
+            <a:ext cx="914400" cy="369332"/>
+          </a:xfrm>
+          <a:prstGeom prst="rect">
+            <a:avLst/>
+          </a:prstGeom>
+        </p:spPr>
+        <p:style>
+          <a:lnRef idx="2">
+            <a:schemeClr val="accent2"/>
+          </a:lnRef>
+          <a:fillRef idx="1">
+            <a:schemeClr val="lt1"/>
+          </a:fillRef>
+          <a:effectRef idx="0">
+            <a:schemeClr val="accent2"/>
+          </a:effectRef>
+          <a:fontRef idx="minor">
+            <a:schemeClr val="dk1"/>
+          </a:fontRef>
+        </p:style>
+        <p:txBody>
+          <a:bodyPr wrap="square" rtlCol="0">
+            <a:spAutoFit/>
+          </a:bodyPr>
+          <a:lstStyle/>
+          <a:p>
+            <a:pPr algn="ctr"/>
+            <a:r>
+              <a:rPr lang="en-US" dirty="0"/>
+              <a:t>0.05</a:t>
+            </a:r>
+          </a:p>
+        </p:txBody>
+      </p:sp>
+      <p:sp>
+        <p:nvSpPr>
+          <p:cNvPr id="7" name="TextBox 6">
+            <a:extLst>
+              <a:ext uri="{FF2B5EF4-FFF2-40B4-BE49-F238E27FC236}">
+                <a16:creationId xmlns:a16="http://schemas.microsoft.com/office/drawing/2014/main" id="{D373BECC-DE5A-386E-1AE4-A24950656187}"/>
+              </a:ext>
+            </a:extLst>
+          </p:cNvPr>
+          <p:cNvSpPr txBox="1"/>
+          <p:nvPr/>
+        </p:nvSpPr>
+        <p:spPr>
+          <a:xfrm>
+            <a:off x="4267200" y="4502818"/>
+            <a:ext cx="914400" cy="369332"/>
+          </a:xfrm>
+          <a:prstGeom prst="rect">
+            <a:avLst/>
+          </a:prstGeom>
+        </p:spPr>
+        <p:style>
+          <a:lnRef idx="2">
+            <a:schemeClr val="accent2"/>
+          </a:lnRef>
+          <a:fillRef idx="1">
+            <a:schemeClr val="lt1"/>
+          </a:fillRef>
+          <a:effectRef idx="0">
+            <a:schemeClr val="accent2"/>
+          </a:effectRef>
+          <a:fontRef idx="minor">
+            <a:schemeClr val="dk1"/>
+          </a:fontRef>
+        </p:style>
+        <p:txBody>
+          <a:bodyPr wrap="square" rtlCol="0">
+            <a:spAutoFit/>
+          </a:bodyPr>
+          <a:lstStyle/>
+          <a:p>
+            <a:pPr algn="ctr"/>
+            <a:r>
+              <a:rPr lang="en-US" dirty="0"/>
+              <a:t>0.04</a:t>
+            </a:r>
+          </a:p>
+        </p:txBody>
+      </p:sp>
+      <p:sp>
+        <p:nvSpPr>
+          <p:cNvPr id="8" name="TextBox 7">
+            <a:extLst>
+              <a:ext uri="{FF2B5EF4-FFF2-40B4-BE49-F238E27FC236}">
+                <a16:creationId xmlns:a16="http://schemas.microsoft.com/office/drawing/2014/main" id="{77D51890-7F29-6183-B104-73EDCA8321E0}"/>
+              </a:ext>
+            </a:extLst>
+          </p:cNvPr>
+          <p:cNvSpPr txBox="1"/>
+          <p:nvPr/>
+        </p:nvSpPr>
+        <p:spPr>
+          <a:xfrm>
+            <a:off x="5181600" y="4502818"/>
+            <a:ext cx="914400" cy="369332"/>
+          </a:xfrm>
+          <a:prstGeom prst="rect">
+            <a:avLst/>
+          </a:prstGeom>
+        </p:spPr>
+        <p:style>
+          <a:lnRef idx="2">
+            <a:schemeClr val="accent2"/>
+          </a:lnRef>
+          <a:fillRef idx="1">
+            <a:schemeClr val="lt1"/>
+          </a:fillRef>
+          <a:effectRef idx="0">
+            <a:schemeClr val="accent2"/>
+          </a:effectRef>
+          <a:fontRef idx="minor">
+            <a:schemeClr val="dk1"/>
+          </a:fontRef>
+        </p:style>
+        <p:txBody>
+          <a:bodyPr wrap="square" rtlCol="0">
+            <a:spAutoFit/>
+          </a:bodyPr>
+          <a:lstStyle/>
+          <a:p>
+            <a:pPr algn="ctr"/>
+            <a:r>
+              <a:rPr lang="en-US" dirty="0"/>
+              <a:t>0.6</a:t>
+            </a:r>
+          </a:p>
+        </p:txBody>
+      </p:sp>
+      <p:sp>
+        <p:nvSpPr>
+          <p:cNvPr id="9" name="TextBox 8">
+            <a:extLst>
+              <a:ext uri="{FF2B5EF4-FFF2-40B4-BE49-F238E27FC236}">
+                <a16:creationId xmlns:a16="http://schemas.microsoft.com/office/drawing/2014/main" id="{3D849EB0-BD0D-B99C-40D4-02FF4D84447B}"/>
+              </a:ext>
+            </a:extLst>
+          </p:cNvPr>
+          <p:cNvSpPr txBox="1"/>
+          <p:nvPr/>
+        </p:nvSpPr>
+        <p:spPr>
+          <a:xfrm>
+            <a:off x="6096000" y="4502818"/>
+            <a:ext cx="914400" cy="369332"/>
+          </a:xfrm>
+          <a:prstGeom prst="rect">
+            <a:avLst/>
+          </a:prstGeom>
+        </p:spPr>
+        <p:style>
+          <a:lnRef idx="2">
+            <a:schemeClr val="accent2"/>
+          </a:lnRef>
+          <a:fillRef idx="1">
+            <a:schemeClr val="lt1"/>
+          </a:fillRef>
+          <a:effectRef idx="0">
+            <a:schemeClr val="accent2"/>
+          </a:effectRef>
+          <a:fontRef idx="minor">
+            <a:schemeClr val="dk1"/>
+          </a:fontRef>
+        </p:style>
+        <p:txBody>
+          <a:bodyPr wrap="square" rtlCol="0">
+            <a:spAutoFit/>
+          </a:bodyPr>
+          <a:lstStyle/>
+          <a:p>
+            <a:pPr algn="ctr"/>
+            <a:r>
+              <a:rPr lang="en-US" dirty="0"/>
+              <a:t>0.06</a:t>
+            </a:r>
+          </a:p>
+        </p:txBody>
+      </p:sp>
+      <p:sp>
+        <p:nvSpPr>
+          <p:cNvPr id="10" name="TextBox 9">
+            <a:extLst>
+              <a:ext uri="{FF2B5EF4-FFF2-40B4-BE49-F238E27FC236}">
+                <a16:creationId xmlns:a16="http://schemas.microsoft.com/office/drawing/2014/main" id="{961230D4-B1D3-ABBE-D0C6-802B3A1C3C97}"/>
+              </a:ext>
+            </a:extLst>
+          </p:cNvPr>
+          <p:cNvSpPr txBox="1"/>
+          <p:nvPr/>
+        </p:nvSpPr>
+        <p:spPr>
+          <a:xfrm>
+            <a:off x="7010400" y="4502818"/>
+            <a:ext cx="914400" cy="369332"/>
+          </a:xfrm>
+          <a:prstGeom prst="rect">
+            <a:avLst/>
+          </a:prstGeom>
+        </p:spPr>
+        <p:style>
+          <a:lnRef idx="2">
+            <a:schemeClr val="accent2"/>
+          </a:lnRef>
+          <a:fillRef idx="1">
+            <a:schemeClr val="lt1"/>
+          </a:fillRef>
+          <a:effectRef idx="0">
+            <a:schemeClr val="accent2"/>
+          </a:effectRef>
+          <a:fontRef idx="minor">
+            <a:schemeClr val="dk1"/>
+          </a:fontRef>
+        </p:style>
+        <p:txBody>
+          <a:bodyPr wrap="square" rtlCol="0">
+            <a:spAutoFit/>
+          </a:bodyPr>
+          <a:lstStyle/>
+          <a:p>
+            <a:pPr algn="ctr"/>
+            <a:r>
+              <a:rPr lang="en-US" dirty="0"/>
+              <a:t>0.05</a:t>
+            </a:r>
+          </a:p>
+        </p:txBody>
+      </p:sp>
+      <p:sp>
+        <p:nvSpPr>
+          <p:cNvPr id="11" name="TextBox 10">
+            <a:extLst>
+              <a:ext uri="{FF2B5EF4-FFF2-40B4-BE49-F238E27FC236}">
+                <a16:creationId xmlns:a16="http://schemas.microsoft.com/office/drawing/2014/main" id="{F0DB4109-3572-9B5C-A9C7-265F96DF6C7A}"/>
+              </a:ext>
+            </a:extLst>
+          </p:cNvPr>
+          <p:cNvSpPr txBox="1"/>
+          <p:nvPr/>
+        </p:nvSpPr>
+        <p:spPr>
+          <a:xfrm>
+            <a:off x="7924800" y="4502818"/>
+            <a:ext cx="914400" cy="369332"/>
+          </a:xfrm>
+          <a:prstGeom prst="rect">
+            <a:avLst/>
+          </a:prstGeom>
+        </p:spPr>
+        <p:style>
+          <a:lnRef idx="2">
+            <a:schemeClr val="accent2"/>
+          </a:lnRef>
+          <a:fillRef idx="1">
+            <a:schemeClr val="lt1"/>
+          </a:fillRef>
+          <a:effectRef idx="0">
+            <a:schemeClr val="accent2"/>
+          </a:effectRef>
+          <a:fontRef idx="minor">
+            <a:schemeClr val="dk1"/>
+          </a:fontRef>
+        </p:style>
+        <p:txBody>
+          <a:bodyPr wrap="square" rtlCol="0">
+            <a:spAutoFit/>
+          </a:bodyPr>
+          <a:lstStyle/>
+          <a:p>
+            <a:pPr algn="ctr"/>
+            <a:r>
+              <a:rPr lang="en-US" dirty="0"/>
+              <a:t>0.02</a:t>
+            </a:r>
+          </a:p>
+        </p:txBody>
+      </p:sp>
+      <p:sp>
+        <p:nvSpPr>
+          <p:cNvPr id="12" name="TextBox 11">
+            <a:extLst>
+              <a:ext uri="{FF2B5EF4-FFF2-40B4-BE49-F238E27FC236}">
+                <a16:creationId xmlns:a16="http://schemas.microsoft.com/office/drawing/2014/main" id="{48D6BF0D-C909-7D97-465B-F8E2851C6ED3}"/>
+              </a:ext>
+            </a:extLst>
+          </p:cNvPr>
+          <p:cNvSpPr txBox="1"/>
+          <p:nvPr/>
+        </p:nvSpPr>
+        <p:spPr>
+          <a:xfrm>
+            <a:off x="8839200" y="4502818"/>
+            <a:ext cx="914400" cy="369332"/>
+          </a:xfrm>
+          <a:prstGeom prst="rect">
+            <a:avLst/>
+          </a:prstGeom>
+        </p:spPr>
+        <p:style>
+          <a:lnRef idx="2">
+            <a:schemeClr val="accent2"/>
+          </a:lnRef>
+          <a:fillRef idx="1">
+            <a:schemeClr val="lt1"/>
+          </a:fillRef>
+          <a:effectRef idx="0">
+            <a:schemeClr val="accent2"/>
+          </a:effectRef>
+          <a:fontRef idx="minor">
+            <a:schemeClr val="dk1"/>
+          </a:fontRef>
+        </p:style>
+        <p:txBody>
+          <a:bodyPr wrap="square" rtlCol="0">
+            <a:spAutoFit/>
+          </a:bodyPr>
+          <a:lstStyle/>
+          <a:p>
+            <a:pPr algn="ctr"/>
+            <a:r>
+              <a:rPr lang="en-US" dirty="0"/>
+              <a:t>0.02</a:t>
+            </a:r>
+          </a:p>
+        </p:txBody>
+      </p:sp>
+      <p:sp>
+        <p:nvSpPr>
+          <p:cNvPr id="13" name="TextBox 12">
+            <a:extLst>
+              <a:ext uri="{FF2B5EF4-FFF2-40B4-BE49-F238E27FC236}">
+                <a16:creationId xmlns:a16="http://schemas.microsoft.com/office/drawing/2014/main" id="{E39B8E44-69E0-4C3A-C1C0-7F2CDC85B801}"/>
+              </a:ext>
+            </a:extLst>
+          </p:cNvPr>
+          <p:cNvSpPr txBox="1"/>
+          <p:nvPr/>
+        </p:nvSpPr>
+        <p:spPr>
+          <a:xfrm>
+            <a:off x="9753600" y="4502818"/>
+            <a:ext cx="914400" cy="369332"/>
+          </a:xfrm>
+          <a:prstGeom prst="rect">
+            <a:avLst/>
+          </a:prstGeom>
+        </p:spPr>
+        <p:style>
+          <a:lnRef idx="2">
+            <a:schemeClr val="accent2"/>
+          </a:lnRef>
+          <a:fillRef idx="1">
+            <a:schemeClr val="lt1"/>
+          </a:fillRef>
+          <a:effectRef idx="0">
+            <a:schemeClr val="accent2"/>
+          </a:effectRef>
+          <a:fontRef idx="minor">
+            <a:schemeClr val="dk1"/>
+          </a:fontRef>
+        </p:style>
+        <p:txBody>
+          <a:bodyPr wrap="square" rtlCol="0">
+            <a:spAutoFit/>
+          </a:bodyPr>
+          <a:lstStyle/>
+          <a:p>
+            <a:pPr algn="ctr"/>
+            <a:r>
+              <a:rPr lang="en-US" dirty="0"/>
+              <a:t>0.01</a:t>
+            </a:r>
+          </a:p>
+        </p:txBody>
+      </p:sp>
+      <p:sp>
+        <p:nvSpPr>
+          <p:cNvPr id="14" name="Oval 13">
+            <a:extLst>
+              <a:ext uri="{FF2B5EF4-FFF2-40B4-BE49-F238E27FC236}">
+                <a16:creationId xmlns:a16="http://schemas.microsoft.com/office/drawing/2014/main" id="{8075FBFA-7295-3B5B-CF9C-5CABD6A40801}"/>
+              </a:ext>
+            </a:extLst>
+          </p:cNvPr>
+          <p:cNvSpPr/>
+          <p:nvPr/>
+        </p:nvSpPr>
+        <p:spPr>
+          <a:xfrm>
+            <a:off x="5119437" y="4251339"/>
+            <a:ext cx="1124952" cy="872290"/>
+          </a:xfrm>
+          <a:prstGeom prst="ellipse">
+            <a:avLst/>
+          </a:prstGeom>
+          <a:noFill/>
+          <a:ln w="38100"/>
+        </p:spPr>
+        <p:style>
+          <a:lnRef idx="2">
+            <a:schemeClr val="accent6"/>
+          </a:lnRef>
+          <a:fillRef idx="1">
+            <a:schemeClr val="lt1"/>
+          </a:fillRef>
+          <a:effectRef idx="0">
+            <a:schemeClr val="accent6"/>
+          </a:effectRef>
+          <a:fontRef idx="minor">
+            <a:schemeClr val="dk1"/>
+          </a:fontRef>
+        </p:style>
+        <p:txBody>
+          <a:bodyPr rtlCol="0" anchor="ctr"/>
+          <a:lstStyle/>
+          <a:p>
+            <a:pPr algn="ctr"/>
             <a:endParaRPr lang="en-US"/>
           </a:p>
         </p:txBody>
@@ -6207,7 +6812,7 @@
     </p:spTree>
     <p:extLst>
       <p:ext uri="{BB962C8B-B14F-4D97-AF65-F5344CB8AC3E}">
-        <p14:creationId xmlns:p14="http://schemas.microsoft.com/office/powerpoint/2010/main" val="2778027350"/>
+        <p14:creationId xmlns:p14="http://schemas.microsoft.com/office/powerpoint/2010/main" val="134976910"/>
       </p:ext>
     </p:extLst>
   </p:cSld>
@@ -6239,7 +6844,7 @@
           <p:cNvPr id="2" name="Title 1">
             <a:extLst>
               <a:ext uri="{FF2B5EF4-FFF2-40B4-BE49-F238E27FC236}">
-                <a16:creationId xmlns:a16="http://schemas.microsoft.com/office/drawing/2014/main" id="{BF209E95-9A62-B3EF-AB6C-7EDB0DD50B84}"/>
+                <a16:creationId xmlns:a16="http://schemas.microsoft.com/office/drawing/2014/main" id="{7F1B47B1-51BA-066E-2082-A443E039EFC8}"/>
               </a:ext>
             </a:extLst>
           </p:cNvPr>
@@ -6256,19 +6861,22 @@
           <a:lstStyle/>
           <a:p>
             <a:r>
-              <a:rPr lang="en-US" dirty="0" err="1"/>
-              <a:t>Appendex</a:t>
-            </a:r>
-            <a:endParaRPr lang="en-US" dirty="0"/>
-          </a:p>
-        </p:txBody>
-      </p:sp>
-      <p:sp>
-        <p:nvSpPr>
-          <p:cNvPr id="3" name="Text Placeholder 2">
+              <a:rPr lang="en-US" dirty="0"/>
+              <a:t>Chosen </a:t>
+            </a:r>
+            <a:r>
+              <a:rPr lang="en-US"/>
+              <a:t>CNN Architecture</a:t>
+            </a:r>
+          </a:p>
+        </p:txBody>
+      </p:sp>
+      <p:sp>
+        <p:nvSpPr>
+          <p:cNvPr id="3" name="Content Placeholder 2">
             <a:extLst>
               <a:ext uri="{FF2B5EF4-FFF2-40B4-BE49-F238E27FC236}">
-                <a16:creationId xmlns:a16="http://schemas.microsoft.com/office/drawing/2014/main" id="{C9A403C5-D031-86CE-17D7-6A4E78B300EA}"/>
+                <a16:creationId xmlns:a16="http://schemas.microsoft.com/office/drawing/2014/main" id="{785886C6-8935-94B1-0ECD-6A2564D8F0F4}"/>
               </a:ext>
             </a:extLst>
           </p:cNvPr>
@@ -6276,7 +6884,7 @@
             <a:spLocks noGrp="1"/>
           </p:cNvSpPr>
           <p:nvPr>
-            <p:ph type="body" idx="1"/>
+            <p:ph idx="1"/>
           </p:nvPr>
         </p:nvSpPr>
         <p:spPr/>
@@ -6284,14 +6892,50 @@
           <a:bodyPr/>
           <a:lstStyle/>
           <a:p>
-            <a:endParaRPr lang="en-US"/>
+            <a:r>
+              <a:rPr lang="en-US" dirty="0"/>
+              <a:t>Input size: (B x 128 x 128 x 3)</a:t>
+            </a:r>
+          </a:p>
+          <a:p>
+            <a:endParaRPr lang="en-US" dirty="0"/>
+          </a:p>
+          <a:p>
+            <a:endParaRPr lang="en-US" dirty="0"/>
+          </a:p>
+          <a:p>
+            <a:endParaRPr lang="en-US" dirty="0"/>
+          </a:p>
+          <a:p>
+            <a:endParaRPr lang="en-US" dirty="0"/>
+          </a:p>
+          <a:p>
+            <a:endParaRPr lang="en-US" dirty="0"/>
+          </a:p>
+          <a:p>
+            <a:pPr marL="0" indent="0">
+              <a:buNone/>
+            </a:pPr>
+            <a:endParaRPr lang="en-US" dirty="0"/>
+          </a:p>
+          <a:p>
+            <a:pPr marL="0" indent="0">
+              <a:buNone/>
+            </a:pPr>
+            <a:endParaRPr lang="en-US" dirty="0"/>
+          </a:p>
+          <a:p>
+            <a:r>
+              <a:rPr lang="en-US" dirty="0"/>
+              <a:t>Output size: (B x 29)</a:t>
+            </a:r>
           </a:p>
         </p:txBody>
       </p:sp>
     </p:spTree>
     <p:extLst>
       <p:ext uri="{BB962C8B-B14F-4D97-AF65-F5344CB8AC3E}">
-        <p14:creationId xmlns:p14="http://schemas.microsoft.com/office/powerpoint/2010/main" val="2814912908"/>
+        <p14:creationId xmlns:p14="http://schemas.microsoft.com/office/powerpoint/2010/main" val="2778027350"/>
       </p:ext>
     </p:extLst>
   </p:cSld>
@@ -6323,7 +6967,7 @@
           <p:cNvPr id="2" name="Title 1">
             <a:extLst>
               <a:ext uri="{FF2B5EF4-FFF2-40B4-BE49-F238E27FC236}">
-                <a16:creationId xmlns:a16="http://schemas.microsoft.com/office/drawing/2014/main" id="{9C9D0EFC-BFFC-5BD9-4988-6298276BA100}"/>
+                <a16:creationId xmlns:a16="http://schemas.microsoft.com/office/drawing/2014/main" id="{3532AAF0-2C1C-F27E-6805-A84B05B19858}"/>
               </a:ext>
             </a:extLst>
           </p:cNvPr>
@@ -6341,7 +6985,7 @@
           <a:p>
             <a:r>
               <a:rPr lang="en-US" dirty="0"/>
-              <a:t>Appendix: Tensor Flow</a:t>
+              <a:t>The Optimizer</a:t>
             </a:r>
           </a:p>
         </p:txBody>
@@ -6351,7 +6995,7 @@
           <p:cNvPr id="3" name="Content Placeholder 2">
             <a:extLst>
               <a:ext uri="{FF2B5EF4-FFF2-40B4-BE49-F238E27FC236}">
-                <a16:creationId xmlns:a16="http://schemas.microsoft.com/office/drawing/2014/main" id="{436BDD20-EF83-D1CE-1A11-3EAFB9D14C2C}"/>
+                <a16:creationId xmlns:a16="http://schemas.microsoft.com/office/drawing/2014/main" id="{325C03C0-6239-B163-8BF8-6B2E154DD71B}"/>
               </a:ext>
             </a:extLst>
           </p:cNvPr>
@@ -6367,14 +7011,39 @@
           <a:bodyPr/>
           <a:lstStyle/>
           <a:p>
+            <a:r>
+              <a:rPr lang="en-US" dirty="0"/>
+              <a:t>To train the model, we use an iterative gradient-descent algorithm called </a:t>
+            </a:r>
+            <a:r>
+              <a:rPr lang="en-US" i="1" dirty="0"/>
+              <a:t>ADAM</a:t>
+            </a:r>
+          </a:p>
+          <a:p>
+            <a:endParaRPr lang="en-US" i="1" dirty="0"/>
+          </a:p>
+          <a:p>
+            <a:r>
+              <a:rPr lang="en-US" dirty="0"/>
+              <a:t>ADAM gets its name from using an adaptive momentum parameter which allows it to handle discontinuities and other obstacles that it might find during training</a:t>
+            </a:r>
+          </a:p>
+          <a:p>
             <a:endParaRPr lang="en-US" dirty="0"/>
+          </a:p>
+          <a:p>
+            <a:r>
+              <a:rPr lang="en-US" dirty="0"/>
+              <a:t>We apply the ADAM optimizer implemented through TensorFlow to train/optimize our model</a:t>
+            </a:r>
           </a:p>
         </p:txBody>
       </p:sp>
     </p:spTree>
     <p:extLst>
       <p:ext uri="{BB962C8B-B14F-4D97-AF65-F5344CB8AC3E}">
-        <p14:creationId xmlns:p14="http://schemas.microsoft.com/office/powerpoint/2010/main" val="2893577354"/>
+        <p14:creationId xmlns:p14="http://schemas.microsoft.com/office/powerpoint/2010/main" val="3474381471"/>
       </p:ext>
     </p:extLst>
   </p:cSld>
@@ -6406,7 +7075,7 @@
           <p:cNvPr id="2" name="Title 1">
             <a:extLst>
               <a:ext uri="{FF2B5EF4-FFF2-40B4-BE49-F238E27FC236}">
-                <a16:creationId xmlns:a16="http://schemas.microsoft.com/office/drawing/2014/main" id="{7DD4C338-1CC3-5C25-4D0E-73A7F5AA938D}"/>
+                <a16:creationId xmlns:a16="http://schemas.microsoft.com/office/drawing/2014/main" id="{5FA1443D-69D4-9C1E-A3F0-D84FDA88B6B8}"/>
               </a:ext>
             </a:extLst>
           </p:cNvPr>
@@ -6424,7 +7093,7 @@
           <a:p>
             <a:r>
               <a:rPr lang="en-US" dirty="0"/>
-              <a:t>Appendix: Kaggle Dataset</a:t>
+              <a:t>K-Folds Cross Validation</a:t>
             </a:r>
           </a:p>
         </p:txBody>
@@ -6434,7 +7103,7 @@
           <p:cNvPr id="3" name="Content Placeholder 2">
             <a:extLst>
               <a:ext uri="{FF2B5EF4-FFF2-40B4-BE49-F238E27FC236}">
-                <a16:creationId xmlns:a16="http://schemas.microsoft.com/office/drawing/2014/main" id="{C7A91A56-6109-963D-04F9-FA82CB77B9FF}"/>
+                <a16:creationId xmlns:a16="http://schemas.microsoft.com/office/drawing/2014/main" id="{C07EAC6F-70B0-98CF-C1E4-F324160358AE}"/>
               </a:ext>
             </a:extLst>
           </p:cNvPr>
@@ -6450,14 +7119,54 @@
           <a:bodyPr/>
           <a:lstStyle/>
           <a:p>
-            <a:endParaRPr lang="en-US"/>
+            <a:r>
+              <a:rPr lang="en-US" dirty="0"/>
+              <a:t>K-Folds Cross Validation is a procedure where we chop up a dataset into K subsets</a:t>
+            </a:r>
+          </a:p>
+          <a:p>
+            <a:r>
+              <a:rPr lang="en-US" dirty="0"/>
+              <a:t>We iterate through the subsets and for each iterations, we do the following</a:t>
+            </a:r>
+          </a:p>
+          <a:p>
+            <a:pPr lvl="1"/>
+            <a:r>
+              <a:rPr lang="en-US" dirty="0"/>
+              <a:t>Train an unoptimized model on K-1 of the subsets of data</a:t>
+            </a:r>
+          </a:p>
+          <a:p>
+            <a:pPr lvl="1"/>
+            <a:r>
+              <a:rPr lang="en-US" dirty="0"/>
+              <a:t>Test that newly trained model on the one remaining subset of data</a:t>
+            </a:r>
+          </a:p>
+          <a:p>
+            <a:r>
+              <a:rPr lang="en-US" dirty="0"/>
+              <a:t>This process ensures that our model can handle variations in the dataset</a:t>
+            </a:r>
+          </a:p>
+          <a:p>
+            <a:r>
+              <a:rPr lang="en-US" dirty="0"/>
+              <a:t>Ensures that there are no subtleties in the dataset that allowed us to perform better or worse than any other </a:t>
+            </a:r>
+            <a:r>
+              <a:rPr lang="en-US" dirty="0" err="1"/>
+              <a:t>experiement</a:t>
+            </a:r>
+            <a:endParaRPr lang="en-US" dirty="0"/>
           </a:p>
         </p:txBody>
       </p:sp>
     </p:spTree>
     <p:extLst>
       <p:ext uri="{BB962C8B-B14F-4D97-AF65-F5344CB8AC3E}">
-        <p14:creationId xmlns:p14="http://schemas.microsoft.com/office/powerpoint/2010/main" val="1780586942"/>
+        <p14:creationId xmlns:p14="http://schemas.microsoft.com/office/powerpoint/2010/main" val="2092365476"/>
       </p:ext>
     </p:extLst>
   </p:cSld>
@@ -6690,7 +7399,7 @@
           <a:p>
             <a:r>
               <a:rPr lang="en-US" sz="1600" dirty="0"/>
-              <a:t>The classification model</a:t>
+              <a:t>The Classification Model</a:t>
             </a:r>
           </a:p>
           <a:p>
@@ -6705,13 +7414,6 @@
             <a:r>
               <a:rPr lang="en-US" sz="1400" dirty="0"/>
               <a:t>Optimizer</a:t>
-            </a:r>
-          </a:p>
-          <a:p>
-            <a:pPr lvl="1"/>
-            <a:r>
-              <a:rPr lang="en-US" sz="1400" dirty="0"/>
-              <a:t>Performance metrics</a:t>
             </a:r>
           </a:p>
           <a:p>
@@ -6744,6 +7446,610 @@
     <p:extLst>
       <p:ext uri="{BB962C8B-B14F-4D97-AF65-F5344CB8AC3E}">
         <p14:creationId xmlns:p14="http://schemas.microsoft.com/office/powerpoint/2010/main" val="822353752"/>
+      </p:ext>
+    </p:extLst>
+  </p:cSld>
+  <p:clrMapOvr>
+    <a:masterClrMapping/>
+  </p:clrMapOvr>
+</p:sld>
+</file>
+
+<file path=ppt/slides/slide20.xml><?xml version="1.0" encoding="utf-8"?>
+<p:sld xmlns:a="http://schemas.openxmlformats.org/drawingml/2006/main" xmlns:r="http://schemas.openxmlformats.org/officeDocument/2006/relationships" xmlns:p="http://schemas.openxmlformats.org/presentationml/2006/main">
+  <p:cSld>
+    <p:spTree>
+      <p:nvGrpSpPr>
+        <p:cNvPr id="1" name=""/>
+        <p:cNvGrpSpPr/>
+        <p:nvPr/>
+      </p:nvGrpSpPr>
+      <p:grpSpPr>
+        <a:xfrm>
+          <a:off x="0" y="0"/>
+          <a:ext cx="0" cy="0"/>
+          <a:chOff x="0" y="0"/>
+          <a:chExt cx="0" cy="0"/>
+        </a:xfrm>
+      </p:grpSpPr>
+      <p:sp>
+        <p:nvSpPr>
+          <p:cNvPr id="2" name="Title 1">
+            <a:extLst>
+              <a:ext uri="{FF2B5EF4-FFF2-40B4-BE49-F238E27FC236}">
+                <a16:creationId xmlns:a16="http://schemas.microsoft.com/office/drawing/2014/main" id="{DE07CCEE-72C4-3690-5FFF-75B3EE6FAAE0}"/>
+              </a:ext>
+            </a:extLst>
+          </p:cNvPr>
+          <p:cNvSpPr>
+            <a:spLocks noGrp="1"/>
+          </p:cNvSpPr>
+          <p:nvPr>
+            <p:ph type="title"/>
+          </p:nvPr>
+        </p:nvSpPr>
+        <p:spPr/>
+        <p:txBody>
+          <a:bodyPr/>
+          <a:lstStyle/>
+          <a:p>
+            <a:r>
+              <a:rPr lang="en-US" dirty="0"/>
+              <a:t>Executing K = 10 Folds X-Validation</a:t>
+            </a:r>
+          </a:p>
+        </p:txBody>
+      </p:sp>
+      <p:sp>
+        <p:nvSpPr>
+          <p:cNvPr id="3" name="Content Placeholder 2">
+            <a:extLst>
+              <a:ext uri="{FF2B5EF4-FFF2-40B4-BE49-F238E27FC236}">
+                <a16:creationId xmlns:a16="http://schemas.microsoft.com/office/drawing/2014/main" id="{4696FA1B-1F74-DB5C-5CE4-724611713BB0}"/>
+              </a:ext>
+            </a:extLst>
+          </p:cNvPr>
+          <p:cNvSpPr>
+            <a:spLocks noGrp="1"/>
+          </p:cNvSpPr>
+          <p:nvPr>
+            <p:ph idx="1"/>
+          </p:nvPr>
+        </p:nvSpPr>
+        <p:spPr/>
+        <p:txBody>
+          <a:bodyPr/>
+          <a:lstStyle/>
+          <a:p>
+            <a:r>
+              <a:rPr lang="en-US" dirty="0"/>
+              <a:t>To test the stability of our classifier, we have chosen to execute K = 10 folds X-validation</a:t>
+            </a:r>
+          </a:p>
+          <a:p>
+            <a:r>
+              <a:rPr lang="en-US" dirty="0"/>
+              <a:t>For each fold, we record the training loss at each epoch to understand the rate of converge</a:t>
+            </a:r>
+          </a:p>
+          <a:p>
+            <a:r>
+              <a:rPr lang="en-US" dirty="0"/>
+              <a:t>We also produce a classification report which shows the precision, recall, and F1 when evaluating the final fold</a:t>
+            </a:r>
+          </a:p>
+        </p:txBody>
+      </p:sp>
+    </p:spTree>
+    <p:extLst>
+      <p:ext uri="{BB962C8B-B14F-4D97-AF65-F5344CB8AC3E}">
+        <p14:creationId xmlns:p14="http://schemas.microsoft.com/office/powerpoint/2010/main" val="2224261170"/>
+      </p:ext>
+    </p:extLst>
+  </p:cSld>
+  <p:clrMapOvr>
+    <a:masterClrMapping/>
+  </p:clrMapOvr>
+</p:sld>
+</file>
+
+<file path=ppt/slides/slide21.xml><?xml version="1.0" encoding="utf-8"?>
+<p:sld xmlns:a="http://schemas.openxmlformats.org/drawingml/2006/main" xmlns:r="http://schemas.openxmlformats.org/officeDocument/2006/relationships" xmlns:p="http://schemas.openxmlformats.org/presentationml/2006/main">
+  <p:cSld>
+    <p:spTree>
+      <p:nvGrpSpPr>
+        <p:cNvPr id="1" name=""/>
+        <p:cNvGrpSpPr/>
+        <p:nvPr/>
+      </p:nvGrpSpPr>
+      <p:grpSpPr>
+        <a:xfrm>
+          <a:off x="0" y="0"/>
+          <a:ext cx="0" cy="0"/>
+          <a:chOff x="0" y="0"/>
+          <a:chExt cx="0" cy="0"/>
+        </a:xfrm>
+      </p:grpSpPr>
+      <p:sp>
+        <p:nvSpPr>
+          <p:cNvPr id="2" name="Title 1">
+            <a:extLst>
+              <a:ext uri="{FF2B5EF4-FFF2-40B4-BE49-F238E27FC236}">
+                <a16:creationId xmlns:a16="http://schemas.microsoft.com/office/drawing/2014/main" id="{5FA1443D-69D4-9C1E-A3F0-D84FDA88B6B8}"/>
+              </a:ext>
+            </a:extLst>
+          </p:cNvPr>
+          <p:cNvSpPr>
+            <a:spLocks noGrp="1"/>
+          </p:cNvSpPr>
+          <p:nvPr>
+            <p:ph type="title"/>
+          </p:nvPr>
+        </p:nvSpPr>
+        <p:spPr/>
+        <p:txBody>
+          <a:bodyPr/>
+          <a:lstStyle/>
+          <a:p>
+            <a:r>
+              <a:rPr lang="en-US" dirty="0"/>
+              <a:t>Performance Metrics</a:t>
+            </a:r>
+          </a:p>
+        </p:txBody>
+      </p:sp>
+      <p:sp>
+        <p:nvSpPr>
+          <p:cNvPr id="3" name="Content Placeholder 2">
+            <a:extLst>
+              <a:ext uri="{FF2B5EF4-FFF2-40B4-BE49-F238E27FC236}">
+                <a16:creationId xmlns:a16="http://schemas.microsoft.com/office/drawing/2014/main" id="{C07EAC6F-70B0-98CF-C1E4-F324160358AE}"/>
+              </a:ext>
+            </a:extLst>
+          </p:cNvPr>
+          <p:cNvSpPr>
+            <a:spLocks noGrp="1"/>
+          </p:cNvSpPr>
+          <p:nvPr>
+            <p:ph idx="1"/>
+          </p:nvPr>
+        </p:nvSpPr>
+        <p:spPr/>
+        <p:txBody>
+          <a:bodyPr/>
+          <a:lstStyle/>
+          <a:p>
+            <a:r>
+              <a:rPr lang="en-US" dirty="0"/>
+              <a:t>To evaluate performance of a classifier, we use four principle scores:</a:t>
+            </a:r>
+          </a:p>
+          <a:p>
+            <a:endParaRPr lang="en-US" dirty="0"/>
+          </a:p>
+          <a:p>
+            <a:r>
+              <a:rPr lang="en-US" dirty="0"/>
+              <a:t>Precision: TODO what is precision?</a:t>
+            </a:r>
+          </a:p>
+          <a:p>
+            <a:r>
+              <a:rPr lang="en-US" dirty="0"/>
+              <a:t>Recall: TODO what is recall?</a:t>
+            </a:r>
+          </a:p>
+          <a:p>
+            <a:r>
+              <a:rPr lang="en-US" dirty="0"/>
+              <a:t>F1-Score – the harmonic mean of precision &amp; recall. Models with higher scores for both get a higher F1 score. Bound within [0,1] and a higher number is a higher score</a:t>
+            </a:r>
+          </a:p>
+        </p:txBody>
+      </p:sp>
+    </p:spTree>
+    <p:extLst>
+      <p:ext uri="{BB962C8B-B14F-4D97-AF65-F5344CB8AC3E}">
+        <p14:creationId xmlns:p14="http://schemas.microsoft.com/office/powerpoint/2010/main" val="706092382"/>
+      </p:ext>
+    </p:extLst>
+  </p:cSld>
+  <p:clrMapOvr>
+    <a:masterClrMapping/>
+  </p:clrMapOvr>
+</p:sld>
+</file>
+
+<file path=ppt/slides/slide22.xml><?xml version="1.0" encoding="utf-8"?>
+<p:sld xmlns:a="http://schemas.openxmlformats.org/drawingml/2006/main" xmlns:r="http://schemas.openxmlformats.org/officeDocument/2006/relationships" xmlns:p="http://schemas.openxmlformats.org/presentationml/2006/main">
+  <p:cSld>
+    <p:spTree>
+      <p:nvGrpSpPr>
+        <p:cNvPr id="1" name=""/>
+        <p:cNvGrpSpPr/>
+        <p:nvPr/>
+      </p:nvGrpSpPr>
+      <p:grpSpPr>
+        <a:xfrm>
+          <a:off x="0" y="0"/>
+          <a:ext cx="0" cy="0"/>
+          <a:chOff x="0" y="0"/>
+          <a:chExt cx="0" cy="0"/>
+        </a:xfrm>
+      </p:grpSpPr>
+      <p:sp>
+        <p:nvSpPr>
+          <p:cNvPr id="2" name="Title 1">
+            <a:extLst>
+              <a:ext uri="{FF2B5EF4-FFF2-40B4-BE49-F238E27FC236}">
+                <a16:creationId xmlns:a16="http://schemas.microsoft.com/office/drawing/2014/main" id="{76BA31D2-F9D3-E04C-C7FF-FE80BE580C93}"/>
+              </a:ext>
+            </a:extLst>
+          </p:cNvPr>
+          <p:cNvSpPr>
+            <a:spLocks noGrp="1"/>
+          </p:cNvSpPr>
+          <p:nvPr>
+            <p:ph type="title"/>
+          </p:nvPr>
+        </p:nvSpPr>
+        <p:spPr/>
+        <p:txBody>
+          <a:bodyPr/>
+          <a:lstStyle/>
+          <a:p>
+            <a:r>
+              <a:rPr lang="en-US" dirty="0"/>
+              <a:t>Confusion Matrix</a:t>
+            </a:r>
+          </a:p>
+        </p:txBody>
+      </p:sp>
+      <p:sp>
+        <p:nvSpPr>
+          <p:cNvPr id="3" name="Content Placeholder 2">
+            <a:extLst>
+              <a:ext uri="{FF2B5EF4-FFF2-40B4-BE49-F238E27FC236}">
+                <a16:creationId xmlns:a16="http://schemas.microsoft.com/office/drawing/2014/main" id="{A3AAC3D0-A30D-F22D-55B0-90903C904430}"/>
+              </a:ext>
+            </a:extLst>
+          </p:cNvPr>
+          <p:cNvSpPr>
+            <a:spLocks noGrp="1"/>
+          </p:cNvSpPr>
+          <p:nvPr>
+            <p:ph idx="1"/>
+          </p:nvPr>
+        </p:nvSpPr>
+        <p:spPr/>
+        <p:txBody>
+          <a:bodyPr/>
+          <a:lstStyle/>
+          <a:p>
+            <a:r>
+              <a:rPr lang="en-US" dirty="0"/>
+              <a:t>Square matrix with sides equal to the number of classes in the dataset</a:t>
+            </a:r>
+          </a:p>
+          <a:p>
+            <a:endParaRPr lang="en-US" dirty="0"/>
+          </a:p>
+          <a:p>
+            <a:r>
+              <a:rPr lang="en-US" dirty="0"/>
+              <a:t>Entry in row </a:t>
+            </a:r>
+            <a:r>
+              <a:rPr lang="en-US" b="1" i="1" dirty="0"/>
+              <a:t>A</a:t>
+            </a:r>
+            <a:r>
+              <a:rPr lang="en-US" dirty="0"/>
+              <a:t>, column </a:t>
+            </a:r>
+            <a:r>
+              <a:rPr lang="en-US" b="1" i="1" dirty="0"/>
+              <a:t>B</a:t>
+            </a:r>
+            <a:r>
+              <a:rPr lang="en-US" dirty="0"/>
+              <a:t> gives how many times that a sample from class </a:t>
+            </a:r>
+            <a:r>
+              <a:rPr lang="en-US" b="1" i="1" dirty="0"/>
+              <a:t>A</a:t>
+            </a:r>
+            <a:r>
+              <a:rPr lang="en-US" dirty="0"/>
+              <a:t> was </a:t>
+            </a:r>
+            <a:r>
+              <a:rPr lang="en-US" dirty="0" err="1"/>
+              <a:t>predited</a:t>
+            </a:r>
+            <a:r>
+              <a:rPr lang="en-US" dirty="0"/>
+              <a:t> to be in class </a:t>
+            </a:r>
+            <a:r>
+              <a:rPr lang="en-US" b="1" i="1" dirty="0"/>
+              <a:t>B</a:t>
+            </a:r>
+          </a:p>
+          <a:p>
+            <a:endParaRPr lang="en-US" dirty="0"/>
+          </a:p>
+          <a:p>
+            <a:r>
+              <a:rPr lang="en-US" dirty="0"/>
+              <a:t>A matrix with a strong main diagonal usually indicates a high-performance classifier</a:t>
+            </a:r>
+          </a:p>
+          <a:p>
+            <a:endParaRPr lang="en-US" dirty="0"/>
+          </a:p>
+          <a:p>
+            <a:r>
+              <a:rPr lang="en-US" dirty="0"/>
+              <a:t>Off-diagonal entries indicate misclassification</a:t>
+            </a:r>
+          </a:p>
+        </p:txBody>
+      </p:sp>
+    </p:spTree>
+    <p:extLst>
+      <p:ext uri="{BB962C8B-B14F-4D97-AF65-F5344CB8AC3E}">
+        <p14:creationId xmlns:p14="http://schemas.microsoft.com/office/powerpoint/2010/main" val="2649002697"/>
+      </p:ext>
+    </p:extLst>
+  </p:cSld>
+  <p:clrMapOvr>
+    <a:masterClrMapping/>
+  </p:clrMapOvr>
+</p:sld>
+</file>
+
+<file path=ppt/slides/slide23.xml><?xml version="1.0" encoding="utf-8"?>
+<p:sld xmlns:a="http://schemas.openxmlformats.org/drawingml/2006/main" xmlns:r="http://schemas.openxmlformats.org/officeDocument/2006/relationships" xmlns:p="http://schemas.openxmlformats.org/presentationml/2006/main">
+  <p:cSld>
+    <p:spTree>
+      <p:nvGrpSpPr>
+        <p:cNvPr id="1" name=""/>
+        <p:cNvGrpSpPr/>
+        <p:nvPr/>
+      </p:nvGrpSpPr>
+      <p:grpSpPr>
+        <a:xfrm>
+          <a:off x="0" y="0"/>
+          <a:ext cx="0" cy="0"/>
+          <a:chOff x="0" y="0"/>
+          <a:chExt cx="0" cy="0"/>
+        </a:xfrm>
+      </p:grpSpPr>
+      <p:sp>
+        <p:nvSpPr>
+          <p:cNvPr id="2" name="Title 1">
+            <a:extLst>
+              <a:ext uri="{FF2B5EF4-FFF2-40B4-BE49-F238E27FC236}">
+                <a16:creationId xmlns:a16="http://schemas.microsoft.com/office/drawing/2014/main" id="{BF209E95-9A62-B3EF-AB6C-7EDB0DD50B84}"/>
+              </a:ext>
+            </a:extLst>
+          </p:cNvPr>
+          <p:cNvSpPr>
+            <a:spLocks noGrp="1"/>
+          </p:cNvSpPr>
+          <p:nvPr>
+            <p:ph type="title"/>
+          </p:nvPr>
+        </p:nvSpPr>
+        <p:spPr/>
+        <p:txBody>
+          <a:bodyPr/>
+          <a:lstStyle/>
+          <a:p>
+            <a:r>
+              <a:rPr lang="en-US" dirty="0" err="1"/>
+              <a:t>Appendex</a:t>
+            </a:r>
+            <a:endParaRPr lang="en-US" dirty="0"/>
+          </a:p>
+        </p:txBody>
+      </p:sp>
+      <p:sp>
+        <p:nvSpPr>
+          <p:cNvPr id="3" name="Text Placeholder 2">
+            <a:extLst>
+              <a:ext uri="{FF2B5EF4-FFF2-40B4-BE49-F238E27FC236}">
+                <a16:creationId xmlns:a16="http://schemas.microsoft.com/office/drawing/2014/main" id="{C9A403C5-D031-86CE-17D7-6A4E78B300EA}"/>
+              </a:ext>
+            </a:extLst>
+          </p:cNvPr>
+          <p:cNvSpPr>
+            <a:spLocks noGrp="1"/>
+          </p:cNvSpPr>
+          <p:nvPr>
+            <p:ph type="body" idx="1"/>
+          </p:nvPr>
+        </p:nvSpPr>
+        <p:spPr/>
+        <p:txBody>
+          <a:bodyPr/>
+          <a:lstStyle/>
+          <a:p>
+            <a:endParaRPr lang="en-US"/>
+          </a:p>
+        </p:txBody>
+      </p:sp>
+    </p:spTree>
+    <p:extLst>
+      <p:ext uri="{BB962C8B-B14F-4D97-AF65-F5344CB8AC3E}">
+        <p14:creationId xmlns:p14="http://schemas.microsoft.com/office/powerpoint/2010/main" val="2814912908"/>
+      </p:ext>
+    </p:extLst>
+  </p:cSld>
+  <p:clrMapOvr>
+    <a:masterClrMapping/>
+  </p:clrMapOvr>
+</p:sld>
+</file>
+
+<file path=ppt/slides/slide24.xml><?xml version="1.0" encoding="utf-8"?>
+<p:sld xmlns:a="http://schemas.openxmlformats.org/drawingml/2006/main" xmlns:r="http://schemas.openxmlformats.org/officeDocument/2006/relationships" xmlns:p="http://schemas.openxmlformats.org/presentationml/2006/main">
+  <p:cSld>
+    <p:spTree>
+      <p:nvGrpSpPr>
+        <p:cNvPr id="1" name=""/>
+        <p:cNvGrpSpPr/>
+        <p:nvPr/>
+      </p:nvGrpSpPr>
+      <p:grpSpPr>
+        <a:xfrm>
+          <a:off x="0" y="0"/>
+          <a:ext cx="0" cy="0"/>
+          <a:chOff x="0" y="0"/>
+          <a:chExt cx="0" cy="0"/>
+        </a:xfrm>
+      </p:grpSpPr>
+      <p:sp>
+        <p:nvSpPr>
+          <p:cNvPr id="2" name="Title 1">
+            <a:extLst>
+              <a:ext uri="{FF2B5EF4-FFF2-40B4-BE49-F238E27FC236}">
+                <a16:creationId xmlns:a16="http://schemas.microsoft.com/office/drawing/2014/main" id="{9C9D0EFC-BFFC-5BD9-4988-6298276BA100}"/>
+              </a:ext>
+            </a:extLst>
+          </p:cNvPr>
+          <p:cNvSpPr>
+            <a:spLocks noGrp="1"/>
+          </p:cNvSpPr>
+          <p:nvPr>
+            <p:ph type="title"/>
+          </p:nvPr>
+        </p:nvSpPr>
+        <p:spPr/>
+        <p:txBody>
+          <a:bodyPr/>
+          <a:lstStyle/>
+          <a:p>
+            <a:r>
+              <a:rPr lang="en-US" dirty="0"/>
+              <a:t>Appendix: Tensor Flow</a:t>
+            </a:r>
+          </a:p>
+        </p:txBody>
+      </p:sp>
+      <p:sp>
+        <p:nvSpPr>
+          <p:cNvPr id="3" name="Content Placeholder 2">
+            <a:extLst>
+              <a:ext uri="{FF2B5EF4-FFF2-40B4-BE49-F238E27FC236}">
+                <a16:creationId xmlns:a16="http://schemas.microsoft.com/office/drawing/2014/main" id="{436BDD20-EF83-D1CE-1A11-3EAFB9D14C2C}"/>
+              </a:ext>
+            </a:extLst>
+          </p:cNvPr>
+          <p:cNvSpPr>
+            <a:spLocks noGrp="1"/>
+          </p:cNvSpPr>
+          <p:nvPr>
+            <p:ph idx="1"/>
+          </p:nvPr>
+        </p:nvSpPr>
+        <p:spPr/>
+        <p:txBody>
+          <a:bodyPr/>
+          <a:lstStyle/>
+          <a:p>
+            <a:endParaRPr lang="en-US" dirty="0"/>
+          </a:p>
+        </p:txBody>
+      </p:sp>
+    </p:spTree>
+    <p:extLst>
+      <p:ext uri="{BB962C8B-B14F-4D97-AF65-F5344CB8AC3E}">
+        <p14:creationId xmlns:p14="http://schemas.microsoft.com/office/powerpoint/2010/main" val="2893577354"/>
+      </p:ext>
+    </p:extLst>
+  </p:cSld>
+  <p:clrMapOvr>
+    <a:masterClrMapping/>
+  </p:clrMapOvr>
+</p:sld>
+</file>
+
+<file path=ppt/slides/slide25.xml><?xml version="1.0" encoding="utf-8"?>
+<p:sld xmlns:a="http://schemas.openxmlformats.org/drawingml/2006/main" xmlns:r="http://schemas.openxmlformats.org/officeDocument/2006/relationships" xmlns:p="http://schemas.openxmlformats.org/presentationml/2006/main">
+  <p:cSld>
+    <p:spTree>
+      <p:nvGrpSpPr>
+        <p:cNvPr id="1" name=""/>
+        <p:cNvGrpSpPr/>
+        <p:nvPr/>
+      </p:nvGrpSpPr>
+      <p:grpSpPr>
+        <a:xfrm>
+          <a:off x="0" y="0"/>
+          <a:ext cx="0" cy="0"/>
+          <a:chOff x="0" y="0"/>
+          <a:chExt cx="0" cy="0"/>
+        </a:xfrm>
+      </p:grpSpPr>
+      <p:sp>
+        <p:nvSpPr>
+          <p:cNvPr id="2" name="Title 1">
+            <a:extLst>
+              <a:ext uri="{FF2B5EF4-FFF2-40B4-BE49-F238E27FC236}">
+                <a16:creationId xmlns:a16="http://schemas.microsoft.com/office/drawing/2014/main" id="{7DD4C338-1CC3-5C25-4D0E-73A7F5AA938D}"/>
+              </a:ext>
+            </a:extLst>
+          </p:cNvPr>
+          <p:cNvSpPr>
+            <a:spLocks noGrp="1"/>
+          </p:cNvSpPr>
+          <p:nvPr>
+            <p:ph type="title"/>
+          </p:nvPr>
+        </p:nvSpPr>
+        <p:spPr/>
+        <p:txBody>
+          <a:bodyPr/>
+          <a:lstStyle/>
+          <a:p>
+            <a:r>
+              <a:rPr lang="en-US" dirty="0"/>
+              <a:t>Appendix: Kaggle Dataset</a:t>
+            </a:r>
+          </a:p>
+        </p:txBody>
+      </p:sp>
+      <p:sp>
+        <p:nvSpPr>
+          <p:cNvPr id="3" name="Content Placeholder 2">
+            <a:extLst>
+              <a:ext uri="{FF2B5EF4-FFF2-40B4-BE49-F238E27FC236}">
+                <a16:creationId xmlns:a16="http://schemas.microsoft.com/office/drawing/2014/main" id="{C7A91A56-6109-963D-04F9-FA82CB77B9FF}"/>
+              </a:ext>
+            </a:extLst>
+          </p:cNvPr>
+          <p:cNvSpPr>
+            <a:spLocks noGrp="1"/>
+          </p:cNvSpPr>
+          <p:nvPr>
+            <p:ph idx="1"/>
+          </p:nvPr>
+        </p:nvSpPr>
+        <p:spPr/>
+        <p:txBody>
+          <a:bodyPr/>
+          <a:lstStyle/>
+          <a:p>
+            <a:endParaRPr lang="en-US"/>
+          </a:p>
+        </p:txBody>
+      </p:sp>
+    </p:spTree>
+    <p:extLst>
+      <p:ext uri="{BB962C8B-B14F-4D97-AF65-F5344CB8AC3E}">
+        <p14:creationId xmlns:p14="http://schemas.microsoft.com/office/powerpoint/2010/main" val="1780586942"/>
       </p:ext>
     </p:extLst>
   </p:cSld>

</xml_diff>